<commit_message>
matrix analyses & params to Wildhaber inputs
</commit_message>
<xml_diff>
--- a/documents/Parameterization.pptx
+++ b/documents/Parameterization.pptx
@@ -19,6 +19,13 @@
     <p:sldId id="364" r:id="rId13"/>
     <p:sldId id="377" r:id="rId14"/>
     <p:sldId id="378" r:id="rId15"/>
+    <p:sldId id="380" r:id="rId16"/>
+    <p:sldId id="382" r:id="rId17"/>
+    <p:sldId id="383" r:id="rId18"/>
+    <p:sldId id="384" r:id="rId19"/>
+    <p:sldId id="381" r:id="rId20"/>
+    <p:sldId id="385" r:id="rId21"/>
+    <p:sldId id="386" r:id="rId22"/>
   </p:sldIdLst>
   <p:sldSz cx="12192000" cy="6858000"/>
   <p:notesSz cx="6858000" cy="9144000"/>
@@ -272,7 +279,7 @@
           <a:p>
             <a:fld id="{6B7E76F8-15D9-449C-9B36-4D2CABF134B9}" type="datetimeFigureOut">
               <a:rPr lang="en-US" smtClean="0"/>
-              <a:t>10/7/2021</a:t>
+              <a:t>10/18/2021</a:t>
             </a:fld>
             <a:endParaRPr lang="en-US"/>
           </a:p>
@@ -470,7 +477,7 @@
           <a:p>
             <a:fld id="{6B7E76F8-15D9-449C-9B36-4D2CABF134B9}" type="datetimeFigureOut">
               <a:rPr lang="en-US" smtClean="0"/>
-              <a:t>10/7/2021</a:t>
+              <a:t>10/18/2021</a:t>
             </a:fld>
             <a:endParaRPr lang="en-US"/>
           </a:p>
@@ -678,7 +685,7 @@
           <a:p>
             <a:fld id="{6B7E76F8-15D9-449C-9B36-4D2CABF134B9}" type="datetimeFigureOut">
               <a:rPr lang="en-US" smtClean="0"/>
-              <a:t>10/7/2021</a:t>
+              <a:t>10/18/2021</a:t>
             </a:fld>
             <a:endParaRPr lang="en-US"/>
           </a:p>
@@ -876,7 +883,7 @@
           <a:p>
             <a:fld id="{6B7E76F8-15D9-449C-9B36-4D2CABF134B9}" type="datetimeFigureOut">
               <a:rPr lang="en-US" smtClean="0"/>
-              <a:t>10/7/2021</a:t>
+              <a:t>10/18/2021</a:t>
             </a:fld>
             <a:endParaRPr lang="en-US"/>
           </a:p>
@@ -1151,7 +1158,7 @@
           <a:p>
             <a:fld id="{6B7E76F8-15D9-449C-9B36-4D2CABF134B9}" type="datetimeFigureOut">
               <a:rPr lang="en-US" smtClean="0"/>
-              <a:t>10/7/2021</a:t>
+              <a:t>10/18/2021</a:t>
             </a:fld>
             <a:endParaRPr lang="en-US"/>
           </a:p>
@@ -1416,7 +1423,7 @@
           <a:p>
             <a:fld id="{6B7E76F8-15D9-449C-9B36-4D2CABF134B9}" type="datetimeFigureOut">
               <a:rPr lang="en-US" smtClean="0"/>
-              <a:t>10/7/2021</a:t>
+              <a:t>10/18/2021</a:t>
             </a:fld>
             <a:endParaRPr lang="en-US"/>
           </a:p>
@@ -1828,7 +1835,7 @@
           <a:p>
             <a:fld id="{6B7E76F8-15D9-449C-9B36-4D2CABF134B9}" type="datetimeFigureOut">
               <a:rPr lang="en-US" smtClean="0"/>
-              <a:t>10/7/2021</a:t>
+              <a:t>10/18/2021</a:t>
             </a:fld>
             <a:endParaRPr lang="en-US"/>
           </a:p>
@@ -1969,7 +1976,7 @@
           <a:p>
             <a:fld id="{6B7E76F8-15D9-449C-9B36-4D2CABF134B9}" type="datetimeFigureOut">
               <a:rPr lang="en-US" smtClean="0"/>
-              <a:t>10/7/2021</a:t>
+              <a:t>10/18/2021</a:t>
             </a:fld>
             <a:endParaRPr lang="en-US"/>
           </a:p>
@@ -2082,7 +2089,7 @@
           <a:p>
             <a:fld id="{6B7E76F8-15D9-449C-9B36-4D2CABF134B9}" type="datetimeFigureOut">
               <a:rPr lang="en-US" smtClean="0"/>
-              <a:t>10/7/2021</a:t>
+              <a:t>10/18/2021</a:t>
             </a:fld>
             <a:endParaRPr lang="en-US"/>
           </a:p>
@@ -2393,7 +2400,7 @@
           <a:p>
             <a:fld id="{6B7E76F8-15D9-449C-9B36-4D2CABF134B9}" type="datetimeFigureOut">
               <a:rPr lang="en-US" smtClean="0"/>
-              <a:t>10/7/2021</a:t>
+              <a:t>10/18/2021</a:t>
             </a:fld>
             <a:endParaRPr lang="en-US"/>
           </a:p>
@@ -2681,7 +2688,7 @@
           <a:p>
             <a:fld id="{6B7E76F8-15D9-449C-9B36-4D2CABF134B9}" type="datetimeFigureOut">
               <a:rPr lang="en-US" smtClean="0"/>
-              <a:t>10/7/2021</a:t>
+              <a:t>10/18/2021</a:t>
             </a:fld>
             <a:endParaRPr lang="en-US"/>
           </a:p>
@@ -2922,7 +2929,7 @@
           <a:p>
             <a:fld id="{6B7E76F8-15D9-449C-9B36-4D2CABF134B9}" type="datetimeFigureOut">
               <a:rPr lang="en-US" smtClean="0"/>
-              <a:t>10/7/2021</a:t>
+              <a:t>10/18/2021</a:t>
             </a:fld>
             <a:endParaRPr lang="en-US"/>
           </a:p>
@@ -3427,8 +3434,8 @@
           <a:chExt cx="0" cy="0"/>
         </a:xfrm>
       </p:grpSpPr>
-      <mc:AlternateContent xmlns:mc="http://schemas.openxmlformats.org/markup-compatibility/2006">
-        <mc:Choice xmlns:a14="http://schemas.microsoft.com/office/drawing/2010/main" Requires="a14">
+      <mc:AlternateContent xmlns:mc="http://schemas.openxmlformats.org/markup-compatibility/2006" xmlns:a14="http://schemas.microsoft.com/office/drawing/2010/main">
+        <mc:Choice Requires="a14">
           <p:sp>
             <p:nvSpPr>
               <p:cNvPr id="2" name="TextBox 1">
@@ -3659,7 +3666,7 @@
             </p:txBody>
           </p:sp>
         </mc:Choice>
-        <mc:Fallback>
+        <mc:Fallback xmlns="">
           <p:sp>
             <p:nvSpPr>
               <p:cNvPr id="2" name="TextBox 1">
@@ -4497,6 +4504,1067 @@
 </p:sld>
 </file>
 
+<file path=ppt/slides/slide15.xml><?xml version="1.0" encoding="utf-8"?>
+<p:sld xmlns:a="http://schemas.openxmlformats.org/drawingml/2006/main" xmlns:r="http://schemas.openxmlformats.org/officeDocument/2006/relationships" xmlns:p="http://schemas.openxmlformats.org/presentationml/2006/main">
+  <p:cSld>
+    <p:spTree>
+      <p:nvGrpSpPr>
+        <p:cNvPr id="1" name=""/>
+        <p:cNvGrpSpPr/>
+        <p:nvPr/>
+      </p:nvGrpSpPr>
+      <p:grpSpPr>
+        <a:xfrm>
+          <a:off x="0" y="0"/>
+          <a:ext cx="0" cy="0"/>
+          <a:chOff x="0" y="0"/>
+          <a:chExt cx="0" cy="0"/>
+        </a:xfrm>
+      </p:grpSpPr>
+      <p:sp>
+        <p:nvSpPr>
+          <p:cNvPr id="2" name="Title 1">
+            <a:extLst>
+              <a:ext uri="{FF2B5EF4-FFF2-40B4-BE49-F238E27FC236}">
+                <a16:creationId xmlns:a16="http://schemas.microsoft.com/office/drawing/2014/main" id="{558CD107-F143-4E9D-8B4E-618DAE4EB2BE}"/>
+              </a:ext>
+            </a:extLst>
+          </p:cNvPr>
+          <p:cNvSpPr>
+            <a:spLocks noGrp="1"/>
+          </p:cNvSpPr>
+          <p:nvPr>
+            <p:ph type="ctrTitle"/>
+          </p:nvPr>
+        </p:nvSpPr>
+        <p:spPr/>
+        <p:txBody>
+          <a:bodyPr>
+            <a:normAutofit/>
+          </a:bodyPr>
+          <a:lstStyle/>
+          <a:p>
+            <a:r>
+              <a:rPr lang="en-US" dirty="0"/>
+              <a:t>Lower Missouri River Population Model Analyses</a:t>
+            </a:r>
+          </a:p>
+        </p:txBody>
+      </p:sp>
+      <p:sp>
+        <p:nvSpPr>
+          <p:cNvPr id="3" name="Subtitle 2">
+            <a:extLst>
+              <a:ext uri="{FF2B5EF4-FFF2-40B4-BE49-F238E27FC236}">
+                <a16:creationId xmlns:a16="http://schemas.microsoft.com/office/drawing/2014/main" id="{B96A61D7-D168-4B4C-88CC-98EEBF7BE8EE}"/>
+              </a:ext>
+            </a:extLst>
+          </p:cNvPr>
+          <p:cNvSpPr>
+            <a:spLocks noGrp="1"/>
+          </p:cNvSpPr>
+          <p:nvPr>
+            <p:ph type="subTitle" idx="1"/>
+          </p:nvPr>
+        </p:nvSpPr>
+        <p:spPr/>
+        <p:txBody>
+          <a:bodyPr/>
+          <a:lstStyle/>
+          <a:p>
+            <a:r>
+              <a:rPr lang="en-US" dirty="0"/>
+              <a:t>DRAFT 10/13/21</a:t>
+            </a:r>
+          </a:p>
+        </p:txBody>
+      </p:sp>
+    </p:spTree>
+    <p:extLst>
+      <p:ext uri="{BB962C8B-B14F-4D97-AF65-F5344CB8AC3E}">
+        <p14:creationId xmlns:p14="http://schemas.microsoft.com/office/powerpoint/2010/main" val="1538977541"/>
+      </p:ext>
+    </p:extLst>
+  </p:cSld>
+  <p:clrMapOvr>
+    <a:masterClrMapping/>
+  </p:clrMapOvr>
+</p:sld>
+</file>
+
+<file path=ppt/slides/slide16.xml><?xml version="1.0" encoding="utf-8"?>
+<p:sld xmlns:a="http://schemas.openxmlformats.org/drawingml/2006/main" xmlns:r="http://schemas.openxmlformats.org/officeDocument/2006/relationships" xmlns:p="http://schemas.openxmlformats.org/presentationml/2006/main">
+  <p:cSld>
+    <p:spTree>
+      <p:nvGrpSpPr>
+        <p:cNvPr id="1" name=""/>
+        <p:cNvGrpSpPr/>
+        <p:nvPr/>
+      </p:nvGrpSpPr>
+      <p:grpSpPr>
+        <a:xfrm>
+          <a:off x="0" y="0"/>
+          <a:ext cx="0" cy="0"/>
+          <a:chOff x="0" y="0"/>
+          <a:chExt cx="0" cy="0"/>
+        </a:xfrm>
+      </p:grpSpPr>
+      <p:sp>
+        <p:nvSpPr>
+          <p:cNvPr id="8" name="Title 1">
+            <a:extLst>
+              <a:ext uri="{FF2B5EF4-FFF2-40B4-BE49-F238E27FC236}">
+                <a16:creationId xmlns:a16="http://schemas.microsoft.com/office/drawing/2014/main" id="{D2CB5ABF-396D-4B7F-9444-C39CCAE82489}"/>
+              </a:ext>
+            </a:extLst>
+          </p:cNvPr>
+          <p:cNvSpPr txBox="1">
+            <a:spLocks/>
+          </p:cNvSpPr>
+          <p:nvPr/>
+        </p:nvSpPr>
+        <p:spPr>
+          <a:xfrm>
+            <a:off x="162339" y="168347"/>
+            <a:ext cx="10515600" cy="1325563"/>
+          </a:xfrm>
+          <a:prstGeom prst="rect">
+            <a:avLst/>
+          </a:prstGeom>
+        </p:spPr>
+        <p:txBody>
+          <a:bodyPr/>
+          <a:lstStyle>
+            <a:lvl1pPr algn="l" defTabSz="914400" rtl="0" eaLnBrk="1" latinLnBrk="0" hangingPunct="1">
+              <a:lnSpc>
+                <a:spcPct val="90000"/>
+              </a:lnSpc>
+              <a:spcBef>
+                <a:spcPct val="0"/>
+              </a:spcBef>
+              <a:buNone/>
+              <a:defRPr sz="4400" kern="1200">
+                <a:solidFill>
+                  <a:schemeClr val="tx1"/>
+                </a:solidFill>
+                <a:latin typeface="+mj-lt"/>
+                <a:ea typeface="+mj-ea"/>
+                <a:cs typeface="+mj-cs"/>
+              </a:defRPr>
+            </a:lvl1pPr>
+          </a:lstStyle>
+          <a:p>
+            <a:r>
+              <a:rPr lang="en-US" dirty="0"/>
+              <a:t>Model Analyses</a:t>
+            </a:r>
+          </a:p>
+        </p:txBody>
+      </p:sp>
+      <p:sp>
+        <p:nvSpPr>
+          <p:cNvPr id="2" name="TextBox 1">
+            <a:extLst>
+              <a:ext uri="{FF2B5EF4-FFF2-40B4-BE49-F238E27FC236}">
+                <a16:creationId xmlns:a16="http://schemas.microsoft.com/office/drawing/2014/main" id="{0BF3028D-45A3-42BD-A265-F938696C98AA}"/>
+              </a:ext>
+            </a:extLst>
+          </p:cNvPr>
+          <p:cNvSpPr txBox="1"/>
+          <p:nvPr/>
+        </p:nvSpPr>
+        <p:spPr>
+          <a:xfrm>
+            <a:off x="834887" y="1219200"/>
+            <a:ext cx="10880035" cy="4339650"/>
+          </a:xfrm>
+          <a:prstGeom prst="rect">
+            <a:avLst/>
+          </a:prstGeom>
+          <a:noFill/>
+        </p:spPr>
+        <p:txBody>
+          <a:bodyPr wrap="square" rtlCol="0">
+            <a:spAutoFit/>
+          </a:bodyPr>
+          <a:lstStyle/>
+          <a:p>
+            <a:pPr marL="342900" indent="-342900">
+              <a:buFont typeface="+mj-lt"/>
+              <a:buAutoNum type="arabicPeriod"/>
+            </a:pPr>
+            <a:r>
+              <a:rPr lang="en-US" sz="2800" dirty="0"/>
+              <a:t>  Sensitivity analyses</a:t>
+            </a:r>
+          </a:p>
+          <a:p>
+            <a:pPr marL="342900" indent="-342900">
+              <a:buFont typeface="+mj-lt"/>
+              <a:buAutoNum type="arabicPeriod"/>
+            </a:pPr>
+            <a:endParaRPr lang="en-US" sz="2800" dirty="0"/>
+          </a:p>
+          <a:p>
+            <a:pPr marL="342900" indent="-342900">
+              <a:buFont typeface="+mj-lt"/>
+              <a:buAutoNum type="arabicPeriod"/>
+            </a:pPr>
+            <a:r>
+              <a:rPr lang="en-US" sz="2800" dirty="0"/>
+              <a:t>  Age-0 survival needed for stability</a:t>
+            </a:r>
+          </a:p>
+          <a:p>
+            <a:pPr marL="342900" indent="-342900">
+              <a:buFont typeface="+mj-lt"/>
+              <a:buAutoNum type="arabicPeriod"/>
+            </a:pPr>
+            <a:endParaRPr lang="en-US" sz="2800" dirty="0"/>
+          </a:p>
+          <a:p>
+            <a:pPr marL="342900" indent="-342900">
+              <a:buFont typeface="+mj-lt"/>
+              <a:buAutoNum type="arabicPeriod"/>
+            </a:pPr>
+            <a:r>
+              <a:rPr lang="en-US" sz="2800" dirty="0"/>
+              <a:t>  Growth-decline boundary in terms of age-0 and age-1 survival</a:t>
+            </a:r>
+          </a:p>
+          <a:p>
+            <a:pPr marL="1371600" lvl="2" indent="-457200">
+              <a:buFont typeface="Arial" panose="020B0604020202020204" pitchFamily="34" charset="0"/>
+              <a:buChar char="•"/>
+            </a:pPr>
+            <a:r>
+              <a:rPr lang="en-US" sz="2400" dirty="0"/>
+              <a:t>Add in maturation age?</a:t>
+            </a:r>
+          </a:p>
+          <a:p>
+            <a:pPr marL="342900" indent="-342900">
+              <a:buFont typeface="+mj-lt"/>
+              <a:buAutoNum type="arabicPeriod"/>
+            </a:pPr>
+            <a:endParaRPr lang="en-US" sz="2800" dirty="0"/>
+          </a:p>
+          <a:p>
+            <a:pPr marL="342900" indent="-342900">
+              <a:buFont typeface="+mj-lt"/>
+              <a:buAutoNum type="arabicPeriod"/>
+            </a:pPr>
+            <a:r>
+              <a:rPr lang="en-US" sz="2800" dirty="0"/>
+              <a:t>  Harvest analyses</a:t>
+            </a:r>
+          </a:p>
+          <a:p>
+            <a:pPr marL="342900" indent="-342900">
+              <a:buFont typeface="+mj-lt"/>
+              <a:buAutoNum type="arabicPeriod"/>
+            </a:pPr>
+            <a:endParaRPr lang="en-US" sz="2800" dirty="0"/>
+          </a:p>
+          <a:p>
+            <a:pPr marL="342900" indent="-342900">
+              <a:buFont typeface="+mj-lt"/>
+              <a:buAutoNum type="arabicPeriod"/>
+            </a:pPr>
+            <a:r>
+              <a:rPr lang="en-US" sz="2800" dirty="0"/>
+              <a:t>  Stocking analyses</a:t>
+            </a:r>
+          </a:p>
+        </p:txBody>
+      </p:sp>
+    </p:spTree>
+    <p:extLst>
+      <p:ext uri="{BB962C8B-B14F-4D97-AF65-F5344CB8AC3E}">
+        <p14:creationId xmlns:p14="http://schemas.microsoft.com/office/powerpoint/2010/main" val="1787310945"/>
+      </p:ext>
+    </p:extLst>
+  </p:cSld>
+  <p:clrMapOvr>
+    <a:masterClrMapping/>
+  </p:clrMapOvr>
+</p:sld>
+</file>
+
+<file path=ppt/slides/slide17.xml><?xml version="1.0" encoding="utf-8"?>
+<p:sld xmlns:a="http://schemas.openxmlformats.org/drawingml/2006/main" xmlns:r="http://schemas.openxmlformats.org/officeDocument/2006/relationships" xmlns:p="http://schemas.openxmlformats.org/presentationml/2006/main">
+  <p:cSld>
+    <p:spTree>
+      <p:nvGrpSpPr>
+        <p:cNvPr id="1" name=""/>
+        <p:cNvGrpSpPr/>
+        <p:nvPr/>
+      </p:nvGrpSpPr>
+      <p:grpSpPr>
+        <a:xfrm>
+          <a:off x="0" y="0"/>
+          <a:ext cx="0" cy="0"/>
+          <a:chOff x="0" y="0"/>
+          <a:chExt cx="0" cy="0"/>
+        </a:xfrm>
+      </p:grpSpPr>
+      <p:pic>
+        <p:nvPicPr>
+          <p:cNvPr id="5" name="Picture 4" descr="Chart&#10;&#10;Description automatically generated">
+            <a:extLst>
+              <a:ext uri="{FF2B5EF4-FFF2-40B4-BE49-F238E27FC236}">
+                <a16:creationId xmlns:a16="http://schemas.microsoft.com/office/drawing/2014/main" id="{17D55A07-11F8-4082-A1FB-472C4FF4DBCC}"/>
+              </a:ext>
+            </a:extLst>
+          </p:cNvPr>
+          <p:cNvPicPr>
+            <a:picLocks noChangeAspect="1"/>
+          </p:cNvPicPr>
+          <p:nvPr/>
+        </p:nvPicPr>
+        <p:blipFill>
+          <a:blip r:embed="rId2">
+            <a:extLst>
+              <a:ext uri="{28A0092B-C50C-407E-A947-70E740481C1C}">
+                <a14:useLocalDpi xmlns:a14="http://schemas.microsoft.com/office/drawing/2010/main" val="0"/>
+              </a:ext>
+            </a:extLst>
+          </a:blip>
+          <a:stretch>
+            <a:fillRect/>
+          </a:stretch>
+        </p:blipFill>
+        <p:spPr>
+          <a:xfrm>
+            <a:off x="282209" y="617626"/>
+            <a:ext cx="11627583" cy="6072027"/>
+          </a:xfrm>
+          <a:prstGeom prst="rect">
+            <a:avLst/>
+          </a:prstGeom>
+        </p:spPr>
+      </p:pic>
+      <p:sp>
+        <p:nvSpPr>
+          <p:cNvPr id="8" name="Title 1">
+            <a:extLst>
+              <a:ext uri="{FF2B5EF4-FFF2-40B4-BE49-F238E27FC236}">
+                <a16:creationId xmlns:a16="http://schemas.microsoft.com/office/drawing/2014/main" id="{D2CB5ABF-396D-4B7F-9444-C39CCAE82489}"/>
+              </a:ext>
+            </a:extLst>
+          </p:cNvPr>
+          <p:cNvSpPr txBox="1">
+            <a:spLocks/>
+          </p:cNvSpPr>
+          <p:nvPr/>
+        </p:nvSpPr>
+        <p:spPr>
+          <a:xfrm>
+            <a:off x="162339" y="168347"/>
+            <a:ext cx="10515600" cy="1325563"/>
+          </a:xfrm>
+          <a:prstGeom prst="rect">
+            <a:avLst/>
+          </a:prstGeom>
+        </p:spPr>
+        <p:txBody>
+          <a:bodyPr/>
+          <a:lstStyle>
+            <a:lvl1pPr algn="l" defTabSz="914400" rtl="0" eaLnBrk="1" latinLnBrk="0" hangingPunct="1">
+              <a:lnSpc>
+                <a:spcPct val="90000"/>
+              </a:lnSpc>
+              <a:spcBef>
+                <a:spcPct val="0"/>
+              </a:spcBef>
+              <a:buNone/>
+              <a:defRPr sz="4400" kern="1200">
+                <a:solidFill>
+                  <a:schemeClr val="tx1"/>
+                </a:solidFill>
+                <a:latin typeface="+mj-lt"/>
+                <a:ea typeface="+mj-ea"/>
+                <a:cs typeface="+mj-cs"/>
+              </a:defRPr>
+            </a:lvl1pPr>
+          </a:lstStyle>
+          <a:p>
+            <a:r>
+              <a:rPr lang="en-US" dirty="0"/>
+              <a:t>Sensitivity Analyses</a:t>
+            </a:r>
+          </a:p>
+        </p:txBody>
+      </p:sp>
+      <p:sp>
+        <p:nvSpPr>
+          <p:cNvPr id="6" name="TextBox 5">
+            <a:extLst>
+              <a:ext uri="{FF2B5EF4-FFF2-40B4-BE49-F238E27FC236}">
+                <a16:creationId xmlns:a16="http://schemas.microsoft.com/office/drawing/2014/main" id="{56493F0E-42C5-485A-AE9D-0692A6596CEA}"/>
+              </a:ext>
+            </a:extLst>
+          </p:cNvPr>
+          <p:cNvSpPr txBox="1"/>
+          <p:nvPr/>
+        </p:nvSpPr>
+        <p:spPr>
+          <a:xfrm>
+            <a:off x="162339" y="749439"/>
+            <a:ext cx="10889974" cy="461665"/>
+          </a:xfrm>
+          <a:prstGeom prst="rect">
+            <a:avLst/>
+          </a:prstGeom>
+          <a:noFill/>
+        </p:spPr>
+        <p:txBody>
+          <a:bodyPr wrap="square" rtlCol="0">
+            <a:spAutoFit/>
+          </a:bodyPr>
+          <a:lstStyle/>
+          <a:p>
+            <a:r>
+              <a:rPr lang="en-US" sz="2400" i="1" dirty="0">
+                <a:latin typeface="+mj-lt"/>
+              </a:rPr>
+              <a:t>One-way sensitivity values:  change in long-term lambda with a unit parameter change</a:t>
+            </a:r>
+          </a:p>
+        </p:txBody>
+      </p:sp>
+    </p:spTree>
+    <p:extLst>
+      <p:ext uri="{BB962C8B-B14F-4D97-AF65-F5344CB8AC3E}">
+        <p14:creationId xmlns:p14="http://schemas.microsoft.com/office/powerpoint/2010/main" val="3336296168"/>
+      </p:ext>
+    </p:extLst>
+  </p:cSld>
+  <p:clrMapOvr>
+    <a:masterClrMapping/>
+  </p:clrMapOvr>
+</p:sld>
+</file>
+
+<file path=ppt/slides/slide18.xml><?xml version="1.0" encoding="utf-8"?>
+<p:sld xmlns:a="http://schemas.openxmlformats.org/drawingml/2006/main" xmlns:r="http://schemas.openxmlformats.org/officeDocument/2006/relationships" xmlns:p="http://schemas.openxmlformats.org/presentationml/2006/main">
+  <p:cSld>
+    <p:spTree>
+      <p:nvGrpSpPr>
+        <p:cNvPr id="1" name=""/>
+        <p:cNvGrpSpPr/>
+        <p:nvPr/>
+      </p:nvGrpSpPr>
+      <p:grpSpPr>
+        <a:xfrm>
+          <a:off x="0" y="0"/>
+          <a:ext cx="0" cy="0"/>
+          <a:chOff x="0" y="0"/>
+          <a:chExt cx="0" cy="0"/>
+        </a:xfrm>
+      </p:grpSpPr>
+      <p:sp>
+        <p:nvSpPr>
+          <p:cNvPr id="8" name="Title 1">
+            <a:extLst>
+              <a:ext uri="{FF2B5EF4-FFF2-40B4-BE49-F238E27FC236}">
+                <a16:creationId xmlns:a16="http://schemas.microsoft.com/office/drawing/2014/main" id="{D2CB5ABF-396D-4B7F-9444-C39CCAE82489}"/>
+              </a:ext>
+            </a:extLst>
+          </p:cNvPr>
+          <p:cNvSpPr txBox="1">
+            <a:spLocks/>
+          </p:cNvSpPr>
+          <p:nvPr/>
+        </p:nvSpPr>
+        <p:spPr>
+          <a:xfrm>
+            <a:off x="162339" y="168347"/>
+            <a:ext cx="10515600" cy="1325563"/>
+          </a:xfrm>
+          <a:prstGeom prst="rect">
+            <a:avLst/>
+          </a:prstGeom>
+        </p:spPr>
+        <p:txBody>
+          <a:bodyPr/>
+          <a:lstStyle>
+            <a:lvl1pPr algn="l" defTabSz="914400" rtl="0" eaLnBrk="1" latinLnBrk="0" hangingPunct="1">
+              <a:lnSpc>
+                <a:spcPct val="90000"/>
+              </a:lnSpc>
+              <a:spcBef>
+                <a:spcPct val="0"/>
+              </a:spcBef>
+              <a:buNone/>
+              <a:defRPr sz="4400" kern="1200">
+                <a:solidFill>
+                  <a:schemeClr val="tx1"/>
+                </a:solidFill>
+                <a:latin typeface="+mj-lt"/>
+                <a:ea typeface="+mj-ea"/>
+                <a:cs typeface="+mj-cs"/>
+              </a:defRPr>
+            </a:lvl1pPr>
+          </a:lstStyle>
+          <a:p>
+            <a:r>
+              <a:rPr lang="en-US" dirty="0"/>
+              <a:t>Sensitivity Analyses</a:t>
+            </a:r>
+          </a:p>
+        </p:txBody>
+      </p:sp>
+      <p:sp>
+        <p:nvSpPr>
+          <p:cNvPr id="6" name="TextBox 5">
+            <a:extLst>
+              <a:ext uri="{FF2B5EF4-FFF2-40B4-BE49-F238E27FC236}">
+                <a16:creationId xmlns:a16="http://schemas.microsoft.com/office/drawing/2014/main" id="{56493F0E-42C5-485A-AE9D-0692A6596CEA}"/>
+              </a:ext>
+            </a:extLst>
+          </p:cNvPr>
+          <p:cNvSpPr txBox="1"/>
+          <p:nvPr/>
+        </p:nvSpPr>
+        <p:spPr>
+          <a:xfrm>
+            <a:off x="162338" y="749439"/>
+            <a:ext cx="11256231" cy="830997"/>
+          </a:xfrm>
+          <a:prstGeom prst="rect">
+            <a:avLst/>
+          </a:prstGeom>
+          <a:noFill/>
+        </p:spPr>
+        <p:txBody>
+          <a:bodyPr wrap="square" rtlCol="0">
+            <a:spAutoFit/>
+          </a:bodyPr>
+          <a:lstStyle/>
+          <a:p>
+            <a:r>
+              <a:rPr lang="en-US" sz="2400" i="1" dirty="0">
+                <a:latin typeface="+mj-lt"/>
+              </a:rPr>
+              <a:t>One-way elasticity values:  proportional change in long-term lambda with a proportional change in a parameter value</a:t>
+            </a:r>
+          </a:p>
+        </p:txBody>
+      </p:sp>
+      <p:graphicFrame>
+        <p:nvGraphicFramePr>
+          <p:cNvPr id="2" name="Table 2">
+            <a:extLst>
+              <a:ext uri="{FF2B5EF4-FFF2-40B4-BE49-F238E27FC236}">
+                <a16:creationId xmlns:a16="http://schemas.microsoft.com/office/drawing/2014/main" id="{E3569B72-7C5C-43A2-BB77-E21B23EDA4EB}"/>
+              </a:ext>
+            </a:extLst>
+          </p:cNvPr>
+          <p:cNvGraphicFramePr>
+            <a:graphicFrameLocks noGrp="1"/>
+          </p:cNvGraphicFramePr>
+          <p:nvPr>
+            <p:extLst>
+              <p:ext uri="{D42A27DB-BD31-4B8C-83A1-F6EECF244321}">
+                <p14:modId xmlns:p14="http://schemas.microsoft.com/office/powerpoint/2010/main" val="1915227971"/>
+              </p:ext>
+            </p:extLst>
+          </p:nvPr>
+        </p:nvGraphicFramePr>
+        <p:xfrm>
+          <a:off x="467885" y="2377440"/>
+          <a:ext cx="11256231" cy="2103120"/>
+        </p:xfrm>
+        <a:graphic>
+          <a:graphicData uri="http://schemas.openxmlformats.org/drawingml/2006/table">
+            <a:tbl>
+              <a:tblPr firstRow="1" bandRow="1">
+                <a:tableStyleId>{5C22544A-7EE6-4342-B048-85BDC9FD1C3A}</a:tableStyleId>
+              </a:tblPr>
+              <a:tblGrid>
+                <a:gridCol w="3737610">
+                  <a:extLst>
+                    <a:ext uri="{9D8B030D-6E8A-4147-A177-3AD203B41FA5}">
+                      <a16:colId xmlns:a16="http://schemas.microsoft.com/office/drawing/2014/main" val="1892214399"/>
+                    </a:ext>
+                  </a:extLst>
+                </a:gridCol>
+                <a:gridCol w="3766544">
+                  <a:extLst>
+                    <a:ext uri="{9D8B030D-6E8A-4147-A177-3AD203B41FA5}">
+                      <a16:colId xmlns:a16="http://schemas.microsoft.com/office/drawing/2014/main" val="314755591"/>
+                    </a:ext>
+                  </a:extLst>
+                </a:gridCol>
+                <a:gridCol w="3752077">
+                  <a:extLst>
+                    <a:ext uri="{9D8B030D-6E8A-4147-A177-3AD203B41FA5}">
+                      <a16:colId xmlns:a16="http://schemas.microsoft.com/office/drawing/2014/main" val="4011558034"/>
+                    </a:ext>
+                  </a:extLst>
+                </a:gridCol>
+              </a:tblGrid>
+              <a:tr h="370840">
+                <a:tc>
+                  <a:txBody>
+                    <a:bodyPr/>
+                    <a:lstStyle/>
+                    <a:p>
+                      <a:pPr algn="ctr"/>
+                      <a:r>
+                        <a:rPr lang="en-US" sz="2400" dirty="0"/>
+                        <a:t>Parameter</a:t>
+                      </a:r>
+                    </a:p>
+                  </a:txBody>
+                  <a:tcPr anchor="ctr"/>
+                </a:tc>
+                <a:tc>
+                  <a:txBody>
+                    <a:bodyPr/>
+                    <a:lstStyle/>
+                    <a:p>
+                      <a:pPr algn="ctr"/>
+                      <a:r>
+                        <a:rPr lang="en-US" sz="2400" dirty="0"/>
+                        <a:t>Elasticity Value JAGS VBGF </a:t>
+                      </a:r>
+                    </a:p>
+                  </a:txBody>
+                  <a:tcPr anchor="ctr"/>
+                </a:tc>
+                <a:tc>
+                  <a:txBody>
+                    <a:bodyPr/>
+                    <a:lstStyle/>
+                    <a:p>
+                      <a:pPr algn="ctr"/>
+                      <a:r>
+                        <a:rPr lang="en-US" sz="2400" dirty="0"/>
+                        <a:t>Elasticity Value TMB ln(VBGF) </a:t>
+                      </a:r>
+                    </a:p>
+                  </a:txBody>
+                  <a:tcPr/>
+                </a:tc>
+                <a:extLst>
+                  <a:ext uri="{0D108BD9-81ED-4DB2-BD59-A6C34878D82A}">
+                    <a16:rowId xmlns:a16="http://schemas.microsoft.com/office/drawing/2014/main" val="4028550352"/>
+                  </a:ext>
+                </a:extLst>
+              </a:tr>
+              <a:tr h="370840">
+                <a:tc>
+                  <a:txBody>
+                    <a:bodyPr/>
+                    <a:lstStyle/>
+                    <a:p>
+                      <a:pPr algn="ctr"/>
+                      <a:r>
+                        <a:rPr lang="en-US" sz="2400" dirty="0"/>
+                        <a:t>Maximum Age</a:t>
+                      </a:r>
+                    </a:p>
+                  </a:txBody>
+                  <a:tcPr/>
+                </a:tc>
+                <a:tc>
+                  <a:txBody>
+                    <a:bodyPr/>
+                    <a:lstStyle/>
+                    <a:p>
+                      <a:pPr algn="ctr"/>
+                      <a:r>
+                        <a:rPr lang="en-US" sz="2400" dirty="0"/>
+                        <a:t> 0.081456</a:t>
+                      </a:r>
+                    </a:p>
+                  </a:txBody>
+                  <a:tcPr/>
+                </a:tc>
+                <a:tc>
+                  <a:txBody>
+                    <a:bodyPr/>
+                    <a:lstStyle/>
+                    <a:p>
+                      <a:pPr algn="ctr"/>
+                      <a:r>
+                        <a:rPr lang="en-US" sz="2400" dirty="0"/>
+                        <a:t>0.089307</a:t>
+                      </a:r>
+                    </a:p>
+                  </a:txBody>
+                  <a:tcPr/>
+                </a:tc>
+                <a:extLst>
+                  <a:ext uri="{0D108BD9-81ED-4DB2-BD59-A6C34878D82A}">
+                    <a16:rowId xmlns:a16="http://schemas.microsoft.com/office/drawing/2014/main" val="1235938930"/>
+                  </a:ext>
+                </a:extLst>
+              </a:tr>
+              <a:tr h="370840">
+                <a:tc>
+                  <a:txBody>
+                    <a:bodyPr/>
+                    <a:lstStyle/>
+                    <a:p>
+                      <a:pPr algn="ctr"/>
+                      <a:r>
+                        <a:rPr lang="en-US" sz="2400" dirty="0"/>
+                        <a:t>Age-0 thru Age-7 Survivals Sex Ratio</a:t>
+                      </a:r>
+                    </a:p>
+                  </a:txBody>
+                  <a:tcPr/>
+                </a:tc>
+                <a:tc>
+                  <a:txBody>
+                    <a:bodyPr/>
+                    <a:lstStyle/>
+                    <a:p>
+                      <a:pPr algn="ctr">
+                        <a:spcBef>
+                          <a:spcPts val="1200"/>
+                        </a:spcBef>
+                      </a:pPr>
+                      <a:r>
+                        <a:rPr lang="en-US" sz="2400" dirty="0"/>
+                        <a:t>0.033442</a:t>
+                      </a:r>
+                    </a:p>
+                  </a:txBody>
+                  <a:tcPr anchor="ctr"/>
+                </a:tc>
+                <a:tc>
+                  <a:txBody>
+                    <a:bodyPr/>
+                    <a:lstStyle/>
+                    <a:p>
+                      <a:pPr algn="ctr">
+                        <a:spcBef>
+                          <a:spcPts val="1200"/>
+                        </a:spcBef>
+                      </a:pPr>
+                      <a:r>
+                        <a:rPr lang="en-US" sz="2400" dirty="0"/>
+                        <a:t>0.032743 </a:t>
+                      </a:r>
+                    </a:p>
+                  </a:txBody>
+                  <a:tcPr anchor="ctr"/>
+                </a:tc>
+                <a:extLst>
+                  <a:ext uri="{0D108BD9-81ED-4DB2-BD59-A6C34878D82A}">
+                    <a16:rowId xmlns:a16="http://schemas.microsoft.com/office/drawing/2014/main" val="744868919"/>
+                  </a:ext>
+                </a:extLst>
+              </a:tr>
+            </a:tbl>
+          </a:graphicData>
+        </a:graphic>
+      </p:graphicFrame>
+      <p:sp>
+        <p:nvSpPr>
+          <p:cNvPr id="3" name="TextBox 2">
+            <a:extLst>
+              <a:ext uri="{FF2B5EF4-FFF2-40B4-BE49-F238E27FC236}">
+                <a16:creationId xmlns:a16="http://schemas.microsoft.com/office/drawing/2014/main" id="{915340F3-87F4-4FC7-A627-2459B8FE9238}"/>
+              </a:ext>
+            </a:extLst>
+          </p:cNvPr>
+          <p:cNvSpPr txBox="1"/>
+          <p:nvPr/>
+        </p:nvSpPr>
+        <p:spPr>
+          <a:xfrm>
+            <a:off x="467885" y="6166433"/>
+            <a:ext cx="11256231" cy="523220"/>
+          </a:xfrm>
+          <a:prstGeom prst="rect">
+            <a:avLst/>
+          </a:prstGeom>
+          <a:noFill/>
+        </p:spPr>
+        <p:txBody>
+          <a:bodyPr wrap="square" rtlCol="0">
+            <a:spAutoFit/>
+          </a:bodyPr>
+          <a:lstStyle/>
+          <a:p>
+            <a:r>
+              <a:rPr lang="en-US" sz="1400" dirty="0"/>
+              <a:t>*Note:  Due to the discrete nature of the maximum age parameter, its elasticity value was computed from an average rate of change as compared to all</a:t>
+            </a:r>
+          </a:p>
+          <a:p>
+            <a:r>
+              <a:rPr lang="en-US" sz="1400" dirty="0"/>
+              <a:t>              other values which were computed from an instantaneous rate of change.</a:t>
+            </a:r>
+          </a:p>
+        </p:txBody>
+      </p:sp>
+    </p:spTree>
+    <p:extLst>
+      <p:ext uri="{BB962C8B-B14F-4D97-AF65-F5344CB8AC3E}">
+        <p14:creationId xmlns:p14="http://schemas.microsoft.com/office/powerpoint/2010/main" val="164726553"/>
+      </p:ext>
+    </p:extLst>
+  </p:cSld>
+  <p:clrMapOvr>
+    <a:masterClrMapping/>
+  </p:clrMapOvr>
+</p:sld>
+</file>
+
+<file path=ppt/slides/slide19.xml><?xml version="1.0" encoding="utf-8"?>
+<p:sld xmlns:a="http://schemas.openxmlformats.org/drawingml/2006/main" xmlns:r="http://schemas.openxmlformats.org/officeDocument/2006/relationships" xmlns:p="http://schemas.openxmlformats.org/presentationml/2006/main">
+  <p:cSld>
+    <p:spTree>
+      <p:nvGrpSpPr>
+        <p:cNvPr id="1" name=""/>
+        <p:cNvGrpSpPr/>
+        <p:nvPr/>
+      </p:nvGrpSpPr>
+      <p:grpSpPr>
+        <a:xfrm>
+          <a:off x="0" y="0"/>
+          <a:ext cx="0" cy="0"/>
+          <a:chOff x="0" y="0"/>
+          <a:chExt cx="0" cy="0"/>
+        </a:xfrm>
+      </p:grpSpPr>
+      <p:sp>
+        <p:nvSpPr>
+          <p:cNvPr id="2" name="Title 1">
+            <a:extLst>
+              <a:ext uri="{FF2B5EF4-FFF2-40B4-BE49-F238E27FC236}">
+                <a16:creationId xmlns:a16="http://schemas.microsoft.com/office/drawing/2014/main" id="{2501A1DF-BBC2-4E53-B7DC-D572BDA6716F}"/>
+              </a:ext>
+            </a:extLst>
+          </p:cNvPr>
+          <p:cNvSpPr txBox="1">
+            <a:spLocks/>
+          </p:cNvSpPr>
+          <p:nvPr/>
+        </p:nvSpPr>
+        <p:spPr>
+          <a:xfrm>
+            <a:off x="162339" y="168347"/>
+            <a:ext cx="10515600" cy="1325563"/>
+          </a:xfrm>
+          <a:prstGeom prst="rect">
+            <a:avLst/>
+          </a:prstGeom>
+        </p:spPr>
+        <p:txBody>
+          <a:bodyPr/>
+          <a:lstStyle>
+            <a:lvl1pPr algn="l" defTabSz="914400" rtl="0" eaLnBrk="1" latinLnBrk="0" hangingPunct="1">
+              <a:lnSpc>
+                <a:spcPct val="90000"/>
+              </a:lnSpc>
+              <a:spcBef>
+                <a:spcPct val="0"/>
+              </a:spcBef>
+              <a:buNone/>
+              <a:defRPr sz="4400" kern="1200">
+                <a:solidFill>
+                  <a:schemeClr val="tx1"/>
+                </a:solidFill>
+                <a:latin typeface="+mj-lt"/>
+                <a:ea typeface="+mj-ea"/>
+                <a:cs typeface="+mj-cs"/>
+              </a:defRPr>
+            </a:lvl1pPr>
+          </a:lstStyle>
+          <a:p>
+            <a:r>
+              <a:rPr lang="en-US" dirty="0"/>
+              <a:t>Age-0 Survival Required For Stability</a:t>
+            </a:r>
+          </a:p>
+        </p:txBody>
+      </p:sp>
+      <p:sp>
+        <p:nvSpPr>
+          <p:cNvPr id="3" name="TextBox 2">
+            <a:extLst>
+              <a:ext uri="{FF2B5EF4-FFF2-40B4-BE49-F238E27FC236}">
+                <a16:creationId xmlns:a16="http://schemas.microsoft.com/office/drawing/2014/main" id="{95E6A193-EBCA-4512-A33D-7071BE08C57C}"/>
+              </a:ext>
+            </a:extLst>
+          </p:cNvPr>
+          <p:cNvSpPr txBox="1"/>
+          <p:nvPr/>
+        </p:nvSpPr>
+        <p:spPr>
+          <a:xfrm>
+            <a:off x="162339" y="749439"/>
+            <a:ext cx="10889974" cy="461665"/>
+          </a:xfrm>
+          <a:prstGeom prst="rect">
+            <a:avLst/>
+          </a:prstGeom>
+          <a:noFill/>
+        </p:spPr>
+        <p:txBody>
+          <a:bodyPr wrap="square" rtlCol="0">
+            <a:spAutoFit/>
+          </a:bodyPr>
+          <a:lstStyle/>
+          <a:p>
+            <a:r>
+              <a:rPr lang="en-US" sz="2400" i="1" dirty="0">
+                <a:latin typeface="+mj-lt"/>
+              </a:rPr>
+              <a:t>Baseline parameter values</a:t>
+            </a:r>
+          </a:p>
+        </p:txBody>
+      </p:sp>
+      <p:graphicFrame>
+        <p:nvGraphicFramePr>
+          <p:cNvPr id="4" name="Table 4">
+            <a:extLst>
+              <a:ext uri="{FF2B5EF4-FFF2-40B4-BE49-F238E27FC236}">
+                <a16:creationId xmlns:a16="http://schemas.microsoft.com/office/drawing/2014/main" id="{ED98F2FE-48ED-4205-B73B-202727D73169}"/>
+              </a:ext>
+            </a:extLst>
+          </p:cNvPr>
+          <p:cNvGraphicFramePr>
+            <a:graphicFrameLocks noGrp="1"/>
+          </p:cNvGraphicFramePr>
+          <p:nvPr>
+            <p:extLst>
+              <p:ext uri="{D42A27DB-BD31-4B8C-83A1-F6EECF244321}">
+                <p14:modId xmlns:p14="http://schemas.microsoft.com/office/powerpoint/2010/main" val="3895769726"/>
+              </p:ext>
+            </p:extLst>
+          </p:nvPr>
+        </p:nvGraphicFramePr>
+        <p:xfrm>
+          <a:off x="457200" y="2455136"/>
+          <a:ext cx="11292840" cy="1183414"/>
+        </p:xfrm>
+        <a:graphic>
+          <a:graphicData uri="http://schemas.openxmlformats.org/drawingml/2006/table">
+            <a:tbl>
+              <a:tblPr firstRow="1" bandRow="1">
+                <a:tableStyleId>{5C22544A-7EE6-4342-B048-85BDC9FD1C3A}</a:tableStyleId>
+              </a:tblPr>
+              <a:tblGrid>
+                <a:gridCol w="5646420">
+                  <a:extLst>
+                    <a:ext uri="{9D8B030D-6E8A-4147-A177-3AD203B41FA5}">
+                      <a16:colId xmlns:a16="http://schemas.microsoft.com/office/drawing/2014/main" val="2461264563"/>
+                    </a:ext>
+                  </a:extLst>
+                </a:gridCol>
+                <a:gridCol w="5646420">
+                  <a:extLst>
+                    <a:ext uri="{9D8B030D-6E8A-4147-A177-3AD203B41FA5}">
+                      <a16:colId xmlns:a16="http://schemas.microsoft.com/office/drawing/2014/main" val="25104632"/>
+                    </a:ext>
+                  </a:extLst>
+                </a:gridCol>
+              </a:tblGrid>
+              <a:tr h="665254">
+                <a:tc>
+                  <a:txBody>
+                    <a:bodyPr/>
+                    <a:lstStyle/>
+                    <a:p>
+                      <a:pPr algn="ctr"/>
+                      <a:r>
+                        <a:rPr lang="en-US" sz="2800" b="1" dirty="0">
+                          <a:solidFill>
+                            <a:schemeClr val="bg1"/>
+                          </a:solidFill>
+                        </a:rPr>
+                        <a:t>JAGS VBGF Baseline Parameters</a:t>
+                      </a:r>
+                    </a:p>
+                  </a:txBody>
+                  <a:tcPr/>
+                </a:tc>
+                <a:tc>
+                  <a:txBody>
+                    <a:bodyPr/>
+                    <a:lstStyle/>
+                    <a:p>
+                      <a:pPr algn="ctr"/>
+                      <a:r>
+                        <a:rPr lang="en-US" sz="2800" b="1" dirty="0">
+                          <a:solidFill>
+                            <a:schemeClr val="bg1"/>
+                          </a:solidFill>
+                        </a:rPr>
+                        <a:t>TMB LN(VBGF) Baseline Parameters</a:t>
+                      </a:r>
+                    </a:p>
+                  </a:txBody>
+                  <a:tcPr/>
+                </a:tc>
+                <a:extLst>
+                  <a:ext uri="{0D108BD9-81ED-4DB2-BD59-A6C34878D82A}">
+                    <a16:rowId xmlns:a16="http://schemas.microsoft.com/office/drawing/2014/main" val="2260726132"/>
+                  </a:ext>
+                </a:extLst>
+              </a:tr>
+              <a:tr h="514350">
+                <a:tc>
+                  <a:txBody>
+                    <a:bodyPr/>
+                    <a:lstStyle/>
+                    <a:p>
+                      <a:pPr algn="ctr"/>
+                      <a:r>
+                        <a:rPr lang="en-US" sz="2800" dirty="0"/>
+                        <a:t>0.000384</a:t>
+                      </a:r>
+                    </a:p>
+                  </a:txBody>
+                  <a:tcPr/>
+                </a:tc>
+                <a:tc>
+                  <a:txBody>
+                    <a:bodyPr/>
+                    <a:lstStyle/>
+                    <a:p>
+                      <a:pPr algn="ctr"/>
+                      <a:r>
+                        <a:rPr lang="en-US" sz="2800" dirty="0"/>
+                        <a:t>0.000507</a:t>
+                      </a:r>
+                    </a:p>
+                  </a:txBody>
+                  <a:tcPr/>
+                </a:tc>
+                <a:extLst>
+                  <a:ext uri="{0D108BD9-81ED-4DB2-BD59-A6C34878D82A}">
+                    <a16:rowId xmlns:a16="http://schemas.microsoft.com/office/drawing/2014/main" val="222958998"/>
+                  </a:ext>
+                </a:extLst>
+              </a:tr>
+            </a:tbl>
+          </a:graphicData>
+        </a:graphic>
+      </p:graphicFrame>
+    </p:spTree>
+    <p:extLst>
+      <p:ext uri="{BB962C8B-B14F-4D97-AF65-F5344CB8AC3E}">
+        <p14:creationId xmlns:p14="http://schemas.microsoft.com/office/powerpoint/2010/main" val="527704751"/>
+      </p:ext>
+    </p:extLst>
+  </p:cSld>
+  <p:clrMapOvr>
+    <a:masterClrMapping/>
+  </p:clrMapOvr>
+</p:sld>
+</file>
+
 <file path=ppt/slides/slide2.xml><?xml version="1.0" encoding="utf-8"?>
 <p:sld xmlns:a="http://schemas.openxmlformats.org/drawingml/2006/main" xmlns:r="http://schemas.openxmlformats.org/officeDocument/2006/relationships" xmlns:p="http://schemas.openxmlformats.org/presentationml/2006/main">
   <p:cSld>
@@ -4996,6 +6064,544 @@
     <p:extLst>
       <p:ext uri="{BB962C8B-B14F-4D97-AF65-F5344CB8AC3E}">
         <p14:creationId xmlns:p14="http://schemas.microsoft.com/office/powerpoint/2010/main" val="3657255830"/>
+      </p:ext>
+    </p:extLst>
+  </p:cSld>
+  <p:clrMapOvr>
+    <a:masterClrMapping/>
+  </p:clrMapOvr>
+</p:sld>
+</file>
+
+<file path=ppt/slides/slide20.xml><?xml version="1.0" encoding="utf-8"?>
+<p:sld xmlns:a="http://schemas.openxmlformats.org/drawingml/2006/main" xmlns:r="http://schemas.openxmlformats.org/officeDocument/2006/relationships" xmlns:p="http://schemas.openxmlformats.org/presentationml/2006/main">
+  <p:cSld>
+    <p:spTree>
+      <p:nvGrpSpPr>
+        <p:cNvPr id="1" name=""/>
+        <p:cNvGrpSpPr/>
+        <p:nvPr/>
+      </p:nvGrpSpPr>
+      <p:grpSpPr>
+        <a:xfrm>
+          <a:off x="0" y="0"/>
+          <a:ext cx="0" cy="0"/>
+          <a:chOff x="0" y="0"/>
+          <a:chExt cx="0" cy="0"/>
+        </a:xfrm>
+      </p:grpSpPr>
+      <p:sp>
+        <p:nvSpPr>
+          <p:cNvPr id="2" name="Title 1">
+            <a:extLst>
+              <a:ext uri="{FF2B5EF4-FFF2-40B4-BE49-F238E27FC236}">
+                <a16:creationId xmlns:a16="http://schemas.microsoft.com/office/drawing/2014/main" id="{2501A1DF-BBC2-4E53-B7DC-D572BDA6716F}"/>
+              </a:ext>
+            </a:extLst>
+          </p:cNvPr>
+          <p:cNvSpPr txBox="1">
+            <a:spLocks/>
+          </p:cNvSpPr>
+          <p:nvPr/>
+        </p:nvSpPr>
+        <p:spPr>
+          <a:xfrm>
+            <a:off x="162339" y="168347"/>
+            <a:ext cx="10515600" cy="1325563"/>
+          </a:xfrm>
+          <a:prstGeom prst="rect">
+            <a:avLst/>
+          </a:prstGeom>
+        </p:spPr>
+        <p:txBody>
+          <a:bodyPr/>
+          <a:lstStyle>
+            <a:lvl1pPr algn="l" defTabSz="914400" rtl="0" eaLnBrk="1" latinLnBrk="0" hangingPunct="1">
+              <a:lnSpc>
+                <a:spcPct val="90000"/>
+              </a:lnSpc>
+              <a:spcBef>
+                <a:spcPct val="0"/>
+              </a:spcBef>
+              <a:buNone/>
+              <a:defRPr sz="4400" kern="1200">
+                <a:solidFill>
+                  <a:schemeClr val="tx1"/>
+                </a:solidFill>
+                <a:latin typeface="+mj-lt"/>
+                <a:ea typeface="+mj-ea"/>
+                <a:cs typeface="+mj-cs"/>
+              </a:defRPr>
+            </a:lvl1pPr>
+          </a:lstStyle>
+          <a:p>
+            <a:r>
+              <a:rPr lang="en-US" dirty="0"/>
+              <a:t>Age-0 Survival Required For Stability</a:t>
+            </a:r>
+          </a:p>
+        </p:txBody>
+      </p:sp>
+      <p:sp>
+        <p:nvSpPr>
+          <p:cNvPr id="3" name="TextBox 2">
+            <a:extLst>
+              <a:ext uri="{FF2B5EF4-FFF2-40B4-BE49-F238E27FC236}">
+                <a16:creationId xmlns:a16="http://schemas.microsoft.com/office/drawing/2014/main" id="{95E6A193-EBCA-4512-A33D-7071BE08C57C}"/>
+              </a:ext>
+            </a:extLst>
+          </p:cNvPr>
+          <p:cNvSpPr txBox="1"/>
+          <p:nvPr/>
+        </p:nvSpPr>
+        <p:spPr>
+          <a:xfrm>
+            <a:off x="162339" y="749439"/>
+            <a:ext cx="10889974" cy="461665"/>
+          </a:xfrm>
+          <a:prstGeom prst="rect">
+            <a:avLst/>
+          </a:prstGeom>
+          <a:noFill/>
+        </p:spPr>
+        <p:txBody>
+          <a:bodyPr wrap="square" rtlCol="0">
+            <a:spAutoFit/>
+          </a:bodyPr>
+          <a:lstStyle/>
+          <a:p>
+            <a:r>
+              <a:rPr lang="en-US" sz="2400" i="1" dirty="0">
+                <a:latin typeface="+mj-lt"/>
+              </a:rPr>
+              <a:t>Baseline parameter values</a:t>
+            </a:r>
+          </a:p>
+        </p:txBody>
+      </p:sp>
+      <p:graphicFrame>
+        <p:nvGraphicFramePr>
+          <p:cNvPr id="4" name="Table 4">
+            <a:extLst>
+              <a:ext uri="{FF2B5EF4-FFF2-40B4-BE49-F238E27FC236}">
+                <a16:creationId xmlns:a16="http://schemas.microsoft.com/office/drawing/2014/main" id="{ED98F2FE-48ED-4205-B73B-202727D73169}"/>
+              </a:ext>
+            </a:extLst>
+          </p:cNvPr>
+          <p:cNvGraphicFramePr>
+            <a:graphicFrameLocks noGrp="1"/>
+          </p:cNvGraphicFramePr>
+          <p:nvPr/>
+        </p:nvGraphicFramePr>
+        <p:xfrm>
+          <a:off x="457200" y="2455136"/>
+          <a:ext cx="11292840" cy="1183414"/>
+        </p:xfrm>
+        <a:graphic>
+          <a:graphicData uri="http://schemas.openxmlformats.org/drawingml/2006/table">
+            <a:tbl>
+              <a:tblPr firstRow="1" bandRow="1">
+                <a:tableStyleId>{5C22544A-7EE6-4342-B048-85BDC9FD1C3A}</a:tableStyleId>
+              </a:tblPr>
+              <a:tblGrid>
+                <a:gridCol w="5646420">
+                  <a:extLst>
+                    <a:ext uri="{9D8B030D-6E8A-4147-A177-3AD203B41FA5}">
+                      <a16:colId xmlns:a16="http://schemas.microsoft.com/office/drawing/2014/main" val="2461264563"/>
+                    </a:ext>
+                  </a:extLst>
+                </a:gridCol>
+                <a:gridCol w="5646420">
+                  <a:extLst>
+                    <a:ext uri="{9D8B030D-6E8A-4147-A177-3AD203B41FA5}">
+                      <a16:colId xmlns:a16="http://schemas.microsoft.com/office/drawing/2014/main" val="25104632"/>
+                    </a:ext>
+                  </a:extLst>
+                </a:gridCol>
+              </a:tblGrid>
+              <a:tr h="665254">
+                <a:tc>
+                  <a:txBody>
+                    <a:bodyPr/>
+                    <a:lstStyle/>
+                    <a:p>
+                      <a:pPr algn="ctr"/>
+                      <a:r>
+                        <a:rPr lang="en-US" sz="2800" b="1" dirty="0">
+                          <a:solidFill>
+                            <a:schemeClr val="bg1"/>
+                          </a:solidFill>
+                        </a:rPr>
+                        <a:t>JAGS VBGF Baseline Parameters</a:t>
+                      </a:r>
+                    </a:p>
+                  </a:txBody>
+                  <a:tcPr/>
+                </a:tc>
+                <a:tc>
+                  <a:txBody>
+                    <a:bodyPr/>
+                    <a:lstStyle/>
+                    <a:p>
+                      <a:pPr algn="ctr"/>
+                      <a:r>
+                        <a:rPr lang="en-US" sz="2800" b="1" dirty="0">
+                          <a:solidFill>
+                            <a:schemeClr val="bg1"/>
+                          </a:solidFill>
+                        </a:rPr>
+                        <a:t>TMB LN(VBGF) Baseline Parameters</a:t>
+                      </a:r>
+                    </a:p>
+                  </a:txBody>
+                  <a:tcPr/>
+                </a:tc>
+                <a:extLst>
+                  <a:ext uri="{0D108BD9-81ED-4DB2-BD59-A6C34878D82A}">
+                    <a16:rowId xmlns:a16="http://schemas.microsoft.com/office/drawing/2014/main" val="2260726132"/>
+                  </a:ext>
+                </a:extLst>
+              </a:tr>
+              <a:tr h="514350">
+                <a:tc>
+                  <a:txBody>
+                    <a:bodyPr/>
+                    <a:lstStyle/>
+                    <a:p>
+                      <a:pPr algn="ctr"/>
+                      <a:r>
+                        <a:rPr lang="en-US" sz="2800" dirty="0"/>
+                        <a:t>0.000384</a:t>
+                      </a:r>
+                    </a:p>
+                  </a:txBody>
+                  <a:tcPr/>
+                </a:tc>
+                <a:tc>
+                  <a:txBody>
+                    <a:bodyPr/>
+                    <a:lstStyle/>
+                    <a:p>
+                      <a:pPr algn="ctr"/>
+                      <a:r>
+                        <a:rPr lang="en-US" sz="2800" dirty="0"/>
+                        <a:t>0.000507</a:t>
+                      </a:r>
+                    </a:p>
+                  </a:txBody>
+                  <a:tcPr/>
+                </a:tc>
+                <a:extLst>
+                  <a:ext uri="{0D108BD9-81ED-4DB2-BD59-A6C34878D82A}">
+                    <a16:rowId xmlns:a16="http://schemas.microsoft.com/office/drawing/2014/main" val="222958998"/>
+                  </a:ext>
+                </a:extLst>
+              </a:tr>
+            </a:tbl>
+          </a:graphicData>
+        </a:graphic>
+      </p:graphicFrame>
+      <p:sp>
+        <p:nvSpPr>
+          <p:cNvPr id="6" name="TextBox 5">
+            <a:extLst>
+              <a:ext uri="{FF2B5EF4-FFF2-40B4-BE49-F238E27FC236}">
+                <a16:creationId xmlns:a16="http://schemas.microsoft.com/office/drawing/2014/main" id="{FA527780-8E4B-4E08-A165-3A71C35410C7}"/>
+              </a:ext>
+            </a:extLst>
+          </p:cNvPr>
+          <p:cNvSpPr txBox="1"/>
+          <p:nvPr/>
+        </p:nvSpPr>
+        <p:spPr>
+          <a:xfrm>
+            <a:off x="2628900" y="4240530"/>
+            <a:ext cx="9121140" cy="830997"/>
+          </a:xfrm>
+          <a:prstGeom prst="rect">
+            <a:avLst/>
+          </a:prstGeom>
+          <a:noFill/>
+        </p:spPr>
+        <p:txBody>
+          <a:bodyPr wrap="square" rtlCol="0">
+            <a:spAutoFit/>
+          </a:bodyPr>
+          <a:lstStyle/>
+          <a:p>
+            <a:r>
+              <a:rPr lang="en-US" sz="2400" dirty="0">
+                <a:solidFill>
+                  <a:srgbClr val="FF0000"/>
+                </a:solidFill>
+              </a:rPr>
+              <a:t>Falls within the Pine et al. (2001) estimate of 0.0000-0.0004 for gulf sturgeon.</a:t>
+            </a:r>
+          </a:p>
+        </p:txBody>
+      </p:sp>
+      <p:cxnSp>
+        <p:nvCxnSpPr>
+          <p:cNvPr id="8" name="Straight Arrow Connector 7">
+            <a:extLst>
+              <a:ext uri="{FF2B5EF4-FFF2-40B4-BE49-F238E27FC236}">
+                <a16:creationId xmlns:a16="http://schemas.microsoft.com/office/drawing/2014/main" id="{AC5C6B4C-011F-4132-914A-4007DADAE5DC}"/>
+              </a:ext>
+            </a:extLst>
+          </p:cNvPr>
+          <p:cNvCxnSpPr/>
+          <p:nvPr/>
+        </p:nvCxnSpPr>
+        <p:spPr>
+          <a:xfrm flipV="1">
+            <a:off x="2994660" y="3638550"/>
+            <a:ext cx="0" cy="601980"/>
+          </a:xfrm>
+          <a:prstGeom prst="straightConnector1">
+            <a:avLst/>
+          </a:prstGeom>
+          <a:ln w="38100">
+            <a:solidFill>
+              <a:srgbClr val="FF0000"/>
+            </a:solidFill>
+            <a:tailEnd type="triangle"/>
+          </a:ln>
+        </p:spPr>
+        <p:style>
+          <a:lnRef idx="1">
+            <a:schemeClr val="accent1"/>
+          </a:lnRef>
+          <a:fillRef idx="0">
+            <a:schemeClr val="accent1"/>
+          </a:fillRef>
+          <a:effectRef idx="0">
+            <a:schemeClr val="accent1"/>
+          </a:effectRef>
+          <a:fontRef idx="minor">
+            <a:schemeClr val="tx1"/>
+          </a:fontRef>
+        </p:style>
+      </p:cxnSp>
+    </p:spTree>
+    <p:extLst>
+      <p:ext uri="{BB962C8B-B14F-4D97-AF65-F5344CB8AC3E}">
+        <p14:creationId xmlns:p14="http://schemas.microsoft.com/office/powerpoint/2010/main" val="4008593779"/>
+      </p:ext>
+    </p:extLst>
+  </p:cSld>
+  <p:clrMapOvr>
+    <a:masterClrMapping/>
+  </p:clrMapOvr>
+</p:sld>
+</file>
+
+<file path=ppt/slides/slide21.xml><?xml version="1.0" encoding="utf-8"?>
+<p:sld xmlns:a="http://schemas.openxmlformats.org/drawingml/2006/main" xmlns:r="http://schemas.openxmlformats.org/officeDocument/2006/relationships" xmlns:p="http://schemas.openxmlformats.org/presentationml/2006/main">
+  <p:cSld>
+    <p:spTree>
+      <p:nvGrpSpPr>
+        <p:cNvPr id="1" name=""/>
+        <p:cNvGrpSpPr/>
+        <p:nvPr/>
+      </p:nvGrpSpPr>
+      <p:grpSpPr>
+        <a:xfrm>
+          <a:off x="0" y="0"/>
+          <a:ext cx="0" cy="0"/>
+          <a:chOff x="0" y="0"/>
+          <a:chExt cx="0" cy="0"/>
+        </a:xfrm>
+      </p:grpSpPr>
+      <p:sp>
+        <p:nvSpPr>
+          <p:cNvPr id="4" name="Title 1">
+            <a:extLst>
+              <a:ext uri="{FF2B5EF4-FFF2-40B4-BE49-F238E27FC236}">
+                <a16:creationId xmlns:a16="http://schemas.microsoft.com/office/drawing/2014/main" id="{45A8D1A3-9F27-4A9D-B544-4B9CB65E7980}"/>
+              </a:ext>
+            </a:extLst>
+          </p:cNvPr>
+          <p:cNvSpPr txBox="1">
+            <a:spLocks/>
+          </p:cNvSpPr>
+          <p:nvPr/>
+        </p:nvSpPr>
+        <p:spPr>
+          <a:xfrm>
+            <a:off x="162339" y="168347"/>
+            <a:ext cx="10515600" cy="1325563"/>
+          </a:xfrm>
+          <a:prstGeom prst="rect">
+            <a:avLst/>
+          </a:prstGeom>
+        </p:spPr>
+        <p:txBody>
+          <a:bodyPr/>
+          <a:lstStyle>
+            <a:lvl1pPr algn="l" defTabSz="914400" rtl="0" eaLnBrk="1" latinLnBrk="0" hangingPunct="1">
+              <a:lnSpc>
+                <a:spcPct val="90000"/>
+              </a:lnSpc>
+              <a:spcBef>
+                <a:spcPct val="0"/>
+              </a:spcBef>
+              <a:buNone/>
+              <a:defRPr sz="4400" kern="1200">
+                <a:solidFill>
+                  <a:schemeClr val="tx1"/>
+                </a:solidFill>
+                <a:latin typeface="+mj-lt"/>
+                <a:ea typeface="+mj-ea"/>
+                <a:cs typeface="+mj-cs"/>
+              </a:defRPr>
+            </a:lvl1pPr>
+          </a:lstStyle>
+          <a:p>
+            <a:r>
+              <a:rPr lang="en-US" dirty="0"/>
+              <a:t>Growth-Decline Boundaries</a:t>
+            </a:r>
+          </a:p>
+        </p:txBody>
+      </p:sp>
+      <p:sp>
+        <p:nvSpPr>
+          <p:cNvPr id="5" name="TextBox 4">
+            <a:extLst>
+              <a:ext uri="{FF2B5EF4-FFF2-40B4-BE49-F238E27FC236}">
+                <a16:creationId xmlns:a16="http://schemas.microsoft.com/office/drawing/2014/main" id="{79512BD1-F98D-401A-8E57-C64B686EAA8F}"/>
+              </a:ext>
+            </a:extLst>
+          </p:cNvPr>
+          <p:cNvSpPr txBox="1"/>
+          <p:nvPr/>
+        </p:nvSpPr>
+        <p:spPr>
+          <a:xfrm>
+            <a:off x="162339" y="749439"/>
+            <a:ext cx="10889974" cy="830997"/>
+          </a:xfrm>
+          <a:prstGeom prst="rect">
+            <a:avLst/>
+          </a:prstGeom>
+          <a:noFill/>
+        </p:spPr>
+        <p:txBody>
+          <a:bodyPr wrap="square" rtlCol="0">
+            <a:spAutoFit/>
+          </a:bodyPr>
+          <a:lstStyle/>
+          <a:p>
+            <a:r>
+              <a:rPr lang="en-US" sz="2400" i="1" dirty="0">
+                <a:latin typeface="+mj-lt"/>
+              </a:rPr>
+              <a:t>Age-0 and Age-1 Survival Combinations Above and to the Right of the Curves Support Population Growth (assuming baseline parameter values for all other variables)</a:t>
+            </a:r>
+          </a:p>
+        </p:txBody>
+      </p:sp>
+      <p:grpSp>
+        <p:nvGrpSpPr>
+          <p:cNvPr id="11" name="Group 10">
+            <a:extLst>
+              <a:ext uri="{FF2B5EF4-FFF2-40B4-BE49-F238E27FC236}">
+                <a16:creationId xmlns:a16="http://schemas.microsoft.com/office/drawing/2014/main" id="{B0BC9E44-356D-42AB-A618-577835211340}"/>
+              </a:ext>
+            </a:extLst>
+          </p:cNvPr>
+          <p:cNvGrpSpPr/>
+          <p:nvPr/>
+        </p:nvGrpSpPr>
+        <p:grpSpPr>
+          <a:xfrm>
+            <a:off x="586195" y="1585587"/>
+            <a:ext cx="11019611" cy="5207691"/>
+            <a:chOff x="586195" y="1585587"/>
+            <a:chExt cx="11019611" cy="5207691"/>
+          </a:xfrm>
+        </p:grpSpPr>
+        <p:pic>
+          <p:nvPicPr>
+            <p:cNvPr id="9" name="Picture 8" descr="Chart, histogram&#10;&#10;Description automatically generated with medium confidence">
+              <a:extLst>
+                <a:ext uri="{FF2B5EF4-FFF2-40B4-BE49-F238E27FC236}">
+                  <a16:creationId xmlns:a16="http://schemas.microsoft.com/office/drawing/2014/main" id="{429AAD87-177D-4439-AB5F-41722C6D5E29}"/>
+                </a:ext>
+              </a:extLst>
+            </p:cNvPr>
+            <p:cNvPicPr>
+              <a:picLocks noChangeAspect="1"/>
+            </p:cNvPicPr>
+            <p:nvPr/>
+          </p:nvPicPr>
+          <p:blipFill rotWithShape="1">
+            <a:blip r:embed="rId2">
+              <a:extLst>
+                <a:ext uri="{28A0092B-C50C-407E-A947-70E740481C1C}">
+                  <a14:useLocalDpi xmlns:a14="http://schemas.microsoft.com/office/drawing/2010/main" val="0"/>
+                </a:ext>
+              </a:extLst>
+            </a:blip>
+            <a:srcRect t="10949" r="2117" b="9438"/>
+            <a:stretch/>
+          </p:blipFill>
+          <p:spPr>
+            <a:xfrm>
+              <a:off x="586195" y="1585587"/>
+              <a:ext cx="11019611" cy="5207691"/>
+            </a:xfrm>
+            <a:prstGeom prst="rect">
+              <a:avLst/>
+            </a:prstGeom>
+          </p:spPr>
+        </p:pic>
+        <p:sp>
+          <p:nvSpPr>
+            <p:cNvPr id="10" name="TextBox 9">
+              <a:extLst>
+                <a:ext uri="{FF2B5EF4-FFF2-40B4-BE49-F238E27FC236}">
+                  <a16:creationId xmlns:a16="http://schemas.microsoft.com/office/drawing/2014/main" id="{64A2C418-B44B-4F48-A4C8-F8D04C59956B}"/>
+                </a:ext>
+              </a:extLst>
+            </p:cNvPr>
+            <p:cNvSpPr txBox="1"/>
+            <p:nvPr/>
+          </p:nvSpPr>
+          <p:spPr>
+            <a:xfrm>
+              <a:off x="7365772" y="4103370"/>
+              <a:ext cx="4041367" cy="338554"/>
+            </a:xfrm>
+            <a:prstGeom prst="rect">
+              <a:avLst/>
+            </a:prstGeom>
+            <a:noFill/>
+          </p:spPr>
+          <p:txBody>
+            <a:bodyPr wrap="square" rtlCol="0">
+              <a:spAutoFit/>
+            </a:bodyPr>
+            <a:lstStyle/>
+            <a:p>
+              <a:r>
+                <a:rPr lang="en-US" sz="1600" dirty="0">
+                  <a:solidFill>
+                    <a:schemeClr val="bg1">
+                      <a:lumMod val="75000"/>
+                    </a:schemeClr>
+                  </a:solidFill>
+                </a:rPr>
+                <a:t>Age-0 Survival Upper Bound (Pine et al. 2001)</a:t>
+              </a:r>
+            </a:p>
+          </p:txBody>
+        </p:sp>
+      </p:grpSp>
+    </p:spTree>
+    <p:extLst>
+      <p:ext uri="{BB962C8B-B14F-4D97-AF65-F5344CB8AC3E}">
+        <p14:creationId xmlns:p14="http://schemas.microsoft.com/office/powerpoint/2010/main" val="131759108"/>
       </p:ext>
     </p:extLst>
   </p:cSld>

</xml_diff>

<commit_message>
gamma, fecundity, and figure updates
</commit_message>
<xml_diff>
--- a/documents/Parameterization.pptx
+++ b/documents/Parameterization.pptx
@@ -22,10 +22,15 @@
     <p:sldId id="380" r:id="rId16"/>
     <p:sldId id="382" r:id="rId17"/>
     <p:sldId id="383" r:id="rId18"/>
-    <p:sldId id="384" r:id="rId19"/>
-    <p:sldId id="381" r:id="rId20"/>
-    <p:sldId id="385" r:id="rId21"/>
-    <p:sldId id="386" r:id="rId22"/>
+    <p:sldId id="389" r:id="rId19"/>
+    <p:sldId id="390" r:id="rId20"/>
+    <p:sldId id="384" r:id="rId21"/>
+    <p:sldId id="391" r:id="rId22"/>
+    <p:sldId id="381" r:id="rId23"/>
+    <p:sldId id="385" r:id="rId24"/>
+    <p:sldId id="386" r:id="rId25"/>
+    <p:sldId id="387" r:id="rId26"/>
+    <p:sldId id="388" r:id="rId27"/>
   </p:sldIdLst>
   <p:sldSz cx="12192000" cy="6858000"/>
   <p:notesSz cx="6858000" cy="9144000"/>
@@ -3832,10 +3837,10 @@
       </p:grpSpPr>
       <p:pic>
         <p:nvPicPr>
-          <p:cNvPr id="3" name="Picture 2" descr="Chart, histogram&#10;&#10;Description automatically generated">
-            <a:extLst>
-              <a:ext uri="{FF2B5EF4-FFF2-40B4-BE49-F238E27FC236}">
-                <a16:creationId xmlns:a16="http://schemas.microsoft.com/office/drawing/2014/main" id="{3C38B377-2F1C-4FE6-B736-3785E28B9E27}"/>
+          <p:cNvPr id="4" name="Picture 3" descr="Chart, histogram&#10;&#10;Description automatically generated">
+            <a:extLst>
+              <a:ext uri="{FF2B5EF4-FFF2-40B4-BE49-F238E27FC236}">
+                <a16:creationId xmlns:a16="http://schemas.microsoft.com/office/drawing/2014/main" id="{2F1EF06C-D0CD-42B7-B99D-2B6F92099FCA}"/>
               </a:ext>
             </a:extLst>
           </p:cNvPr>
@@ -3858,8 +3863,8 @@
         </p:blipFill>
         <p:spPr>
           <a:xfrm>
-            <a:off x="1064142" y="921609"/>
-            <a:ext cx="10063716" cy="5847345"/>
+            <a:off x="838200" y="748096"/>
+            <a:ext cx="10515600" cy="6109904"/>
           </a:xfrm>
           <a:prstGeom prst="rect">
             <a:avLst/>
@@ -4454,43 +4459,244 @@
           </a:p>
         </p:txBody>
       </p:sp>
-      <p:sp>
-        <p:nvSpPr>
-          <p:cNvPr id="6" name="TextBox 5">
-            <a:extLst>
-              <a:ext uri="{FF2B5EF4-FFF2-40B4-BE49-F238E27FC236}">
-                <a16:creationId xmlns:a16="http://schemas.microsoft.com/office/drawing/2014/main" id="{56493F0E-42C5-485A-AE9D-0692A6596CEA}"/>
-              </a:ext>
-            </a:extLst>
-          </p:cNvPr>
-          <p:cNvSpPr txBox="1"/>
-          <p:nvPr/>
-        </p:nvSpPr>
-        <p:spPr>
-          <a:xfrm>
-            <a:off x="162339" y="749439"/>
-            <a:ext cx="9233452" cy="461665"/>
-          </a:xfrm>
-          <a:prstGeom prst="rect">
-            <a:avLst/>
-          </a:prstGeom>
-          <a:noFill/>
-        </p:spPr>
-        <p:txBody>
-          <a:bodyPr wrap="square" rtlCol="0">
-            <a:spAutoFit/>
-          </a:bodyPr>
-          <a:lstStyle/>
-          <a:p>
-            <a:r>
-              <a:rPr lang="en-US" sz="2400" i="1" dirty="0">
-                <a:latin typeface="+mj-lt"/>
-              </a:rPr>
-              <a:t>Expected eggs per female by age</a:t>
-            </a:r>
-          </a:p>
-        </p:txBody>
-      </p:sp>
+      <mc:AlternateContent xmlns:mc="http://schemas.openxmlformats.org/markup-compatibility/2006">
+        <mc:Choice xmlns:a14="http://schemas.microsoft.com/office/drawing/2010/main" Requires="a14">
+          <p:sp>
+            <p:nvSpPr>
+              <p:cNvPr id="6" name="TextBox 5">
+                <a:extLst>
+                  <a:ext uri="{FF2B5EF4-FFF2-40B4-BE49-F238E27FC236}">
+                    <a16:creationId xmlns:a16="http://schemas.microsoft.com/office/drawing/2014/main" id="{56493F0E-42C5-485A-AE9D-0692A6596CEA}"/>
+                  </a:ext>
+                </a:extLst>
+              </p:cNvPr>
+              <p:cNvSpPr txBox="1"/>
+              <p:nvPr/>
+            </p:nvSpPr>
+            <p:spPr>
+              <a:xfrm>
+                <a:off x="162339" y="749439"/>
+                <a:ext cx="9233452" cy="461665"/>
+              </a:xfrm>
+              <a:prstGeom prst="rect">
+                <a:avLst/>
+              </a:prstGeom>
+              <a:noFill/>
+            </p:spPr>
+            <p:txBody>
+              <a:bodyPr wrap="square" rtlCol="0">
+                <a:spAutoFit/>
+              </a:bodyPr>
+              <a:lstStyle/>
+              <a:p>
+                <a:r>
+                  <a:rPr lang="en-US" sz="2400" i="1" dirty="0">
+                    <a:latin typeface="+mj-lt"/>
+                  </a:rPr>
+                  <a:t>Expected eggs per female by age:         </a:t>
+                </a:r>
+                <a14:m>
+                  <m:oMath xmlns:m="http://schemas.openxmlformats.org/officeDocument/2006/math">
+                    <m:sSub>
+                      <m:sSubPr>
+                        <m:ctrlPr>
+                          <a:rPr lang="en-US" sz="2400" i="1" smtClean="0">
+                            <a:solidFill>
+                              <a:srgbClr val="836967"/>
+                            </a:solidFill>
+                            <a:latin typeface="Cambria Math" panose="02040503050406030204" pitchFamily="18" charset="0"/>
+                          </a:rPr>
+                        </m:ctrlPr>
+                      </m:sSubPr>
+                      <m:e>
+                        <m:r>
+                          <a:rPr lang="en-US" sz="2400" i="1">
+                            <a:latin typeface="Cambria Math" panose="02040503050406030204" pitchFamily="18" charset="0"/>
+                          </a:rPr>
+                          <m:t>𝜓</m:t>
+                        </m:r>
+                      </m:e>
+                      <m:sub>
+                        <m:r>
+                          <a:rPr lang="en-US" sz="2400" i="1">
+                            <a:latin typeface="Cambria Math" panose="02040503050406030204" pitchFamily="18" charset="0"/>
+                          </a:rPr>
+                          <m:t>𝑖</m:t>
+                        </m:r>
+                      </m:sub>
+                    </m:sSub>
+                    <m:d>
+                      <m:dPr>
+                        <m:sepChr m:val=","/>
+                        <m:ctrlPr>
+                          <a:rPr lang="en-US" sz="2400" i="1">
+                            <a:latin typeface="Cambria Math" panose="02040503050406030204" pitchFamily="18" charset="0"/>
+                          </a:rPr>
+                        </m:ctrlPr>
+                      </m:dPr>
+                      <m:e>
+                        <m:sSub>
+                          <m:sSubPr>
+                            <m:ctrlPr>
+                              <a:rPr lang="en-US" sz="2400" i="1">
+                                <a:solidFill>
+                                  <a:srgbClr val="836967"/>
+                                </a:solidFill>
+                                <a:latin typeface="Cambria Math" panose="02040503050406030204" pitchFamily="18" charset="0"/>
+                              </a:rPr>
+                            </m:ctrlPr>
+                          </m:sSubPr>
+                          <m:e>
+                            <m:r>
+                              <a:rPr lang="en-US" sz="2400" i="1">
+                                <a:latin typeface="Cambria Math" panose="02040503050406030204" pitchFamily="18" charset="0"/>
+                              </a:rPr>
+                              <m:t>𝑚</m:t>
+                            </m:r>
+                          </m:e>
+                          <m:sub>
+                            <m:r>
+                              <a:rPr lang="en-US" sz="2400" i="1">
+                                <a:latin typeface="Cambria Math" panose="02040503050406030204" pitchFamily="18" charset="0"/>
+                              </a:rPr>
+                              <m:t>𝑖</m:t>
+                            </m:r>
+                          </m:sub>
+                        </m:sSub>
+                      </m:e>
+                      <m:e>
+                        <m:sSub>
+                          <m:sSubPr>
+                            <m:ctrlPr>
+                              <a:rPr lang="en-US" sz="2400" i="1">
+                                <a:solidFill>
+                                  <a:srgbClr val="836967"/>
+                                </a:solidFill>
+                                <a:latin typeface="Cambria Math" panose="02040503050406030204" pitchFamily="18" charset="0"/>
+                              </a:rPr>
+                            </m:ctrlPr>
+                          </m:sSubPr>
+                          <m:e>
+                            <m:r>
+                              <a:rPr lang="en-US" sz="2400" i="1">
+                                <a:latin typeface="Cambria Math" panose="02040503050406030204" pitchFamily="18" charset="0"/>
+                              </a:rPr>
+                              <m:t>𝑝</m:t>
+                            </m:r>
+                          </m:e>
+                          <m:sub>
+                            <m:r>
+                              <a:rPr lang="en-US" sz="2400" i="1">
+                                <a:latin typeface="Cambria Math" panose="02040503050406030204" pitchFamily="18" charset="0"/>
+                              </a:rPr>
+                              <m:t>𝜏</m:t>
+                            </m:r>
+                          </m:sub>
+                        </m:sSub>
+                      </m:e>
+                    </m:d>
+                    <m:r>
+                      <a:rPr lang="en-US" sz="2400" i="1" smtClean="0">
+                        <a:latin typeface="Cambria Math" panose="02040503050406030204" pitchFamily="18" charset="0"/>
+                        <a:ea typeface="Cambria Math" panose="02040503050406030204" pitchFamily="18" charset="0"/>
+                      </a:rPr>
+                      <m:t>∙</m:t>
+                    </m:r>
+                    <m:r>
+                      <a:rPr lang="en-US" sz="2400" i="1" smtClean="0">
+                        <a:latin typeface="Cambria Math" panose="02040503050406030204" pitchFamily="18" charset="0"/>
+                        <a:ea typeface="Cambria Math" panose="02040503050406030204" pitchFamily="18" charset="0"/>
+                      </a:rPr>
+                      <m:t>𝛾</m:t>
+                    </m:r>
+                    <m:r>
+                      <a:rPr lang="en-US" sz="2400" i="0">
+                        <a:latin typeface="Cambria Math" panose="02040503050406030204" pitchFamily="18" charset="0"/>
+                      </a:rPr>
+                      <m:t>∙</m:t>
+                    </m:r>
+                    <m:sSub>
+                      <m:sSubPr>
+                        <m:ctrlPr>
+                          <a:rPr lang="en-US" sz="2400" i="1">
+                            <a:solidFill>
+                              <a:srgbClr val="836967"/>
+                            </a:solidFill>
+                            <a:latin typeface="Cambria Math" panose="02040503050406030204" pitchFamily="18" charset="0"/>
+                          </a:rPr>
+                        </m:ctrlPr>
+                      </m:sSubPr>
+                      <m:e>
+                        <m:r>
+                          <a:rPr lang="en-US" sz="2400" i="1">
+                            <a:latin typeface="Cambria Math" panose="02040503050406030204" pitchFamily="18" charset="0"/>
+                          </a:rPr>
+                          <m:t>𝐸</m:t>
+                        </m:r>
+                      </m:e>
+                      <m:sub>
+                        <m:r>
+                          <a:rPr lang="en-US" sz="2400" i="1">
+                            <a:latin typeface="Cambria Math" panose="02040503050406030204" pitchFamily="18" charset="0"/>
+                          </a:rPr>
+                          <m:t>𝑖</m:t>
+                        </m:r>
+                      </m:sub>
+                    </m:sSub>
+                  </m:oMath>
+                </a14:m>
+                <a:endParaRPr lang="en-US" sz="2400" i="1" dirty="0">
+                  <a:latin typeface="+mj-lt"/>
+                </a:endParaRPr>
+              </a:p>
+            </p:txBody>
+          </p:sp>
+        </mc:Choice>
+        <mc:Fallback>
+          <p:sp>
+            <p:nvSpPr>
+              <p:cNvPr id="6" name="TextBox 5">
+                <a:extLst>
+                  <a:ext uri="{FF2B5EF4-FFF2-40B4-BE49-F238E27FC236}">
+                    <a16:creationId xmlns:a16="http://schemas.microsoft.com/office/drawing/2014/main" id="{56493F0E-42C5-485A-AE9D-0692A6596CEA}"/>
+                  </a:ext>
+                </a:extLst>
+              </p:cNvPr>
+              <p:cNvSpPr txBox="1">
+                <a:spLocks noRot="1" noChangeAspect="1" noMove="1" noResize="1" noEditPoints="1" noAdjustHandles="1" noChangeArrowheads="1" noChangeShapeType="1" noTextEdit="1"/>
+              </p:cNvSpPr>
+              <p:nvPr/>
+            </p:nvSpPr>
+            <p:spPr>
+              <a:xfrm>
+                <a:off x="162339" y="749439"/>
+                <a:ext cx="9233452" cy="461665"/>
+              </a:xfrm>
+              <a:prstGeom prst="rect">
+                <a:avLst/>
+              </a:prstGeom>
+              <a:blipFill>
+                <a:blip r:embed="rId3"/>
+                <a:stretch>
+                  <a:fillRect l="-1057" t="-10526" b="-28947"/>
+                </a:stretch>
+              </a:blipFill>
+            </p:spPr>
+            <p:txBody>
+              <a:bodyPr/>
+              <a:lstStyle/>
+              <a:p>
+                <a:r>
+                  <a:rPr lang="en-US">
+                    <a:noFill/>
+                  </a:rPr>
+                  <a:t> </a:t>
+                </a:r>
+              </a:p>
+            </p:txBody>
+          </p:sp>
+        </mc:Fallback>
+      </mc:AlternateContent>
     </p:spTree>
     <p:extLst>
       <p:ext uri="{BB962C8B-B14F-4D97-AF65-F5344CB8AC3E}">
@@ -4963,6 +5169,42 @@
           <a:chExt cx="0" cy="0"/>
         </a:xfrm>
       </p:grpSpPr>
+      <p:pic>
+        <p:nvPicPr>
+          <p:cNvPr id="5" name="Picture 4" descr="Chart&#10;&#10;Description automatically generated">
+            <a:extLst>
+              <a:ext uri="{FF2B5EF4-FFF2-40B4-BE49-F238E27FC236}">
+                <a16:creationId xmlns:a16="http://schemas.microsoft.com/office/drawing/2014/main" id="{17D55A07-11F8-4082-A1FB-472C4FF4DBCC}"/>
+              </a:ext>
+            </a:extLst>
+          </p:cNvPr>
+          <p:cNvPicPr>
+            <a:picLocks noChangeAspect="1"/>
+          </p:cNvPicPr>
+          <p:nvPr/>
+        </p:nvPicPr>
+        <p:blipFill>
+          <a:blip r:embed="rId2">
+            <a:extLst>
+              <a:ext uri="{28A0092B-C50C-407E-A947-70E740481C1C}">
+                <a14:useLocalDpi xmlns:a14="http://schemas.microsoft.com/office/drawing/2010/main" val="0"/>
+              </a:ext>
+            </a:extLst>
+          </a:blip>
+          <a:stretch>
+            <a:fillRect/>
+          </a:stretch>
+        </p:blipFill>
+        <p:spPr>
+          <a:xfrm>
+            <a:off x="282209" y="617626"/>
+            <a:ext cx="11627583" cy="6072027"/>
+          </a:xfrm>
+          <a:prstGeom prst="rect">
+            <a:avLst/>
+          </a:prstGeom>
+        </p:spPr>
+      </p:pic>
       <p:sp>
         <p:nvSpPr>
           <p:cNvPr id="8" name="Title 1">
@@ -5029,6 +5271,906 @@
         </p:nvSpPr>
         <p:spPr>
           <a:xfrm>
+            <a:off x="162339" y="749439"/>
+            <a:ext cx="10889974" cy="461665"/>
+          </a:xfrm>
+          <a:prstGeom prst="rect">
+            <a:avLst/>
+          </a:prstGeom>
+          <a:noFill/>
+        </p:spPr>
+        <p:txBody>
+          <a:bodyPr wrap="square" rtlCol="0">
+            <a:spAutoFit/>
+          </a:bodyPr>
+          <a:lstStyle/>
+          <a:p>
+            <a:r>
+              <a:rPr lang="en-US" sz="2400" i="1" dirty="0">
+                <a:latin typeface="+mj-lt"/>
+              </a:rPr>
+              <a:t>One-way sensitivity values:  change in long-term lambda with a unit parameter change</a:t>
+            </a:r>
+          </a:p>
+        </p:txBody>
+      </p:sp>
+      <p:sp>
+        <p:nvSpPr>
+          <p:cNvPr id="2" name="TextBox 1">
+            <a:extLst>
+              <a:ext uri="{FF2B5EF4-FFF2-40B4-BE49-F238E27FC236}">
+                <a16:creationId xmlns:a16="http://schemas.microsoft.com/office/drawing/2014/main" id="{744A940D-517D-43B3-985D-2FA1691934C1}"/>
+              </a:ext>
+            </a:extLst>
+          </p:cNvPr>
+          <p:cNvSpPr txBox="1"/>
+          <p:nvPr/>
+        </p:nvSpPr>
+        <p:spPr>
+          <a:xfrm>
+            <a:off x="1714500" y="1373787"/>
+            <a:ext cx="9452610" cy="430887"/>
+          </a:xfrm>
+          <a:prstGeom prst="rect">
+            <a:avLst/>
+          </a:prstGeom>
+          <a:noFill/>
+        </p:spPr>
+        <p:txBody>
+          <a:bodyPr wrap="square" rtlCol="0">
+            <a:spAutoFit/>
+          </a:bodyPr>
+          <a:lstStyle/>
+          <a:p>
+            <a:r>
+              <a:rPr lang="en-US" sz="2200" dirty="0">
+                <a:solidFill>
+                  <a:srgbClr val="FF0000"/>
+                </a:solidFill>
+              </a:rPr>
+              <a:t>Most sensitive parameter (phi0: age-0 survival) is also the most uncertain!</a:t>
+            </a:r>
+          </a:p>
+        </p:txBody>
+      </p:sp>
+    </p:spTree>
+    <p:extLst>
+      <p:ext uri="{BB962C8B-B14F-4D97-AF65-F5344CB8AC3E}">
+        <p14:creationId xmlns:p14="http://schemas.microsoft.com/office/powerpoint/2010/main" val="3151947403"/>
+      </p:ext>
+    </p:extLst>
+  </p:cSld>
+  <p:clrMapOvr>
+    <a:masterClrMapping/>
+  </p:clrMapOvr>
+</p:sld>
+</file>
+
+<file path=ppt/slides/slide19.xml><?xml version="1.0" encoding="utf-8"?>
+<p:sld xmlns:a="http://schemas.openxmlformats.org/drawingml/2006/main" xmlns:r="http://schemas.openxmlformats.org/officeDocument/2006/relationships" xmlns:p="http://schemas.openxmlformats.org/presentationml/2006/main">
+  <p:cSld>
+    <p:spTree>
+      <p:nvGrpSpPr>
+        <p:cNvPr id="1" name=""/>
+        <p:cNvGrpSpPr/>
+        <p:nvPr/>
+      </p:nvGrpSpPr>
+      <p:grpSpPr>
+        <a:xfrm>
+          <a:off x="0" y="0"/>
+          <a:ext cx="0" cy="0"/>
+          <a:chOff x="0" y="0"/>
+          <a:chExt cx="0" cy="0"/>
+        </a:xfrm>
+      </p:grpSpPr>
+      <p:pic>
+        <p:nvPicPr>
+          <p:cNvPr id="5" name="Picture 4" descr="Chart&#10;&#10;Description automatically generated">
+            <a:extLst>
+              <a:ext uri="{FF2B5EF4-FFF2-40B4-BE49-F238E27FC236}">
+                <a16:creationId xmlns:a16="http://schemas.microsoft.com/office/drawing/2014/main" id="{17D55A07-11F8-4082-A1FB-472C4FF4DBCC}"/>
+              </a:ext>
+            </a:extLst>
+          </p:cNvPr>
+          <p:cNvPicPr>
+            <a:picLocks noChangeAspect="1"/>
+          </p:cNvPicPr>
+          <p:nvPr/>
+        </p:nvPicPr>
+        <p:blipFill>
+          <a:blip r:embed="rId2">
+            <a:extLst>
+              <a:ext uri="{28A0092B-C50C-407E-A947-70E740481C1C}">
+                <a14:useLocalDpi xmlns:a14="http://schemas.microsoft.com/office/drawing/2010/main" val="0"/>
+              </a:ext>
+            </a:extLst>
+          </a:blip>
+          <a:stretch>
+            <a:fillRect/>
+          </a:stretch>
+        </p:blipFill>
+        <p:spPr>
+          <a:xfrm>
+            <a:off x="282209" y="617626"/>
+            <a:ext cx="11627583" cy="6072027"/>
+          </a:xfrm>
+          <a:prstGeom prst="rect">
+            <a:avLst/>
+          </a:prstGeom>
+        </p:spPr>
+      </p:pic>
+      <p:sp>
+        <p:nvSpPr>
+          <p:cNvPr id="8" name="Title 1">
+            <a:extLst>
+              <a:ext uri="{FF2B5EF4-FFF2-40B4-BE49-F238E27FC236}">
+                <a16:creationId xmlns:a16="http://schemas.microsoft.com/office/drawing/2014/main" id="{D2CB5ABF-396D-4B7F-9444-C39CCAE82489}"/>
+              </a:ext>
+            </a:extLst>
+          </p:cNvPr>
+          <p:cNvSpPr txBox="1">
+            <a:spLocks/>
+          </p:cNvSpPr>
+          <p:nvPr/>
+        </p:nvSpPr>
+        <p:spPr>
+          <a:xfrm>
+            <a:off x="162339" y="168347"/>
+            <a:ext cx="10515600" cy="1325563"/>
+          </a:xfrm>
+          <a:prstGeom prst="rect">
+            <a:avLst/>
+          </a:prstGeom>
+        </p:spPr>
+        <p:txBody>
+          <a:bodyPr/>
+          <a:lstStyle>
+            <a:lvl1pPr algn="l" defTabSz="914400" rtl="0" eaLnBrk="1" latinLnBrk="0" hangingPunct="1">
+              <a:lnSpc>
+                <a:spcPct val="90000"/>
+              </a:lnSpc>
+              <a:spcBef>
+                <a:spcPct val="0"/>
+              </a:spcBef>
+              <a:buNone/>
+              <a:defRPr sz="4400" kern="1200">
+                <a:solidFill>
+                  <a:schemeClr val="tx1"/>
+                </a:solidFill>
+                <a:latin typeface="+mj-lt"/>
+                <a:ea typeface="+mj-ea"/>
+                <a:cs typeface="+mj-cs"/>
+              </a:defRPr>
+            </a:lvl1pPr>
+          </a:lstStyle>
+          <a:p>
+            <a:r>
+              <a:rPr lang="en-US" dirty="0"/>
+              <a:t>Sensitivity Analyses</a:t>
+            </a:r>
+          </a:p>
+        </p:txBody>
+      </p:sp>
+      <p:sp>
+        <p:nvSpPr>
+          <p:cNvPr id="6" name="TextBox 5">
+            <a:extLst>
+              <a:ext uri="{FF2B5EF4-FFF2-40B4-BE49-F238E27FC236}">
+                <a16:creationId xmlns:a16="http://schemas.microsoft.com/office/drawing/2014/main" id="{56493F0E-42C5-485A-AE9D-0692A6596CEA}"/>
+              </a:ext>
+            </a:extLst>
+          </p:cNvPr>
+          <p:cNvSpPr txBox="1"/>
+          <p:nvPr/>
+        </p:nvSpPr>
+        <p:spPr>
+          <a:xfrm>
+            <a:off x="162339" y="749439"/>
+            <a:ext cx="10889974" cy="461665"/>
+          </a:xfrm>
+          <a:prstGeom prst="rect">
+            <a:avLst/>
+          </a:prstGeom>
+          <a:noFill/>
+        </p:spPr>
+        <p:txBody>
+          <a:bodyPr wrap="square" rtlCol="0">
+            <a:spAutoFit/>
+          </a:bodyPr>
+          <a:lstStyle/>
+          <a:p>
+            <a:r>
+              <a:rPr lang="en-US" sz="2400" i="1" dirty="0">
+                <a:latin typeface="+mj-lt"/>
+              </a:rPr>
+              <a:t>One-way sensitivity values:  change in long-term lambda with a unit parameter change</a:t>
+            </a:r>
+          </a:p>
+        </p:txBody>
+      </p:sp>
+      <p:sp>
+        <p:nvSpPr>
+          <p:cNvPr id="2" name="TextBox 1">
+            <a:extLst>
+              <a:ext uri="{FF2B5EF4-FFF2-40B4-BE49-F238E27FC236}">
+                <a16:creationId xmlns:a16="http://schemas.microsoft.com/office/drawing/2014/main" id="{744A940D-517D-43B3-985D-2FA1691934C1}"/>
+              </a:ext>
+            </a:extLst>
+          </p:cNvPr>
+          <p:cNvSpPr txBox="1"/>
+          <p:nvPr/>
+        </p:nvSpPr>
+        <p:spPr>
+          <a:xfrm>
+            <a:off x="1714500" y="1373787"/>
+            <a:ext cx="9452610" cy="430887"/>
+          </a:xfrm>
+          <a:prstGeom prst="rect">
+            <a:avLst/>
+          </a:prstGeom>
+          <a:noFill/>
+        </p:spPr>
+        <p:txBody>
+          <a:bodyPr wrap="square" rtlCol="0">
+            <a:spAutoFit/>
+          </a:bodyPr>
+          <a:lstStyle/>
+          <a:p>
+            <a:r>
+              <a:rPr lang="en-US" sz="2200" dirty="0">
+                <a:solidFill>
+                  <a:srgbClr val="FF0000"/>
+                </a:solidFill>
+              </a:rPr>
+              <a:t>Most sensitive parameter (phi0: age-0 survival) is also the most uncertain!</a:t>
+            </a:r>
+          </a:p>
+        </p:txBody>
+      </p:sp>
+      <p:sp>
+        <p:nvSpPr>
+          <p:cNvPr id="3" name="TextBox 2">
+            <a:extLst>
+              <a:ext uri="{FF2B5EF4-FFF2-40B4-BE49-F238E27FC236}">
+                <a16:creationId xmlns:a16="http://schemas.microsoft.com/office/drawing/2014/main" id="{19AA3552-0462-4127-88E4-E0D5654EF30B}"/>
+              </a:ext>
+            </a:extLst>
+          </p:cNvPr>
+          <p:cNvSpPr txBox="1"/>
+          <p:nvPr/>
+        </p:nvSpPr>
+        <p:spPr>
+          <a:xfrm>
+            <a:off x="2468880" y="2983785"/>
+            <a:ext cx="7566660" cy="769441"/>
+          </a:xfrm>
+          <a:prstGeom prst="rect">
+            <a:avLst/>
+          </a:prstGeom>
+          <a:noFill/>
+        </p:spPr>
+        <p:txBody>
+          <a:bodyPr wrap="square" rtlCol="0">
+            <a:spAutoFit/>
+          </a:bodyPr>
+          <a:lstStyle/>
+          <a:p>
+            <a:pPr algn="ctr"/>
+            <a:r>
+              <a:rPr lang="en-US" sz="2200" dirty="0">
+                <a:solidFill>
+                  <a:srgbClr val="FF0000"/>
+                </a:solidFill>
+              </a:rPr>
+              <a:t>Upper River drift study survival estimates and Lower River free-embryo releases aim to reduce uncertainty in this parameter. </a:t>
+            </a:r>
+          </a:p>
+        </p:txBody>
+      </p:sp>
+    </p:spTree>
+    <p:extLst>
+      <p:ext uri="{BB962C8B-B14F-4D97-AF65-F5344CB8AC3E}">
+        <p14:creationId xmlns:p14="http://schemas.microsoft.com/office/powerpoint/2010/main" val="160778024"/>
+      </p:ext>
+    </p:extLst>
+  </p:cSld>
+  <p:clrMapOvr>
+    <a:masterClrMapping/>
+  </p:clrMapOvr>
+</p:sld>
+</file>
+
+<file path=ppt/slides/slide2.xml><?xml version="1.0" encoding="utf-8"?>
+<p:sld xmlns:a="http://schemas.openxmlformats.org/drawingml/2006/main" xmlns:r="http://schemas.openxmlformats.org/officeDocument/2006/relationships" xmlns:p="http://schemas.openxmlformats.org/presentationml/2006/main">
+  <p:cSld>
+    <p:spTree>
+      <p:nvGrpSpPr>
+        <p:cNvPr id="1" name=""/>
+        <p:cNvGrpSpPr/>
+        <p:nvPr/>
+      </p:nvGrpSpPr>
+      <p:grpSpPr>
+        <a:xfrm>
+          <a:off x="0" y="0"/>
+          <a:ext cx="0" cy="0"/>
+          <a:chOff x="0" y="0"/>
+          <a:chExt cx="0" cy="0"/>
+        </a:xfrm>
+      </p:grpSpPr>
+      <p:sp>
+        <p:nvSpPr>
+          <p:cNvPr id="2" name="Title 1">
+            <a:extLst>
+              <a:ext uri="{FF2B5EF4-FFF2-40B4-BE49-F238E27FC236}">
+                <a16:creationId xmlns:a16="http://schemas.microsoft.com/office/drawing/2014/main" id="{2BE7CC5D-DA6E-4A20-AD31-367969AE2B96}"/>
+              </a:ext>
+            </a:extLst>
+          </p:cNvPr>
+          <p:cNvSpPr>
+            <a:spLocks noGrp="1"/>
+          </p:cNvSpPr>
+          <p:nvPr>
+            <p:ph type="title"/>
+          </p:nvPr>
+        </p:nvSpPr>
+        <p:spPr>
+          <a:xfrm>
+            <a:off x="162339" y="111197"/>
+            <a:ext cx="10515600" cy="1325563"/>
+          </a:xfrm>
+        </p:spPr>
+        <p:txBody>
+          <a:bodyPr/>
+          <a:lstStyle/>
+          <a:p>
+            <a:r>
+              <a:rPr lang="en-US" dirty="0"/>
+              <a:t>Leslie Matrix Model</a:t>
+            </a:r>
+          </a:p>
+        </p:txBody>
+      </p:sp>
+      <p:pic>
+        <p:nvPicPr>
+          <p:cNvPr id="3" name="Picture 2">
+            <a:extLst>
+              <a:ext uri="{FF2B5EF4-FFF2-40B4-BE49-F238E27FC236}">
+                <a16:creationId xmlns:a16="http://schemas.microsoft.com/office/drawing/2014/main" id="{D3899401-B9BF-47BF-A0C0-D2E2184B7998}"/>
+              </a:ext>
+            </a:extLst>
+          </p:cNvPr>
+          <p:cNvPicPr>
+            <a:picLocks noChangeAspect="1"/>
+          </p:cNvPicPr>
+          <p:nvPr/>
+        </p:nvPicPr>
+        <p:blipFill>
+          <a:blip r:embed="rId2">
+            <a:extLst>
+              <a:ext uri="{28A0092B-C50C-407E-A947-70E740481C1C}">
+                <a14:useLocalDpi xmlns:a14="http://schemas.microsoft.com/office/drawing/2010/main" val="0"/>
+              </a:ext>
+            </a:extLst>
+          </a:blip>
+          <a:stretch>
+            <a:fillRect/>
+          </a:stretch>
+        </p:blipFill>
+        <p:spPr>
+          <a:xfrm>
+            <a:off x="1897953" y="1526384"/>
+            <a:ext cx="8396094" cy="4342222"/>
+          </a:xfrm>
+          <a:prstGeom prst="rect">
+            <a:avLst/>
+          </a:prstGeom>
+        </p:spPr>
+      </p:pic>
+      <p:sp>
+        <p:nvSpPr>
+          <p:cNvPr id="4" name="TextBox 3">
+            <a:extLst>
+              <a:ext uri="{FF2B5EF4-FFF2-40B4-BE49-F238E27FC236}">
+                <a16:creationId xmlns:a16="http://schemas.microsoft.com/office/drawing/2014/main" id="{D25E3F11-BC93-4034-AAD5-316D62260D3D}"/>
+              </a:ext>
+            </a:extLst>
+          </p:cNvPr>
+          <p:cNvSpPr txBox="1"/>
+          <p:nvPr/>
+        </p:nvSpPr>
+        <p:spPr>
+          <a:xfrm>
+            <a:off x="10029436" y="2410572"/>
+            <a:ext cx="1844842" cy="707886"/>
+          </a:xfrm>
+          <a:prstGeom prst="rect">
+            <a:avLst/>
+          </a:prstGeom>
+          <a:noFill/>
+        </p:spPr>
+        <p:txBody>
+          <a:bodyPr wrap="square" rtlCol="0">
+            <a:spAutoFit/>
+          </a:bodyPr>
+          <a:lstStyle/>
+          <a:p>
+            <a:r>
+              <a:rPr lang="en-US" sz="2000" dirty="0">
+                <a:solidFill>
+                  <a:srgbClr val="0070C0"/>
+                </a:solidFill>
+              </a:rPr>
+              <a:t>Age-Specific Fertilities</a:t>
+            </a:r>
+          </a:p>
+        </p:txBody>
+      </p:sp>
+      <p:sp>
+        <p:nvSpPr>
+          <p:cNvPr id="5" name="Oval 4">
+            <a:extLst>
+              <a:ext uri="{FF2B5EF4-FFF2-40B4-BE49-F238E27FC236}">
+                <a16:creationId xmlns:a16="http://schemas.microsoft.com/office/drawing/2014/main" id="{2A3DD514-E1C0-42F3-B1D0-8D8BCD9ADAED}"/>
+              </a:ext>
+            </a:extLst>
+          </p:cNvPr>
+          <p:cNvSpPr/>
+          <p:nvPr/>
+        </p:nvSpPr>
+        <p:spPr>
+          <a:xfrm>
+            <a:off x="2043626" y="1591332"/>
+            <a:ext cx="7815632" cy="952808"/>
+          </a:xfrm>
+          <a:prstGeom prst="ellipse">
+            <a:avLst/>
+          </a:prstGeom>
+          <a:noFill/>
+          <a:ln w="63500">
+            <a:solidFill>
+              <a:srgbClr val="0070C0"/>
+            </a:solidFill>
+          </a:ln>
+        </p:spPr>
+        <p:style>
+          <a:lnRef idx="2">
+            <a:schemeClr val="accent1">
+              <a:shade val="50000"/>
+            </a:schemeClr>
+          </a:lnRef>
+          <a:fillRef idx="1">
+            <a:schemeClr val="accent1"/>
+          </a:fillRef>
+          <a:effectRef idx="0">
+            <a:schemeClr val="accent1"/>
+          </a:effectRef>
+          <a:fontRef idx="minor">
+            <a:schemeClr val="lt1"/>
+          </a:fontRef>
+        </p:style>
+        <p:txBody>
+          <a:bodyPr rtlCol="0" anchor="ctr"/>
+          <a:lstStyle/>
+          <a:p>
+            <a:pPr algn="ctr"/>
+            <a:endParaRPr lang="en-US"/>
+          </a:p>
+        </p:txBody>
+      </p:sp>
+      <p:sp>
+        <p:nvSpPr>
+          <p:cNvPr id="6" name="Oval 5">
+            <a:extLst>
+              <a:ext uri="{FF2B5EF4-FFF2-40B4-BE49-F238E27FC236}">
+                <a16:creationId xmlns:a16="http://schemas.microsoft.com/office/drawing/2014/main" id="{6F0377FF-3C82-44E4-BC8C-9FA69DE8211E}"/>
+              </a:ext>
+            </a:extLst>
+          </p:cNvPr>
+          <p:cNvSpPr/>
+          <p:nvPr/>
+        </p:nvSpPr>
+        <p:spPr>
+          <a:xfrm rot="1799308">
+            <a:off x="1860713" y="3629741"/>
+            <a:ext cx="7481327" cy="1271901"/>
+          </a:xfrm>
+          <a:prstGeom prst="ellipse">
+            <a:avLst/>
+          </a:prstGeom>
+          <a:noFill/>
+          <a:ln w="63500">
+            <a:solidFill>
+              <a:srgbClr val="0070C0"/>
+            </a:solidFill>
+          </a:ln>
+        </p:spPr>
+        <p:style>
+          <a:lnRef idx="2">
+            <a:schemeClr val="accent1">
+              <a:shade val="50000"/>
+            </a:schemeClr>
+          </a:lnRef>
+          <a:fillRef idx="1">
+            <a:schemeClr val="accent1"/>
+          </a:fillRef>
+          <a:effectRef idx="0">
+            <a:schemeClr val="accent1"/>
+          </a:effectRef>
+          <a:fontRef idx="minor">
+            <a:schemeClr val="lt1"/>
+          </a:fontRef>
+        </p:style>
+        <p:txBody>
+          <a:bodyPr rtlCol="0" anchor="ctr"/>
+          <a:lstStyle/>
+          <a:p>
+            <a:pPr algn="ctr"/>
+            <a:endParaRPr lang="en-US"/>
+          </a:p>
+        </p:txBody>
+      </p:sp>
+      <p:sp>
+        <p:nvSpPr>
+          <p:cNvPr id="7" name="TextBox 6">
+            <a:extLst>
+              <a:ext uri="{FF2B5EF4-FFF2-40B4-BE49-F238E27FC236}">
+                <a16:creationId xmlns:a16="http://schemas.microsoft.com/office/drawing/2014/main" id="{4956CD8B-A1F5-47B5-867C-EAC0CF69B7C4}"/>
+              </a:ext>
+            </a:extLst>
+          </p:cNvPr>
+          <p:cNvSpPr txBox="1"/>
+          <p:nvPr/>
+        </p:nvSpPr>
+        <p:spPr>
+          <a:xfrm>
+            <a:off x="8073420" y="6357197"/>
+            <a:ext cx="2935707" cy="400110"/>
+          </a:xfrm>
+          <a:prstGeom prst="rect">
+            <a:avLst/>
+          </a:prstGeom>
+          <a:noFill/>
+        </p:spPr>
+        <p:txBody>
+          <a:bodyPr wrap="square" rtlCol="0">
+            <a:spAutoFit/>
+          </a:bodyPr>
+          <a:lstStyle/>
+          <a:p>
+            <a:r>
+              <a:rPr lang="en-US" sz="2000" dirty="0">
+                <a:solidFill>
+                  <a:srgbClr val="0070C0"/>
+                </a:solidFill>
+              </a:rPr>
+              <a:t>Age-Specific Survivals</a:t>
+            </a:r>
+          </a:p>
+        </p:txBody>
+      </p:sp>
+      <p:cxnSp>
+        <p:nvCxnSpPr>
+          <p:cNvPr id="8" name="Connector: Curved 7">
+            <a:extLst>
+              <a:ext uri="{FF2B5EF4-FFF2-40B4-BE49-F238E27FC236}">
+                <a16:creationId xmlns:a16="http://schemas.microsoft.com/office/drawing/2014/main" id="{665E52E4-5143-4B7A-8224-77F91DDD6ECC}"/>
+              </a:ext>
+            </a:extLst>
+          </p:cNvPr>
+          <p:cNvCxnSpPr>
+            <a:cxnSpLocks/>
+            <a:stCxn id="4" idx="0"/>
+            <a:endCxn id="5" idx="6"/>
+          </p:cNvCxnSpPr>
+          <p:nvPr/>
+        </p:nvCxnSpPr>
+        <p:spPr>
+          <a:xfrm rot="16200000" flipV="1">
+            <a:off x="10234140" y="1692854"/>
+            <a:ext cx="342836" cy="1092599"/>
+          </a:xfrm>
+          <a:prstGeom prst="curvedConnector2">
+            <a:avLst/>
+          </a:prstGeom>
+          <a:ln w="38100">
+            <a:solidFill>
+              <a:schemeClr val="tx1"/>
+            </a:solidFill>
+            <a:tailEnd type="triangle" w="lg" len="lg"/>
+          </a:ln>
+        </p:spPr>
+        <p:style>
+          <a:lnRef idx="1">
+            <a:schemeClr val="accent1"/>
+          </a:lnRef>
+          <a:fillRef idx="0">
+            <a:schemeClr val="accent1"/>
+          </a:fillRef>
+          <a:effectRef idx="0">
+            <a:schemeClr val="accent1"/>
+          </a:effectRef>
+          <a:fontRef idx="minor">
+            <a:schemeClr val="tx1"/>
+          </a:fontRef>
+        </p:style>
+      </p:cxnSp>
+      <p:cxnSp>
+        <p:nvCxnSpPr>
+          <p:cNvPr id="9" name="Connector: Curved 8">
+            <a:extLst>
+              <a:ext uri="{FF2B5EF4-FFF2-40B4-BE49-F238E27FC236}">
+                <a16:creationId xmlns:a16="http://schemas.microsoft.com/office/drawing/2014/main" id="{079A39A5-071E-4E03-9FDD-1EA6407A0EE0}"/>
+              </a:ext>
+            </a:extLst>
+          </p:cNvPr>
+          <p:cNvCxnSpPr>
+            <a:cxnSpLocks/>
+            <a:stCxn id="7" idx="0"/>
+          </p:cNvCxnSpPr>
+          <p:nvPr/>
+        </p:nvCxnSpPr>
+        <p:spPr>
+          <a:xfrm rot="16200000" flipV="1">
+            <a:off x="8976776" y="5792700"/>
+            <a:ext cx="402532" cy="726463"/>
+          </a:xfrm>
+          <a:prstGeom prst="curvedConnector2">
+            <a:avLst/>
+          </a:prstGeom>
+          <a:ln w="38100">
+            <a:solidFill>
+              <a:schemeClr val="tx1"/>
+            </a:solidFill>
+            <a:tailEnd type="triangle" w="lg" len="lg"/>
+          </a:ln>
+        </p:spPr>
+        <p:style>
+          <a:lnRef idx="1">
+            <a:schemeClr val="accent1"/>
+          </a:lnRef>
+          <a:fillRef idx="0">
+            <a:schemeClr val="accent1"/>
+          </a:fillRef>
+          <a:effectRef idx="0">
+            <a:schemeClr val="accent1"/>
+          </a:effectRef>
+          <a:fontRef idx="minor">
+            <a:schemeClr val="tx1"/>
+          </a:fontRef>
+        </p:style>
+      </p:cxnSp>
+      <p:sp>
+        <p:nvSpPr>
+          <p:cNvPr id="10" name="TextBox 9">
+            <a:extLst>
+              <a:ext uri="{FF2B5EF4-FFF2-40B4-BE49-F238E27FC236}">
+                <a16:creationId xmlns:a16="http://schemas.microsoft.com/office/drawing/2014/main" id="{3D97F565-DAB8-4542-A6F8-07BCE527146D}"/>
+              </a:ext>
+            </a:extLst>
+          </p:cNvPr>
+          <p:cNvSpPr txBox="1"/>
+          <p:nvPr/>
+        </p:nvSpPr>
+        <p:spPr>
+          <a:xfrm>
+            <a:off x="8872299" y="1064318"/>
+            <a:ext cx="1973919" cy="400110"/>
+          </a:xfrm>
+          <a:prstGeom prst="rect">
+            <a:avLst/>
+          </a:prstGeom>
+          <a:noFill/>
+        </p:spPr>
+        <p:txBody>
+          <a:bodyPr wrap="square" rtlCol="0">
+            <a:spAutoFit/>
+          </a:bodyPr>
+          <a:lstStyle/>
+          <a:p>
+            <a:r>
+              <a:rPr lang="en-US" sz="2000" dirty="0">
+                <a:solidFill>
+                  <a:srgbClr val="0070C0"/>
+                </a:solidFill>
+              </a:rPr>
+              <a:t>maximum age</a:t>
+            </a:r>
+            <a:endParaRPr lang="en-US" sz="2000" dirty="0"/>
+          </a:p>
+        </p:txBody>
+      </p:sp>
+      <p:sp>
+        <p:nvSpPr>
+          <p:cNvPr id="11" name="Oval 10">
+            <a:extLst>
+              <a:ext uri="{FF2B5EF4-FFF2-40B4-BE49-F238E27FC236}">
+                <a16:creationId xmlns:a16="http://schemas.microsoft.com/office/drawing/2014/main" id="{0E562867-F833-4954-881E-33D3FA6856F0}"/>
+              </a:ext>
+            </a:extLst>
+          </p:cNvPr>
+          <p:cNvSpPr/>
+          <p:nvPr/>
+        </p:nvSpPr>
+        <p:spPr>
+          <a:xfrm>
+            <a:off x="8569032" y="1962786"/>
+            <a:ext cx="972241" cy="427095"/>
+          </a:xfrm>
+          <a:prstGeom prst="ellipse">
+            <a:avLst/>
+          </a:prstGeom>
+          <a:noFill/>
+          <a:ln w="38100">
+            <a:solidFill>
+              <a:srgbClr val="0070C0"/>
+            </a:solidFill>
+          </a:ln>
+        </p:spPr>
+        <p:style>
+          <a:lnRef idx="2">
+            <a:schemeClr val="accent1">
+              <a:shade val="50000"/>
+            </a:schemeClr>
+          </a:lnRef>
+          <a:fillRef idx="1">
+            <a:schemeClr val="accent1"/>
+          </a:fillRef>
+          <a:effectRef idx="0">
+            <a:schemeClr val="accent1"/>
+          </a:effectRef>
+          <a:fontRef idx="minor">
+            <a:schemeClr val="lt1"/>
+          </a:fontRef>
+        </p:style>
+        <p:txBody>
+          <a:bodyPr rtlCol="0" anchor="ctr"/>
+          <a:lstStyle/>
+          <a:p>
+            <a:pPr algn="ctr"/>
+            <a:endParaRPr lang="en-US"/>
+          </a:p>
+        </p:txBody>
+      </p:sp>
+      <p:cxnSp>
+        <p:nvCxnSpPr>
+          <p:cNvPr id="12" name="Connector: Curved 11">
+            <a:extLst>
+              <a:ext uri="{FF2B5EF4-FFF2-40B4-BE49-F238E27FC236}">
+                <a16:creationId xmlns:a16="http://schemas.microsoft.com/office/drawing/2014/main" id="{FEB89112-EEC3-45AA-A578-2F0632B308EC}"/>
+              </a:ext>
+            </a:extLst>
+          </p:cNvPr>
+          <p:cNvCxnSpPr>
+            <a:cxnSpLocks/>
+          </p:cNvCxnSpPr>
+          <p:nvPr/>
+        </p:nvCxnSpPr>
+        <p:spPr>
+          <a:xfrm rot="5400000">
+            <a:off x="9189100" y="1292626"/>
+            <a:ext cx="498355" cy="841962"/>
+          </a:xfrm>
+          <a:prstGeom prst="curvedConnector3">
+            <a:avLst/>
+          </a:prstGeom>
+          <a:ln w="38100">
+            <a:solidFill>
+              <a:schemeClr val="tx1"/>
+            </a:solidFill>
+            <a:tailEnd type="triangle" w="lg" len="lg"/>
+          </a:ln>
+        </p:spPr>
+        <p:style>
+          <a:lnRef idx="1">
+            <a:schemeClr val="accent1"/>
+          </a:lnRef>
+          <a:fillRef idx="0">
+            <a:schemeClr val="accent1"/>
+          </a:fillRef>
+          <a:effectRef idx="0">
+            <a:schemeClr val="accent1"/>
+          </a:effectRef>
+          <a:fontRef idx="minor">
+            <a:schemeClr val="tx1"/>
+          </a:fontRef>
+        </p:style>
+      </p:cxnSp>
+    </p:spTree>
+    <p:extLst>
+      <p:ext uri="{BB962C8B-B14F-4D97-AF65-F5344CB8AC3E}">
+        <p14:creationId xmlns:p14="http://schemas.microsoft.com/office/powerpoint/2010/main" val="3657255830"/>
+      </p:ext>
+    </p:extLst>
+  </p:cSld>
+  <p:clrMapOvr>
+    <a:masterClrMapping/>
+  </p:clrMapOvr>
+</p:sld>
+</file>
+
+<file path=ppt/slides/slide20.xml><?xml version="1.0" encoding="utf-8"?>
+<p:sld xmlns:a="http://schemas.openxmlformats.org/drawingml/2006/main" xmlns:r="http://schemas.openxmlformats.org/officeDocument/2006/relationships" xmlns:p="http://schemas.openxmlformats.org/presentationml/2006/main">
+  <p:cSld>
+    <p:spTree>
+      <p:nvGrpSpPr>
+        <p:cNvPr id="1" name=""/>
+        <p:cNvGrpSpPr/>
+        <p:nvPr/>
+      </p:nvGrpSpPr>
+      <p:grpSpPr>
+        <a:xfrm>
+          <a:off x="0" y="0"/>
+          <a:ext cx="0" cy="0"/>
+          <a:chOff x="0" y="0"/>
+          <a:chExt cx="0" cy="0"/>
+        </a:xfrm>
+      </p:grpSpPr>
+      <p:sp>
+        <p:nvSpPr>
+          <p:cNvPr id="8" name="Title 1">
+            <a:extLst>
+              <a:ext uri="{FF2B5EF4-FFF2-40B4-BE49-F238E27FC236}">
+                <a16:creationId xmlns:a16="http://schemas.microsoft.com/office/drawing/2014/main" id="{D2CB5ABF-396D-4B7F-9444-C39CCAE82489}"/>
+              </a:ext>
+            </a:extLst>
+          </p:cNvPr>
+          <p:cNvSpPr txBox="1">
+            <a:spLocks/>
+          </p:cNvSpPr>
+          <p:nvPr/>
+        </p:nvSpPr>
+        <p:spPr>
+          <a:xfrm>
+            <a:off x="162339" y="168347"/>
+            <a:ext cx="10515600" cy="1325563"/>
+          </a:xfrm>
+          <a:prstGeom prst="rect">
+            <a:avLst/>
+          </a:prstGeom>
+        </p:spPr>
+        <p:txBody>
+          <a:bodyPr/>
+          <a:lstStyle>
+            <a:lvl1pPr algn="l" defTabSz="914400" rtl="0" eaLnBrk="1" latinLnBrk="0" hangingPunct="1">
+              <a:lnSpc>
+                <a:spcPct val="90000"/>
+              </a:lnSpc>
+              <a:spcBef>
+                <a:spcPct val="0"/>
+              </a:spcBef>
+              <a:buNone/>
+              <a:defRPr sz="4400" kern="1200">
+                <a:solidFill>
+                  <a:schemeClr val="tx1"/>
+                </a:solidFill>
+                <a:latin typeface="+mj-lt"/>
+                <a:ea typeface="+mj-ea"/>
+                <a:cs typeface="+mj-cs"/>
+              </a:defRPr>
+            </a:lvl1pPr>
+          </a:lstStyle>
+          <a:p>
+            <a:r>
+              <a:rPr lang="en-US" dirty="0"/>
+              <a:t>Sensitivity Analyses</a:t>
+            </a:r>
+          </a:p>
+        </p:txBody>
+      </p:sp>
+      <p:sp>
+        <p:nvSpPr>
+          <p:cNvPr id="6" name="TextBox 5">
+            <a:extLst>
+              <a:ext uri="{FF2B5EF4-FFF2-40B4-BE49-F238E27FC236}">
+                <a16:creationId xmlns:a16="http://schemas.microsoft.com/office/drawing/2014/main" id="{56493F0E-42C5-485A-AE9D-0692A6596CEA}"/>
+              </a:ext>
+            </a:extLst>
+          </p:cNvPr>
+          <p:cNvSpPr txBox="1"/>
+          <p:nvPr/>
+        </p:nvSpPr>
+        <p:spPr>
+          <a:xfrm>
             <a:off x="162338" y="749439"/>
             <a:ext cx="11256231" cy="830997"/>
           </a:xfrm>
@@ -5067,7 +6209,7 @@
           <p:nvPr>
             <p:extLst>
               <p:ext uri="{D42A27DB-BD31-4B8C-83A1-F6EECF244321}">
-                <p14:modId xmlns:p14="http://schemas.microsoft.com/office/powerpoint/2010/main" val="1915227971"/>
+                <p14:modId xmlns:p14="http://schemas.microsoft.com/office/powerpoint/2010/main" val="674405780"/>
               </p:ext>
             </p:extLst>
           </p:nvPr>
@@ -5318,7 +6460,391 @@
 </p:sld>
 </file>
 
-<file path=ppt/slides/slide19.xml><?xml version="1.0" encoding="utf-8"?>
+<file path=ppt/slides/slide21.xml><?xml version="1.0" encoding="utf-8"?>
+<p:sld xmlns:a="http://schemas.openxmlformats.org/drawingml/2006/main" xmlns:r="http://schemas.openxmlformats.org/officeDocument/2006/relationships" xmlns:p="http://schemas.openxmlformats.org/presentationml/2006/main">
+  <p:cSld>
+    <p:spTree>
+      <p:nvGrpSpPr>
+        <p:cNvPr id="1" name=""/>
+        <p:cNvGrpSpPr/>
+        <p:nvPr/>
+      </p:nvGrpSpPr>
+      <p:grpSpPr>
+        <a:xfrm>
+          <a:off x="0" y="0"/>
+          <a:ext cx="0" cy="0"/>
+          <a:chOff x="0" y="0"/>
+          <a:chExt cx="0" cy="0"/>
+        </a:xfrm>
+      </p:grpSpPr>
+      <p:sp>
+        <p:nvSpPr>
+          <p:cNvPr id="8" name="Title 1">
+            <a:extLst>
+              <a:ext uri="{FF2B5EF4-FFF2-40B4-BE49-F238E27FC236}">
+                <a16:creationId xmlns:a16="http://schemas.microsoft.com/office/drawing/2014/main" id="{D2CB5ABF-396D-4B7F-9444-C39CCAE82489}"/>
+              </a:ext>
+            </a:extLst>
+          </p:cNvPr>
+          <p:cNvSpPr txBox="1">
+            <a:spLocks/>
+          </p:cNvSpPr>
+          <p:nvPr/>
+        </p:nvSpPr>
+        <p:spPr>
+          <a:xfrm>
+            <a:off x="162339" y="168347"/>
+            <a:ext cx="10515600" cy="1325563"/>
+          </a:xfrm>
+          <a:prstGeom prst="rect">
+            <a:avLst/>
+          </a:prstGeom>
+        </p:spPr>
+        <p:txBody>
+          <a:bodyPr/>
+          <a:lstStyle>
+            <a:lvl1pPr algn="l" defTabSz="914400" rtl="0" eaLnBrk="1" latinLnBrk="0" hangingPunct="1">
+              <a:lnSpc>
+                <a:spcPct val="90000"/>
+              </a:lnSpc>
+              <a:spcBef>
+                <a:spcPct val="0"/>
+              </a:spcBef>
+              <a:buNone/>
+              <a:defRPr sz="4400" kern="1200">
+                <a:solidFill>
+                  <a:schemeClr val="tx1"/>
+                </a:solidFill>
+                <a:latin typeface="+mj-lt"/>
+                <a:ea typeface="+mj-ea"/>
+                <a:cs typeface="+mj-cs"/>
+              </a:defRPr>
+            </a:lvl1pPr>
+          </a:lstStyle>
+          <a:p>
+            <a:r>
+              <a:rPr lang="en-US" dirty="0"/>
+              <a:t>Sensitivity Analyses</a:t>
+            </a:r>
+          </a:p>
+        </p:txBody>
+      </p:sp>
+      <p:sp>
+        <p:nvSpPr>
+          <p:cNvPr id="6" name="TextBox 5">
+            <a:extLst>
+              <a:ext uri="{FF2B5EF4-FFF2-40B4-BE49-F238E27FC236}">
+                <a16:creationId xmlns:a16="http://schemas.microsoft.com/office/drawing/2014/main" id="{56493F0E-42C5-485A-AE9D-0692A6596CEA}"/>
+              </a:ext>
+            </a:extLst>
+          </p:cNvPr>
+          <p:cNvSpPr txBox="1"/>
+          <p:nvPr/>
+        </p:nvSpPr>
+        <p:spPr>
+          <a:xfrm>
+            <a:off x="162338" y="749439"/>
+            <a:ext cx="11256231" cy="830997"/>
+          </a:xfrm>
+          <a:prstGeom prst="rect">
+            <a:avLst/>
+          </a:prstGeom>
+          <a:noFill/>
+        </p:spPr>
+        <p:txBody>
+          <a:bodyPr wrap="square" rtlCol="0">
+            <a:spAutoFit/>
+          </a:bodyPr>
+          <a:lstStyle/>
+          <a:p>
+            <a:r>
+              <a:rPr lang="en-US" sz="2400" i="1" dirty="0">
+                <a:latin typeface="+mj-lt"/>
+              </a:rPr>
+              <a:t>One-way elasticity values:  proportional change in long-term lambda with a proportional change in a parameter value</a:t>
+            </a:r>
+          </a:p>
+        </p:txBody>
+      </p:sp>
+      <p:graphicFrame>
+        <p:nvGraphicFramePr>
+          <p:cNvPr id="2" name="Table 2">
+            <a:extLst>
+              <a:ext uri="{FF2B5EF4-FFF2-40B4-BE49-F238E27FC236}">
+                <a16:creationId xmlns:a16="http://schemas.microsoft.com/office/drawing/2014/main" id="{E3569B72-7C5C-43A2-BB77-E21B23EDA4EB}"/>
+              </a:ext>
+            </a:extLst>
+          </p:cNvPr>
+          <p:cNvGraphicFramePr>
+            <a:graphicFrameLocks noGrp="1"/>
+          </p:cNvGraphicFramePr>
+          <p:nvPr>
+            <p:extLst>
+              <p:ext uri="{D42A27DB-BD31-4B8C-83A1-F6EECF244321}">
+                <p14:modId xmlns:p14="http://schemas.microsoft.com/office/powerpoint/2010/main" val="1331216975"/>
+              </p:ext>
+            </p:extLst>
+          </p:nvPr>
+        </p:nvGraphicFramePr>
+        <p:xfrm>
+          <a:off x="467885" y="2377440"/>
+          <a:ext cx="11256231" cy="2103120"/>
+        </p:xfrm>
+        <a:graphic>
+          <a:graphicData uri="http://schemas.openxmlformats.org/drawingml/2006/table">
+            <a:tbl>
+              <a:tblPr firstRow="1" bandRow="1">
+                <a:tableStyleId>{5C22544A-7EE6-4342-B048-85BDC9FD1C3A}</a:tableStyleId>
+              </a:tblPr>
+              <a:tblGrid>
+                <a:gridCol w="3737610">
+                  <a:extLst>
+                    <a:ext uri="{9D8B030D-6E8A-4147-A177-3AD203B41FA5}">
+                      <a16:colId xmlns:a16="http://schemas.microsoft.com/office/drawing/2014/main" val="1892214399"/>
+                    </a:ext>
+                  </a:extLst>
+                </a:gridCol>
+                <a:gridCol w="3766544">
+                  <a:extLst>
+                    <a:ext uri="{9D8B030D-6E8A-4147-A177-3AD203B41FA5}">
+                      <a16:colId xmlns:a16="http://schemas.microsoft.com/office/drawing/2014/main" val="314755591"/>
+                    </a:ext>
+                  </a:extLst>
+                </a:gridCol>
+                <a:gridCol w="3752077">
+                  <a:extLst>
+                    <a:ext uri="{9D8B030D-6E8A-4147-A177-3AD203B41FA5}">
+                      <a16:colId xmlns:a16="http://schemas.microsoft.com/office/drawing/2014/main" val="4011558034"/>
+                    </a:ext>
+                  </a:extLst>
+                </a:gridCol>
+              </a:tblGrid>
+              <a:tr h="370840">
+                <a:tc>
+                  <a:txBody>
+                    <a:bodyPr/>
+                    <a:lstStyle/>
+                    <a:p>
+                      <a:pPr algn="ctr"/>
+                      <a:r>
+                        <a:rPr lang="en-US" sz="2400" dirty="0"/>
+                        <a:t>Parameter</a:t>
+                      </a:r>
+                    </a:p>
+                  </a:txBody>
+                  <a:tcPr anchor="ctr"/>
+                </a:tc>
+                <a:tc>
+                  <a:txBody>
+                    <a:bodyPr/>
+                    <a:lstStyle/>
+                    <a:p>
+                      <a:pPr algn="ctr"/>
+                      <a:r>
+                        <a:rPr lang="en-US" sz="2400" dirty="0"/>
+                        <a:t>Elasticity Value JAGS VBGF </a:t>
+                      </a:r>
+                    </a:p>
+                  </a:txBody>
+                  <a:tcPr anchor="ctr"/>
+                </a:tc>
+                <a:tc>
+                  <a:txBody>
+                    <a:bodyPr/>
+                    <a:lstStyle/>
+                    <a:p>
+                      <a:pPr algn="ctr"/>
+                      <a:r>
+                        <a:rPr lang="en-US" sz="2400" dirty="0"/>
+                        <a:t>Elasticity Value TMB ln(VBGF) </a:t>
+                      </a:r>
+                    </a:p>
+                  </a:txBody>
+                  <a:tcPr/>
+                </a:tc>
+                <a:extLst>
+                  <a:ext uri="{0D108BD9-81ED-4DB2-BD59-A6C34878D82A}">
+                    <a16:rowId xmlns:a16="http://schemas.microsoft.com/office/drawing/2014/main" val="4028550352"/>
+                  </a:ext>
+                </a:extLst>
+              </a:tr>
+              <a:tr h="370840">
+                <a:tc>
+                  <a:txBody>
+                    <a:bodyPr/>
+                    <a:lstStyle/>
+                    <a:p>
+                      <a:pPr algn="ctr"/>
+                      <a:r>
+                        <a:rPr lang="en-US" sz="2400" dirty="0">
+                          <a:solidFill>
+                            <a:srgbClr val="FF0000"/>
+                          </a:solidFill>
+                        </a:rPr>
+                        <a:t>Maximum Age</a:t>
+                      </a:r>
+                    </a:p>
+                  </a:txBody>
+                  <a:tcPr/>
+                </a:tc>
+                <a:tc>
+                  <a:txBody>
+                    <a:bodyPr/>
+                    <a:lstStyle/>
+                    <a:p>
+                      <a:pPr algn="ctr"/>
+                      <a:r>
+                        <a:rPr lang="en-US" sz="2400" dirty="0"/>
+                        <a:t> 0.081456</a:t>
+                      </a:r>
+                    </a:p>
+                  </a:txBody>
+                  <a:tcPr/>
+                </a:tc>
+                <a:tc>
+                  <a:txBody>
+                    <a:bodyPr/>
+                    <a:lstStyle/>
+                    <a:p>
+                      <a:pPr algn="ctr"/>
+                      <a:r>
+                        <a:rPr lang="en-US" sz="2400" dirty="0"/>
+                        <a:t>0.089307</a:t>
+                      </a:r>
+                    </a:p>
+                  </a:txBody>
+                  <a:tcPr/>
+                </a:tc>
+                <a:extLst>
+                  <a:ext uri="{0D108BD9-81ED-4DB2-BD59-A6C34878D82A}">
+                    <a16:rowId xmlns:a16="http://schemas.microsoft.com/office/drawing/2014/main" val="1235938930"/>
+                  </a:ext>
+                </a:extLst>
+              </a:tr>
+              <a:tr h="370840">
+                <a:tc>
+                  <a:txBody>
+                    <a:bodyPr/>
+                    <a:lstStyle/>
+                    <a:p>
+                      <a:pPr algn="ctr"/>
+                      <a:r>
+                        <a:rPr lang="en-US" sz="2400" dirty="0">
+                          <a:solidFill>
+                            <a:srgbClr val="FF0000"/>
+                          </a:solidFill>
+                        </a:rPr>
+                        <a:t>Age-0</a:t>
+                      </a:r>
+                      <a:r>
+                        <a:rPr lang="en-US" sz="2400" dirty="0"/>
+                        <a:t> thru Age-7 Survivals Sex Ratio</a:t>
+                      </a:r>
+                    </a:p>
+                  </a:txBody>
+                  <a:tcPr/>
+                </a:tc>
+                <a:tc>
+                  <a:txBody>
+                    <a:bodyPr/>
+                    <a:lstStyle/>
+                    <a:p>
+                      <a:pPr algn="ctr">
+                        <a:spcBef>
+                          <a:spcPts val="1200"/>
+                        </a:spcBef>
+                      </a:pPr>
+                      <a:r>
+                        <a:rPr lang="en-US" sz="2400" dirty="0"/>
+                        <a:t>0.033442</a:t>
+                      </a:r>
+                    </a:p>
+                  </a:txBody>
+                  <a:tcPr anchor="ctr"/>
+                </a:tc>
+                <a:tc>
+                  <a:txBody>
+                    <a:bodyPr/>
+                    <a:lstStyle/>
+                    <a:p>
+                      <a:pPr algn="ctr">
+                        <a:spcBef>
+                          <a:spcPts val="1200"/>
+                        </a:spcBef>
+                      </a:pPr>
+                      <a:r>
+                        <a:rPr lang="en-US" sz="2400" dirty="0"/>
+                        <a:t>0.032743 </a:t>
+                      </a:r>
+                    </a:p>
+                  </a:txBody>
+                  <a:tcPr anchor="ctr"/>
+                </a:tc>
+                <a:extLst>
+                  <a:ext uri="{0D108BD9-81ED-4DB2-BD59-A6C34878D82A}">
+                    <a16:rowId xmlns:a16="http://schemas.microsoft.com/office/drawing/2014/main" val="744868919"/>
+                  </a:ext>
+                </a:extLst>
+              </a:tr>
+            </a:tbl>
+          </a:graphicData>
+        </a:graphic>
+      </p:graphicFrame>
+      <p:sp>
+        <p:nvSpPr>
+          <p:cNvPr id="3" name="TextBox 2">
+            <a:extLst>
+              <a:ext uri="{FF2B5EF4-FFF2-40B4-BE49-F238E27FC236}">
+                <a16:creationId xmlns:a16="http://schemas.microsoft.com/office/drawing/2014/main" id="{915340F3-87F4-4FC7-A627-2459B8FE9238}"/>
+              </a:ext>
+            </a:extLst>
+          </p:cNvPr>
+          <p:cNvSpPr txBox="1"/>
+          <p:nvPr/>
+        </p:nvSpPr>
+        <p:spPr>
+          <a:xfrm>
+            <a:off x="467885" y="6166433"/>
+            <a:ext cx="11256231" cy="523220"/>
+          </a:xfrm>
+          <a:prstGeom prst="rect">
+            <a:avLst/>
+          </a:prstGeom>
+          <a:noFill/>
+        </p:spPr>
+        <p:txBody>
+          <a:bodyPr wrap="square" rtlCol="0">
+            <a:spAutoFit/>
+          </a:bodyPr>
+          <a:lstStyle/>
+          <a:p>
+            <a:r>
+              <a:rPr lang="en-US" sz="1400" dirty="0"/>
+              <a:t>*Note:  Due to the discrete nature of the maximum age parameter, its elasticity value was computed from an average rate of change as compared to all</a:t>
+            </a:r>
+          </a:p>
+          <a:p>
+            <a:r>
+              <a:rPr lang="en-US" sz="1400" dirty="0"/>
+              <a:t>              other values which were computed from an instantaneous rate of change.</a:t>
+            </a:r>
+          </a:p>
+        </p:txBody>
+      </p:sp>
+    </p:spTree>
+    <p:extLst>
+      <p:ext uri="{BB962C8B-B14F-4D97-AF65-F5344CB8AC3E}">
+        <p14:creationId xmlns:p14="http://schemas.microsoft.com/office/powerpoint/2010/main" val="214061045"/>
+      </p:ext>
+    </p:extLst>
+  </p:cSld>
+  <p:clrMapOvr>
+    <a:masterClrMapping/>
+  </p:clrMapOvr>
+</p:sld>
+</file>
+
+<file path=ppt/slides/slide22.xml><?xml version="1.0" encoding="utf-8"?>
 <p:sld xmlns:a="http://schemas.openxmlformats.org/drawingml/2006/main" xmlns:r="http://schemas.openxmlformats.org/officeDocument/2006/relationships" xmlns:p="http://schemas.openxmlformats.org/presentationml/2006/main">
   <p:cSld>
     <p:spTree>
@@ -5565,515 +7091,7 @@
 </p:sld>
 </file>
 
-<file path=ppt/slides/slide2.xml><?xml version="1.0" encoding="utf-8"?>
-<p:sld xmlns:a="http://schemas.openxmlformats.org/drawingml/2006/main" xmlns:r="http://schemas.openxmlformats.org/officeDocument/2006/relationships" xmlns:p="http://schemas.openxmlformats.org/presentationml/2006/main">
-  <p:cSld>
-    <p:spTree>
-      <p:nvGrpSpPr>
-        <p:cNvPr id="1" name=""/>
-        <p:cNvGrpSpPr/>
-        <p:nvPr/>
-      </p:nvGrpSpPr>
-      <p:grpSpPr>
-        <a:xfrm>
-          <a:off x="0" y="0"/>
-          <a:ext cx="0" cy="0"/>
-          <a:chOff x="0" y="0"/>
-          <a:chExt cx="0" cy="0"/>
-        </a:xfrm>
-      </p:grpSpPr>
-      <p:sp>
-        <p:nvSpPr>
-          <p:cNvPr id="2" name="Title 1">
-            <a:extLst>
-              <a:ext uri="{FF2B5EF4-FFF2-40B4-BE49-F238E27FC236}">
-                <a16:creationId xmlns:a16="http://schemas.microsoft.com/office/drawing/2014/main" id="{2BE7CC5D-DA6E-4A20-AD31-367969AE2B96}"/>
-              </a:ext>
-            </a:extLst>
-          </p:cNvPr>
-          <p:cNvSpPr>
-            <a:spLocks noGrp="1"/>
-          </p:cNvSpPr>
-          <p:nvPr>
-            <p:ph type="title"/>
-          </p:nvPr>
-        </p:nvSpPr>
-        <p:spPr>
-          <a:xfrm>
-            <a:off x="162339" y="168347"/>
-            <a:ext cx="10515600" cy="1325563"/>
-          </a:xfrm>
-        </p:spPr>
-        <p:txBody>
-          <a:bodyPr/>
-          <a:lstStyle/>
-          <a:p>
-            <a:r>
-              <a:rPr lang="en-US" dirty="0"/>
-              <a:t>Leslie Matrix Model</a:t>
-            </a:r>
-          </a:p>
-        </p:txBody>
-      </p:sp>
-      <p:pic>
-        <p:nvPicPr>
-          <p:cNvPr id="3" name="Picture 2">
-            <a:extLst>
-              <a:ext uri="{FF2B5EF4-FFF2-40B4-BE49-F238E27FC236}">
-                <a16:creationId xmlns:a16="http://schemas.microsoft.com/office/drawing/2014/main" id="{D3899401-B9BF-47BF-A0C0-D2E2184B7998}"/>
-              </a:ext>
-            </a:extLst>
-          </p:cNvPr>
-          <p:cNvPicPr>
-            <a:picLocks noChangeAspect="1"/>
-          </p:cNvPicPr>
-          <p:nvPr/>
-        </p:nvPicPr>
-        <p:blipFill>
-          <a:blip r:embed="rId2">
-            <a:extLst>
-              <a:ext uri="{28A0092B-C50C-407E-A947-70E740481C1C}">
-                <a14:useLocalDpi xmlns:a14="http://schemas.microsoft.com/office/drawing/2010/main" val="0"/>
-              </a:ext>
-            </a:extLst>
-          </a:blip>
-          <a:stretch>
-            <a:fillRect/>
-          </a:stretch>
-        </p:blipFill>
-        <p:spPr>
-          <a:xfrm>
-            <a:off x="1897953" y="1526384"/>
-            <a:ext cx="8396094" cy="4342222"/>
-          </a:xfrm>
-          <a:prstGeom prst="rect">
-            <a:avLst/>
-          </a:prstGeom>
-        </p:spPr>
-      </p:pic>
-      <p:sp>
-        <p:nvSpPr>
-          <p:cNvPr id="4" name="TextBox 3">
-            <a:extLst>
-              <a:ext uri="{FF2B5EF4-FFF2-40B4-BE49-F238E27FC236}">
-                <a16:creationId xmlns:a16="http://schemas.microsoft.com/office/drawing/2014/main" id="{D25E3F11-BC93-4034-AAD5-316D62260D3D}"/>
-              </a:ext>
-            </a:extLst>
-          </p:cNvPr>
-          <p:cNvSpPr txBox="1"/>
-          <p:nvPr/>
-        </p:nvSpPr>
-        <p:spPr>
-          <a:xfrm>
-            <a:off x="10029436" y="2410572"/>
-            <a:ext cx="1844842" cy="707886"/>
-          </a:xfrm>
-          <a:prstGeom prst="rect">
-            <a:avLst/>
-          </a:prstGeom>
-          <a:noFill/>
-        </p:spPr>
-        <p:txBody>
-          <a:bodyPr wrap="square" rtlCol="0">
-            <a:spAutoFit/>
-          </a:bodyPr>
-          <a:lstStyle/>
-          <a:p>
-            <a:r>
-              <a:rPr lang="en-US" sz="2000" dirty="0">
-                <a:solidFill>
-                  <a:srgbClr val="0070C0"/>
-                </a:solidFill>
-              </a:rPr>
-              <a:t>Age-Specific Fertilities</a:t>
-            </a:r>
-          </a:p>
-        </p:txBody>
-      </p:sp>
-      <p:sp>
-        <p:nvSpPr>
-          <p:cNvPr id="5" name="Oval 4">
-            <a:extLst>
-              <a:ext uri="{FF2B5EF4-FFF2-40B4-BE49-F238E27FC236}">
-                <a16:creationId xmlns:a16="http://schemas.microsoft.com/office/drawing/2014/main" id="{2A3DD514-E1C0-42F3-B1D0-8D8BCD9ADAED}"/>
-              </a:ext>
-            </a:extLst>
-          </p:cNvPr>
-          <p:cNvSpPr/>
-          <p:nvPr/>
-        </p:nvSpPr>
-        <p:spPr>
-          <a:xfrm>
-            <a:off x="2043626" y="1591332"/>
-            <a:ext cx="7815632" cy="952808"/>
-          </a:xfrm>
-          <a:prstGeom prst="ellipse">
-            <a:avLst/>
-          </a:prstGeom>
-          <a:noFill/>
-          <a:ln w="63500">
-            <a:solidFill>
-              <a:srgbClr val="0070C0"/>
-            </a:solidFill>
-          </a:ln>
-        </p:spPr>
-        <p:style>
-          <a:lnRef idx="2">
-            <a:schemeClr val="accent1">
-              <a:shade val="50000"/>
-            </a:schemeClr>
-          </a:lnRef>
-          <a:fillRef idx="1">
-            <a:schemeClr val="accent1"/>
-          </a:fillRef>
-          <a:effectRef idx="0">
-            <a:schemeClr val="accent1"/>
-          </a:effectRef>
-          <a:fontRef idx="minor">
-            <a:schemeClr val="lt1"/>
-          </a:fontRef>
-        </p:style>
-        <p:txBody>
-          <a:bodyPr rtlCol="0" anchor="ctr"/>
-          <a:lstStyle/>
-          <a:p>
-            <a:pPr algn="ctr"/>
-            <a:endParaRPr lang="en-US"/>
-          </a:p>
-        </p:txBody>
-      </p:sp>
-      <p:sp>
-        <p:nvSpPr>
-          <p:cNvPr id="6" name="Oval 5">
-            <a:extLst>
-              <a:ext uri="{FF2B5EF4-FFF2-40B4-BE49-F238E27FC236}">
-                <a16:creationId xmlns:a16="http://schemas.microsoft.com/office/drawing/2014/main" id="{6F0377FF-3C82-44E4-BC8C-9FA69DE8211E}"/>
-              </a:ext>
-            </a:extLst>
-          </p:cNvPr>
-          <p:cNvSpPr/>
-          <p:nvPr/>
-        </p:nvSpPr>
-        <p:spPr>
-          <a:xfrm rot="1799308">
-            <a:off x="1860713" y="3629741"/>
-            <a:ext cx="7481327" cy="1271901"/>
-          </a:xfrm>
-          <a:prstGeom prst="ellipse">
-            <a:avLst/>
-          </a:prstGeom>
-          <a:noFill/>
-          <a:ln w="63500">
-            <a:solidFill>
-              <a:srgbClr val="0070C0"/>
-            </a:solidFill>
-          </a:ln>
-        </p:spPr>
-        <p:style>
-          <a:lnRef idx="2">
-            <a:schemeClr val="accent1">
-              <a:shade val="50000"/>
-            </a:schemeClr>
-          </a:lnRef>
-          <a:fillRef idx="1">
-            <a:schemeClr val="accent1"/>
-          </a:fillRef>
-          <a:effectRef idx="0">
-            <a:schemeClr val="accent1"/>
-          </a:effectRef>
-          <a:fontRef idx="minor">
-            <a:schemeClr val="lt1"/>
-          </a:fontRef>
-        </p:style>
-        <p:txBody>
-          <a:bodyPr rtlCol="0" anchor="ctr"/>
-          <a:lstStyle/>
-          <a:p>
-            <a:pPr algn="ctr"/>
-            <a:endParaRPr lang="en-US"/>
-          </a:p>
-        </p:txBody>
-      </p:sp>
-      <p:sp>
-        <p:nvSpPr>
-          <p:cNvPr id="7" name="TextBox 6">
-            <a:extLst>
-              <a:ext uri="{FF2B5EF4-FFF2-40B4-BE49-F238E27FC236}">
-                <a16:creationId xmlns:a16="http://schemas.microsoft.com/office/drawing/2014/main" id="{4956CD8B-A1F5-47B5-867C-EAC0CF69B7C4}"/>
-              </a:ext>
-            </a:extLst>
-          </p:cNvPr>
-          <p:cNvSpPr txBox="1"/>
-          <p:nvPr/>
-        </p:nvSpPr>
-        <p:spPr>
-          <a:xfrm>
-            <a:off x="8073420" y="6357197"/>
-            <a:ext cx="2935707" cy="400110"/>
-          </a:xfrm>
-          <a:prstGeom prst="rect">
-            <a:avLst/>
-          </a:prstGeom>
-          <a:noFill/>
-        </p:spPr>
-        <p:txBody>
-          <a:bodyPr wrap="square" rtlCol="0">
-            <a:spAutoFit/>
-          </a:bodyPr>
-          <a:lstStyle/>
-          <a:p>
-            <a:r>
-              <a:rPr lang="en-US" sz="2000" dirty="0">
-                <a:solidFill>
-                  <a:srgbClr val="0070C0"/>
-                </a:solidFill>
-              </a:rPr>
-              <a:t>Age-Specific Survivals</a:t>
-            </a:r>
-          </a:p>
-        </p:txBody>
-      </p:sp>
-      <p:cxnSp>
-        <p:nvCxnSpPr>
-          <p:cNvPr id="8" name="Connector: Curved 7">
-            <a:extLst>
-              <a:ext uri="{FF2B5EF4-FFF2-40B4-BE49-F238E27FC236}">
-                <a16:creationId xmlns:a16="http://schemas.microsoft.com/office/drawing/2014/main" id="{665E52E4-5143-4B7A-8224-77F91DDD6ECC}"/>
-              </a:ext>
-            </a:extLst>
-          </p:cNvPr>
-          <p:cNvCxnSpPr>
-            <a:cxnSpLocks/>
-            <a:stCxn id="4" idx="0"/>
-            <a:endCxn id="5" idx="6"/>
-          </p:cNvCxnSpPr>
-          <p:nvPr/>
-        </p:nvCxnSpPr>
-        <p:spPr>
-          <a:xfrm rot="16200000" flipV="1">
-            <a:off x="10234140" y="1692854"/>
-            <a:ext cx="342836" cy="1092599"/>
-          </a:xfrm>
-          <a:prstGeom prst="curvedConnector2">
-            <a:avLst/>
-          </a:prstGeom>
-          <a:ln w="38100">
-            <a:solidFill>
-              <a:schemeClr val="tx1"/>
-            </a:solidFill>
-            <a:tailEnd type="triangle" w="lg" len="lg"/>
-          </a:ln>
-        </p:spPr>
-        <p:style>
-          <a:lnRef idx="1">
-            <a:schemeClr val="accent1"/>
-          </a:lnRef>
-          <a:fillRef idx="0">
-            <a:schemeClr val="accent1"/>
-          </a:fillRef>
-          <a:effectRef idx="0">
-            <a:schemeClr val="accent1"/>
-          </a:effectRef>
-          <a:fontRef idx="minor">
-            <a:schemeClr val="tx1"/>
-          </a:fontRef>
-        </p:style>
-      </p:cxnSp>
-      <p:cxnSp>
-        <p:nvCxnSpPr>
-          <p:cNvPr id="9" name="Connector: Curved 8">
-            <a:extLst>
-              <a:ext uri="{FF2B5EF4-FFF2-40B4-BE49-F238E27FC236}">
-                <a16:creationId xmlns:a16="http://schemas.microsoft.com/office/drawing/2014/main" id="{079A39A5-071E-4E03-9FDD-1EA6407A0EE0}"/>
-              </a:ext>
-            </a:extLst>
-          </p:cNvPr>
-          <p:cNvCxnSpPr>
-            <a:cxnSpLocks/>
-            <a:stCxn id="7" idx="0"/>
-          </p:cNvCxnSpPr>
-          <p:nvPr/>
-        </p:nvCxnSpPr>
-        <p:spPr>
-          <a:xfrm rot="16200000" flipV="1">
-            <a:off x="8976776" y="5792700"/>
-            <a:ext cx="402532" cy="726463"/>
-          </a:xfrm>
-          <a:prstGeom prst="curvedConnector2">
-            <a:avLst/>
-          </a:prstGeom>
-          <a:ln w="38100">
-            <a:solidFill>
-              <a:schemeClr val="tx1"/>
-            </a:solidFill>
-            <a:tailEnd type="triangle" w="lg" len="lg"/>
-          </a:ln>
-        </p:spPr>
-        <p:style>
-          <a:lnRef idx="1">
-            <a:schemeClr val="accent1"/>
-          </a:lnRef>
-          <a:fillRef idx="0">
-            <a:schemeClr val="accent1"/>
-          </a:fillRef>
-          <a:effectRef idx="0">
-            <a:schemeClr val="accent1"/>
-          </a:effectRef>
-          <a:fontRef idx="minor">
-            <a:schemeClr val="tx1"/>
-          </a:fontRef>
-        </p:style>
-      </p:cxnSp>
-      <p:sp>
-        <p:nvSpPr>
-          <p:cNvPr id="10" name="TextBox 9">
-            <a:extLst>
-              <a:ext uri="{FF2B5EF4-FFF2-40B4-BE49-F238E27FC236}">
-                <a16:creationId xmlns:a16="http://schemas.microsoft.com/office/drawing/2014/main" id="{3D97F565-DAB8-4542-A6F8-07BCE527146D}"/>
-              </a:ext>
-            </a:extLst>
-          </p:cNvPr>
-          <p:cNvSpPr txBox="1"/>
-          <p:nvPr/>
-        </p:nvSpPr>
-        <p:spPr>
-          <a:xfrm>
-            <a:off x="8872299" y="1064318"/>
-            <a:ext cx="1973919" cy="400110"/>
-          </a:xfrm>
-          <a:prstGeom prst="rect">
-            <a:avLst/>
-          </a:prstGeom>
-          <a:noFill/>
-        </p:spPr>
-        <p:txBody>
-          <a:bodyPr wrap="square" rtlCol="0">
-            <a:spAutoFit/>
-          </a:bodyPr>
-          <a:lstStyle/>
-          <a:p>
-            <a:r>
-              <a:rPr lang="en-US" sz="2000" dirty="0">
-                <a:solidFill>
-                  <a:srgbClr val="0070C0"/>
-                </a:solidFill>
-              </a:rPr>
-              <a:t>maximum age</a:t>
-            </a:r>
-            <a:endParaRPr lang="en-US" sz="2000" dirty="0"/>
-          </a:p>
-        </p:txBody>
-      </p:sp>
-      <p:sp>
-        <p:nvSpPr>
-          <p:cNvPr id="11" name="Oval 10">
-            <a:extLst>
-              <a:ext uri="{FF2B5EF4-FFF2-40B4-BE49-F238E27FC236}">
-                <a16:creationId xmlns:a16="http://schemas.microsoft.com/office/drawing/2014/main" id="{0E562867-F833-4954-881E-33D3FA6856F0}"/>
-              </a:ext>
-            </a:extLst>
-          </p:cNvPr>
-          <p:cNvSpPr/>
-          <p:nvPr/>
-        </p:nvSpPr>
-        <p:spPr>
-          <a:xfrm>
-            <a:off x="8569032" y="1962786"/>
-            <a:ext cx="972241" cy="427095"/>
-          </a:xfrm>
-          <a:prstGeom prst="ellipse">
-            <a:avLst/>
-          </a:prstGeom>
-          <a:noFill/>
-          <a:ln w="38100">
-            <a:solidFill>
-              <a:srgbClr val="0070C0"/>
-            </a:solidFill>
-          </a:ln>
-        </p:spPr>
-        <p:style>
-          <a:lnRef idx="2">
-            <a:schemeClr val="accent1">
-              <a:shade val="50000"/>
-            </a:schemeClr>
-          </a:lnRef>
-          <a:fillRef idx="1">
-            <a:schemeClr val="accent1"/>
-          </a:fillRef>
-          <a:effectRef idx="0">
-            <a:schemeClr val="accent1"/>
-          </a:effectRef>
-          <a:fontRef idx="minor">
-            <a:schemeClr val="lt1"/>
-          </a:fontRef>
-        </p:style>
-        <p:txBody>
-          <a:bodyPr rtlCol="0" anchor="ctr"/>
-          <a:lstStyle/>
-          <a:p>
-            <a:pPr algn="ctr"/>
-            <a:endParaRPr lang="en-US"/>
-          </a:p>
-        </p:txBody>
-      </p:sp>
-      <p:cxnSp>
-        <p:nvCxnSpPr>
-          <p:cNvPr id="12" name="Connector: Curved 11">
-            <a:extLst>
-              <a:ext uri="{FF2B5EF4-FFF2-40B4-BE49-F238E27FC236}">
-                <a16:creationId xmlns:a16="http://schemas.microsoft.com/office/drawing/2014/main" id="{FEB89112-EEC3-45AA-A578-2F0632B308EC}"/>
-              </a:ext>
-            </a:extLst>
-          </p:cNvPr>
-          <p:cNvCxnSpPr>
-            <a:cxnSpLocks/>
-          </p:cNvCxnSpPr>
-          <p:nvPr/>
-        </p:nvCxnSpPr>
-        <p:spPr>
-          <a:xfrm rot="5400000">
-            <a:off x="9189100" y="1292626"/>
-            <a:ext cx="498355" cy="841962"/>
-          </a:xfrm>
-          <a:prstGeom prst="curvedConnector3">
-            <a:avLst/>
-          </a:prstGeom>
-          <a:ln w="38100">
-            <a:solidFill>
-              <a:schemeClr val="tx1"/>
-            </a:solidFill>
-            <a:tailEnd type="triangle" w="lg" len="lg"/>
-          </a:ln>
-        </p:spPr>
-        <p:style>
-          <a:lnRef idx="1">
-            <a:schemeClr val="accent1"/>
-          </a:lnRef>
-          <a:fillRef idx="0">
-            <a:schemeClr val="accent1"/>
-          </a:fillRef>
-          <a:effectRef idx="0">
-            <a:schemeClr val="accent1"/>
-          </a:effectRef>
-          <a:fontRef idx="minor">
-            <a:schemeClr val="tx1"/>
-          </a:fontRef>
-        </p:style>
-      </p:cxnSp>
-    </p:spTree>
-    <p:extLst>
-      <p:ext uri="{BB962C8B-B14F-4D97-AF65-F5344CB8AC3E}">
-        <p14:creationId xmlns:p14="http://schemas.microsoft.com/office/powerpoint/2010/main" val="3657255830"/>
-      </p:ext>
-    </p:extLst>
-  </p:cSld>
-  <p:clrMapOvr>
-    <a:masterClrMapping/>
-  </p:clrMapOvr>
-</p:sld>
-</file>
-
-<file path=ppt/slides/slide20.xml><?xml version="1.0" encoding="utf-8"?>
+<file path=ppt/slides/slide23.xml><?xml version="1.0" encoding="utf-8"?>
 <p:sld xmlns:a="http://schemas.openxmlformats.org/drawingml/2006/main" xmlns:r="http://schemas.openxmlformats.org/officeDocument/2006/relationships" xmlns:p="http://schemas.openxmlformats.org/presentationml/2006/main">
   <p:cSld>
     <p:spTree>
@@ -6316,7 +7334,7 @@
         <p:spPr>
           <a:xfrm>
             <a:off x="2628900" y="4240530"/>
-            <a:ext cx="9121140" cy="830997"/>
+            <a:ext cx="9121140" cy="1569660"/>
           </a:xfrm>
           <a:prstGeom prst="rect">
             <a:avLst/>
@@ -6329,13 +7347,31 @@
           </a:bodyPr>
           <a:lstStyle/>
           <a:p>
+            <a:pPr marL="342900" indent="-342900">
+              <a:buFont typeface="Arial" panose="020B0604020202020204" pitchFamily="34" charset="0"/>
+              <a:buChar char="•"/>
+            </a:pPr>
             <a:r>
               <a:rPr lang="en-US" sz="2400" dirty="0">
                 <a:solidFill>
                   <a:srgbClr val="FF0000"/>
                 </a:solidFill>
               </a:rPr>
-              <a:t>Falls within the Pine et al. (2001) estimate of 0.0000-0.0004 for gulf sturgeon.</a:t>
+              <a:t>Within the Pine et al. (2001) estimate of 0.0000-0.0004 for gulf sturgeon.  </a:t>
+            </a:r>
+          </a:p>
+          <a:p>
+            <a:pPr marL="342900" indent="-342900">
+              <a:buFont typeface="Arial" panose="020B0604020202020204" pitchFamily="34" charset="0"/>
+              <a:buChar char="•"/>
+            </a:pPr>
+            <a:r>
+              <a:rPr lang="en-US" sz="2400" dirty="0">
+                <a:solidFill>
+                  <a:srgbClr val="FF0000"/>
+                </a:solidFill>
+              </a:rPr>
+              <a:t>Stabilizing age-0 survivals might be reasonably attainable for the Lower Missouri River pallid sturgeon population.</a:t>
             </a:r>
           </a:p>
         </p:txBody>
@@ -6354,7 +7390,7 @@
         </p:nvCxnSpPr>
         <p:spPr>
           <a:xfrm flipV="1">
-            <a:off x="2994660" y="3638550"/>
+            <a:off x="3200400" y="3638550"/>
             <a:ext cx="0" cy="601980"/>
           </a:xfrm>
           <a:prstGeom prst="straightConnector1">
@@ -6395,7 +7431,7 @@
 </p:sld>
 </file>
 
-<file path=ppt/slides/slide21.xml><?xml version="1.0" encoding="utf-8"?>
+<file path=ppt/slides/slide24.xml><?xml version="1.0" encoding="utf-8"?>
 <p:sld xmlns:a="http://schemas.openxmlformats.org/drawingml/2006/main" xmlns:r="http://schemas.openxmlformats.org/officeDocument/2006/relationships" xmlns:p="http://schemas.openxmlformats.org/presentationml/2006/main">
   <p:cSld>
     <p:spTree>
@@ -6570,8 +7606,8 @@
           </p:nvSpPr>
           <p:spPr>
             <a:xfrm>
-              <a:off x="7365772" y="4103370"/>
-              <a:ext cx="4041367" cy="338554"/>
+              <a:off x="6629400" y="4103370"/>
+              <a:ext cx="4777739" cy="369332"/>
             </a:xfrm>
             <a:prstGeom prst="rect">
               <a:avLst/>
@@ -6585,7 +7621,7 @@
             <a:lstStyle/>
             <a:p>
               <a:r>
-                <a:rPr lang="en-US" sz="1600" dirty="0">
+                <a:rPr lang="en-US" dirty="0">
                   <a:solidFill>
                     <a:schemeClr val="bg1">
                       <a:lumMod val="75000"/>
@@ -6602,6 +7638,342 @@
     <p:extLst>
       <p:ext uri="{BB962C8B-B14F-4D97-AF65-F5344CB8AC3E}">
         <p14:creationId xmlns:p14="http://schemas.microsoft.com/office/powerpoint/2010/main" val="131759108"/>
+      </p:ext>
+    </p:extLst>
+  </p:cSld>
+  <p:clrMapOvr>
+    <a:masterClrMapping/>
+  </p:clrMapOvr>
+</p:sld>
+</file>
+
+<file path=ppt/slides/slide25.xml><?xml version="1.0" encoding="utf-8"?>
+<p:sld xmlns:a="http://schemas.openxmlformats.org/drawingml/2006/main" xmlns:r="http://schemas.openxmlformats.org/officeDocument/2006/relationships" xmlns:p="http://schemas.openxmlformats.org/presentationml/2006/main">
+  <p:cSld>
+    <p:spTree>
+      <p:nvGrpSpPr>
+        <p:cNvPr id="1" name=""/>
+        <p:cNvGrpSpPr/>
+        <p:nvPr/>
+      </p:nvGrpSpPr>
+      <p:grpSpPr>
+        <a:xfrm>
+          <a:off x="0" y="0"/>
+          <a:ext cx="0" cy="0"/>
+          <a:chOff x="0" y="0"/>
+          <a:chExt cx="0" cy="0"/>
+        </a:xfrm>
+      </p:grpSpPr>
+      <p:sp>
+        <p:nvSpPr>
+          <p:cNvPr id="8" name="Title 1">
+            <a:extLst>
+              <a:ext uri="{FF2B5EF4-FFF2-40B4-BE49-F238E27FC236}">
+                <a16:creationId xmlns:a16="http://schemas.microsoft.com/office/drawing/2014/main" id="{D2CB5ABF-396D-4B7F-9444-C39CCAE82489}"/>
+              </a:ext>
+            </a:extLst>
+          </p:cNvPr>
+          <p:cNvSpPr txBox="1">
+            <a:spLocks/>
+          </p:cNvSpPr>
+          <p:nvPr/>
+        </p:nvSpPr>
+        <p:spPr>
+          <a:xfrm>
+            <a:off x="162339" y="168347"/>
+            <a:ext cx="10515600" cy="1325563"/>
+          </a:xfrm>
+          <a:prstGeom prst="rect">
+            <a:avLst/>
+          </a:prstGeom>
+        </p:spPr>
+        <p:txBody>
+          <a:bodyPr/>
+          <a:lstStyle>
+            <a:lvl1pPr algn="l" defTabSz="914400" rtl="0" eaLnBrk="1" latinLnBrk="0" hangingPunct="1">
+              <a:lnSpc>
+                <a:spcPct val="90000"/>
+              </a:lnSpc>
+              <a:spcBef>
+                <a:spcPct val="0"/>
+              </a:spcBef>
+              <a:buNone/>
+              <a:defRPr sz="4400" kern="1200">
+                <a:solidFill>
+                  <a:schemeClr val="tx1"/>
+                </a:solidFill>
+                <a:latin typeface="+mj-lt"/>
+                <a:ea typeface="+mj-ea"/>
+                <a:cs typeface="+mj-cs"/>
+              </a:defRPr>
+            </a:lvl1pPr>
+          </a:lstStyle>
+          <a:p>
+            <a:r>
+              <a:rPr lang="en-US" dirty="0"/>
+              <a:t>Harvest Analyses</a:t>
+            </a:r>
+          </a:p>
+        </p:txBody>
+      </p:sp>
+      <p:sp>
+        <p:nvSpPr>
+          <p:cNvPr id="6" name="TextBox 5">
+            <a:extLst>
+              <a:ext uri="{FF2B5EF4-FFF2-40B4-BE49-F238E27FC236}">
+                <a16:creationId xmlns:a16="http://schemas.microsoft.com/office/drawing/2014/main" id="{56493F0E-42C5-485A-AE9D-0692A6596CEA}"/>
+              </a:ext>
+            </a:extLst>
+          </p:cNvPr>
+          <p:cNvSpPr txBox="1"/>
+          <p:nvPr/>
+        </p:nvSpPr>
+        <p:spPr>
+          <a:xfrm>
+            <a:off x="162339" y="749439"/>
+            <a:ext cx="10889974" cy="461665"/>
+          </a:xfrm>
+          <a:prstGeom prst="rect">
+            <a:avLst/>
+          </a:prstGeom>
+          <a:noFill/>
+        </p:spPr>
+        <p:txBody>
+          <a:bodyPr wrap="square" rtlCol="0">
+            <a:spAutoFit/>
+          </a:bodyPr>
+          <a:lstStyle/>
+          <a:p>
+            <a:r>
+              <a:rPr lang="en-US" sz="2400" i="1" dirty="0">
+                <a:latin typeface="+mj-lt"/>
+              </a:rPr>
+              <a:t>Assumptions</a:t>
+            </a:r>
+          </a:p>
+        </p:txBody>
+      </p:sp>
+      <mc:AlternateContent xmlns:mc="http://schemas.openxmlformats.org/markup-compatibility/2006">
+        <mc:Choice xmlns:a14="http://schemas.microsoft.com/office/drawing/2010/main" Requires="a14">
+          <p:sp>
+            <p:nvSpPr>
+              <p:cNvPr id="2" name="TextBox 1">
+                <a:extLst>
+                  <a:ext uri="{FF2B5EF4-FFF2-40B4-BE49-F238E27FC236}">
+                    <a16:creationId xmlns:a16="http://schemas.microsoft.com/office/drawing/2014/main" id="{EDDCC970-85E3-461F-A37B-ACD440A745FC}"/>
+                  </a:ext>
+                </a:extLst>
+              </p:cNvPr>
+              <p:cNvSpPr txBox="1"/>
+              <p:nvPr/>
+            </p:nvSpPr>
+            <p:spPr>
+              <a:xfrm>
+                <a:off x="956603" y="1674055"/>
+                <a:ext cx="10515600" cy="954107"/>
+              </a:xfrm>
+              <a:prstGeom prst="rect">
+                <a:avLst/>
+              </a:prstGeom>
+              <a:noFill/>
+            </p:spPr>
+            <p:txBody>
+              <a:bodyPr wrap="square" rtlCol="0">
+                <a:spAutoFit/>
+              </a:bodyPr>
+              <a:lstStyle/>
+              <a:p>
+                <a:pPr marL="285750" indent="-285750">
+                  <a:buFont typeface="Arial" panose="020B0604020202020204" pitchFamily="34" charset="0"/>
+                  <a:buChar char="•"/>
+                </a:pPr>
+                <a:r>
+                  <a:rPr lang="en-US" sz="2800" dirty="0"/>
+                  <a:t>Caviar harvesting of females that are reproductively-ready to spawn occurs annually at rate </a:t>
+                </a:r>
+                <a14:m>
+                  <m:oMath xmlns:m="http://schemas.openxmlformats.org/officeDocument/2006/math">
+                    <m:r>
+                      <a:rPr lang="en-US" sz="2800" i="1" dirty="0" smtClean="0">
+                        <a:latin typeface="Cambria Math" panose="02040503050406030204" pitchFamily="18" charset="0"/>
+                      </a:rPr>
+                      <m:t>h</m:t>
+                    </m:r>
+                  </m:oMath>
+                </a14:m>
+                <a:endParaRPr lang="en-US" sz="2800" dirty="0"/>
+              </a:p>
+            </p:txBody>
+          </p:sp>
+        </mc:Choice>
+        <mc:Fallback>
+          <p:sp>
+            <p:nvSpPr>
+              <p:cNvPr id="2" name="TextBox 1">
+                <a:extLst>
+                  <a:ext uri="{FF2B5EF4-FFF2-40B4-BE49-F238E27FC236}">
+                    <a16:creationId xmlns:a16="http://schemas.microsoft.com/office/drawing/2014/main" id="{EDDCC970-85E3-461F-A37B-ACD440A745FC}"/>
+                  </a:ext>
+                </a:extLst>
+              </p:cNvPr>
+              <p:cNvSpPr txBox="1">
+                <a:spLocks noRot="1" noChangeAspect="1" noMove="1" noResize="1" noEditPoints="1" noAdjustHandles="1" noChangeArrowheads="1" noChangeShapeType="1" noTextEdit="1"/>
+              </p:cNvSpPr>
+              <p:nvPr/>
+            </p:nvSpPr>
+            <p:spPr>
+              <a:xfrm>
+                <a:off x="956603" y="1674055"/>
+                <a:ext cx="10515600" cy="954107"/>
+              </a:xfrm>
+              <a:prstGeom prst="rect">
+                <a:avLst/>
+              </a:prstGeom>
+              <a:blipFill>
+                <a:blip r:embed="rId2"/>
+                <a:stretch>
+                  <a:fillRect l="-1043" t="-6410" b="-17949"/>
+                </a:stretch>
+              </a:blipFill>
+            </p:spPr>
+            <p:txBody>
+              <a:bodyPr/>
+              <a:lstStyle/>
+              <a:p>
+                <a:r>
+                  <a:rPr lang="en-US">
+                    <a:noFill/>
+                  </a:rPr>
+                  <a:t> </a:t>
+                </a:r>
+              </a:p>
+            </p:txBody>
+          </p:sp>
+        </mc:Fallback>
+      </mc:AlternateContent>
+    </p:spTree>
+    <p:extLst>
+      <p:ext uri="{BB962C8B-B14F-4D97-AF65-F5344CB8AC3E}">
+        <p14:creationId xmlns:p14="http://schemas.microsoft.com/office/powerpoint/2010/main" val="787916429"/>
+      </p:ext>
+    </p:extLst>
+  </p:cSld>
+  <p:clrMapOvr>
+    <a:masterClrMapping/>
+  </p:clrMapOvr>
+</p:sld>
+</file>
+
+<file path=ppt/slides/slide26.xml><?xml version="1.0" encoding="utf-8"?>
+<p:sld xmlns:a="http://schemas.openxmlformats.org/drawingml/2006/main" xmlns:r="http://schemas.openxmlformats.org/officeDocument/2006/relationships" xmlns:p="http://schemas.openxmlformats.org/presentationml/2006/main">
+  <p:cSld>
+    <p:spTree>
+      <p:nvGrpSpPr>
+        <p:cNvPr id="1" name=""/>
+        <p:cNvGrpSpPr/>
+        <p:nvPr/>
+      </p:nvGrpSpPr>
+      <p:grpSpPr>
+        <a:xfrm>
+          <a:off x="0" y="0"/>
+          <a:ext cx="0" cy="0"/>
+          <a:chOff x="0" y="0"/>
+          <a:chExt cx="0" cy="0"/>
+        </a:xfrm>
+      </p:grpSpPr>
+      <p:sp>
+        <p:nvSpPr>
+          <p:cNvPr id="8" name="Title 1">
+            <a:extLst>
+              <a:ext uri="{FF2B5EF4-FFF2-40B4-BE49-F238E27FC236}">
+                <a16:creationId xmlns:a16="http://schemas.microsoft.com/office/drawing/2014/main" id="{D2CB5ABF-396D-4B7F-9444-C39CCAE82489}"/>
+              </a:ext>
+            </a:extLst>
+          </p:cNvPr>
+          <p:cNvSpPr txBox="1">
+            <a:spLocks/>
+          </p:cNvSpPr>
+          <p:nvPr/>
+        </p:nvSpPr>
+        <p:spPr>
+          <a:xfrm>
+            <a:off x="162339" y="168347"/>
+            <a:ext cx="10515600" cy="1325563"/>
+          </a:xfrm>
+          <a:prstGeom prst="rect">
+            <a:avLst/>
+          </a:prstGeom>
+        </p:spPr>
+        <p:txBody>
+          <a:bodyPr/>
+          <a:lstStyle>
+            <a:lvl1pPr algn="l" defTabSz="914400" rtl="0" eaLnBrk="1" latinLnBrk="0" hangingPunct="1">
+              <a:lnSpc>
+                <a:spcPct val="90000"/>
+              </a:lnSpc>
+              <a:spcBef>
+                <a:spcPct val="0"/>
+              </a:spcBef>
+              <a:buNone/>
+              <a:defRPr sz="4400" kern="1200">
+                <a:solidFill>
+                  <a:schemeClr val="tx1"/>
+                </a:solidFill>
+                <a:latin typeface="+mj-lt"/>
+                <a:ea typeface="+mj-ea"/>
+                <a:cs typeface="+mj-cs"/>
+              </a:defRPr>
+            </a:lvl1pPr>
+          </a:lstStyle>
+          <a:p>
+            <a:r>
+              <a:rPr lang="en-US" dirty="0"/>
+              <a:t>Stocking Analyses</a:t>
+            </a:r>
+          </a:p>
+        </p:txBody>
+      </p:sp>
+      <p:sp>
+        <p:nvSpPr>
+          <p:cNvPr id="6" name="TextBox 5">
+            <a:extLst>
+              <a:ext uri="{FF2B5EF4-FFF2-40B4-BE49-F238E27FC236}">
+                <a16:creationId xmlns:a16="http://schemas.microsoft.com/office/drawing/2014/main" id="{56493F0E-42C5-485A-AE9D-0692A6596CEA}"/>
+              </a:ext>
+            </a:extLst>
+          </p:cNvPr>
+          <p:cNvSpPr txBox="1"/>
+          <p:nvPr/>
+        </p:nvSpPr>
+        <p:spPr>
+          <a:xfrm>
+            <a:off x="162339" y="749439"/>
+            <a:ext cx="10889974" cy="461665"/>
+          </a:xfrm>
+          <a:prstGeom prst="rect">
+            <a:avLst/>
+          </a:prstGeom>
+          <a:noFill/>
+        </p:spPr>
+        <p:txBody>
+          <a:bodyPr wrap="square" rtlCol="0">
+            <a:spAutoFit/>
+          </a:bodyPr>
+          <a:lstStyle/>
+          <a:p>
+            <a:r>
+              <a:rPr lang="en-US" sz="2400" i="1" dirty="0">
+                <a:latin typeface="+mj-lt"/>
+              </a:rPr>
+              <a:t>TBD</a:t>
+            </a:r>
+          </a:p>
+        </p:txBody>
+      </p:sp>
+    </p:spTree>
+    <p:extLst>
+      <p:ext uri="{BB962C8B-B14F-4D97-AF65-F5344CB8AC3E}">
+        <p14:creationId xmlns:p14="http://schemas.microsoft.com/office/powerpoint/2010/main" val="1435087481"/>
       </p:ext>
     </p:extLst>
   </p:cSld>
@@ -6646,7 +8018,7 @@
         </p:nvSpPr>
         <p:spPr>
           <a:xfrm>
-            <a:off x="162339" y="168347"/>
+            <a:off x="162339" y="111197"/>
             <a:ext cx="10515600" cy="1325563"/>
           </a:xfrm>
         </p:spPr>
@@ -6817,7 +8189,7 @@
         </p:nvSpPr>
         <p:spPr>
           <a:xfrm>
-            <a:off x="162339" y="168347"/>
+            <a:off x="162339" y="111197"/>
             <a:ext cx="10515600" cy="1325563"/>
           </a:xfrm>
         </p:spPr>
@@ -6846,8 +8218,8 @@
         </p:nvSpPr>
         <p:spPr>
           <a:xfrm>
-            <a:off x="1378226" y="1378225"/>
-            <a:ext cx="9713844" cy="4339650"/>
+            <a:off x="1378226" y="1343935"/>
+            <a:ext cx="9713844" cy="5309146"/>
           </a:xfrm>
           <a:prstGeom prst="rect">
             <a:avLst/>
@@ -6914,6 +8286,19 @@
           <a:p>
             <a:pPr marL="285750" indent="-285750">
               <a:spcAft>
+                <a:spcPts val="1800"/>
+              </a:spcAft>
+              <a:buFont typeface="Arial" panose="020B0604020202020204" pitchFamily="34" charset="0"/>
+              <a:buChar char="•"/>
+            </a:pPr>
+            <a:r>
+              <a:rPr lang="en-US" sz="2400" dirty="0"/>
+              <a:t>Minimum age for subadults could also be set based on observations or a minimum probability</a:t>
+            </a:r>
+          </a:p>
+          <a:p>
+            <a:pPr marL="285750" indent="-285750">
+              <a:spcAft>
                 <a:spcPts val="600"/>
               </a:spcAft>
               <a:buFont typeface="Arial" panose="020B0604020202020204" pitchFamily="34" charset="0"/>
@@ -6921,7 +8306,7 @@
             </a:pPr>
             <a:r>
               <a:rPr lang="en-US" sz="2400" dirty="0"/>
-              <a:t>Minimum age for subadults could also be set based on observations or a minimum probability</a:t>
+              <a:t>Maximum ages for remaining in the juvenile or subadult stages could also be specified</a:t>
             </a:r>
           </a:p>
         </p:txBody>
@@ -6974,7 +8359,7 @@
         </p:nvSpPr>
         <p:spPr>
           <a:xfrm>
-            <a:off x="162339" y="168347"/>
+            <a:off x="162339" y="111197"/>
             <a:ext cx="10515600" cy="1325563"/>
           </a:xfrm>
         </p:spPr>
@@ -8350,7 +9735,7 @@
         </p:nvSpPr>
         <p:spPr>
           <a:xfrm>
-            <a:off x="162339" y="168347"/>
+            <a:off x="162339" y="54047"/>
             <a:ext cx="10515600" cy="1325563"/>
           </a:xfrm>
         </p:spPr>
@@ -8413,7 +9798,7 @@
         </p:nvSpPr>
         <p:spPr>
           <a:xfrm>
-            <a:off x="162339" y="168347"/>
+            <a:off x="162339" y="-170163"/>
             <a:ext cx="10515600" cy="1325563"/>
           </a:xfrm>
         </p:spPr>
@@ -8428,8 +9813,8 @@
           </a:p>
         </p:txBody>
       </p:sp>
-      <mc:AlternateContent xmlns:mc="http://schemas.openxmlformats.org/markup-compatibility/2006" xmlns:a14="http://schemas.microsoft.com/office/drawing/2010/main">
-        <mc:Choice Requires="a14">
+      <mc:AlternateContent xmlns:mc="http://schemas.openxmlformats.org/markup-compatibility/2006">
+        <mc:Choice xmlns:a14="http://schemas.microsoft.com/office/drawing/2010/main" Requires="a14">
           <p:sp>
             <p:nvSpPr>
               <p:cNvPr id="5" name="TextBox 4">
@@ -8444,7 +9829,7 @@
             </p:nvSpPr>
             <p:spPr>
               <a:xfrm>
-                <a:off x="2569266" y="1493910"/>
+                <a:off x="2569266" y="1001530"/>
                 <a:ext cx="7053469" cy="542136"/>
               </a:xfrm>
               <a:prstGeom prst="rect">
@@ -8498,18 +9883,6 @@
                           <a:latin typeface="Cambria Math" panose="02040503050406030204" pitchFamily="18" charset="0"/>
                         </a:rPr>
                         <m:t>=</m:t>
-                      </m:r>
-                      <m:r>
-                        <a:rPr lang="en-US" sz="2800" i="1">
-                          <a:latin typeface="Cambria Math" panose="02040503050406030204" pitchFamily="18" charset="0"/>
-                        </a:rPr>
-                        <m:t>𝑟</m:t>
-                      </m:r>
-                      <m:r>
-                        <a:rPr lang="en-US" sz="2800" i="0">
-                          <a:latin typeface="Cambria Math" panose="02040503050406030204" pitchFamily="18" charset="0"/>
-                        </a:rPr>
-                        <m:t>∙</m:t>
                       </m:r>
                       <m:sSub>
                         <m:sSubPr>
@@ -8610,6 +9983,20 @@
                         </m:e>
                       </m:d>
                       <m:r>
+                        <a:rPr lang="en-US" sz="2800" i="1" smtClean="0">
+                          <a:latin typeface="Cambria Math" panose="02040503050406030204" pitchFamily="18" charset="0"/>
+                          <a:ea typeface="Cambria Math" panose="02040503050406030204" pitchFamily="18" charset="0"/>
+                        </a:rPr>
+                        <m:t>∙</m:t>
+                      </m:r>
+                      <m:r>
+                        <a:rPr lang="en-US" sz="2800" i="1" smtClean="0">
+                          <a:latin typeface="Cambria Math" panose="02040503050406030204" pitchFamily="18" charset="0"/>
+                          <a:ea typeface="Cambria Math" panose="02040503050406030204" pitchFamily="18" charset="0"/>
+                        </a:rPr>
+                        <m:t>𝛾</m:t>
+                      </m:r>
+                      <m:r>
                         <a:rPr lang="en-US" sz="2800" i="0">
                           <a:latin typeface="Cambria Math" panose="02040503050406030204" pitchFamily="18" charset="0"/>
                         </a:rPr>
@@ -8649,6 +10036,19 @@
                         </a:rPr>
                         <m:t>∙</m:t>
                       </m:r>
+                      <m:r>
+                        <a:rPr lang="en-US" sz="2800" b="0" i="1" smtClean="0">
+                          <a:latin typeface="Cambria Math" panose="02040503050406030204" pitchFamily="18" charset="0"/>
+                        </a:rPr>
+                        <m:t>𝑟</m:t>
+                      </m:r>
+                      <m:r>
+                        <a:rPr lang="en-US" sz="2800" b="0" i="1" smtClean="0">
+                          <a:latin typeface="Cambria Math" panose="02040503050406030204" pitchFamily="18" charset="0"/>
+                          <a:ea typeface="Cambria Math" panose="02040503050406030204" pitchFamily="18" charset="0"/>
+                        </a:rPr>
+                        <m:t>∙</m:t>
+                      </m:r>
                       <m:sSub>
                         <m:sSubPr>
                           <m:ctrlPr>
@@ -8685,7 +10085,7 @@
             </p:txBody>
           </p:sp>
         </mc:Choice>
-        <mc:Fallback xmlns="">
+        <mc:Fallback>
           <p:sp>
             <p:nvSpPr>
               <p:cNvPr id="5" name="TextBox 4">
@@ -8702,7 +10102,7 @@
             </p:nvSpPr>
             <p:spPr>
               <a:xfrm>
-                <a:off x="2569266" y="1493910"/>
+                <a:off x="2569266" y="1001530"/>
                 <a:ext cx="7053469" cy="542136"/>
               </a:xfrm>
               <a:prstGeom prst="rect">
@@ -8730,8 +10130,8 @@
           </p:sp>
         </mc:Fallback>
       </mc:AlternateContent>
-      <mc:AlternateContent xmlns:mc="http://schemas.openxmlformats.org/markup-compatibility/2006" xmlns:a14="http://schemas.microsoft.com/office/drawing/2010/main">
-        <mc:Choice Requires="a14">
+      <mc:AlternateContent xmlns:mc="http://schemas.openxmlformats.org/markup-compatibility/2006">
+        <mc:Choice xmlns:a14="http://schemas.microsoft.com/office/drawing/2010/main" Requires="a14">
           <p:graphicFrame>
             <p:nvGraphicFramePr>
               <p:cNvPr id="4" name="Table 6">
@@ -8747,14 +10147,14 @@
               <p:nvPr>
                 <p:extLst>
                   <p:ext uri="{D42A27DB-BD31-4B8C-83A1-F6EECF244321}">
-                    <p14:modId xmlns:p14="http://schemas.microsoft.com/office/powerpoint/2010/main" val="1499837460"/>
+                    <p14:modId xmlns:p14="http://schemas.microsoft.com/office/powerpoint/2010/main" val="539400844"/>
                   </p:ext>
                 </p:extLst>
               </p:nvPr>
             </p:nvGraphicFramePr>
             <p:xfrm>
-              <a:off x="424069" y="2036046"/>
-              <a:ext cx="11343861" cy="4419600"/>
+              <a:off x="424069" y="1543666"/>
+              <a:ext cx="11343861" cy="5181600"/>
             </p:xfrm>
             <a:graphic>
               <a:graphicData uri="http://schemas.openxmlformats.org/drawingml/2006/table">
@@ -8936,65 +10336,6 @@
                                 <m:jc m:val="centerGroup"/>
                               </m:oMathParaPr>
                               <m:oMath xmlns:m="http://schemas.openxmlformats.org/officeDocument/2006/math">
-                                <m:r>
-                                  <a:rPr lang="en-US" sz="2200" i="1" dirty="0" smtClean="0">
-                                    <a:latin typeface="Cambria Math" panose="02040503050406030204" pitchFamily="18" charset="0"/>
-                                  </a:rPr>
-                                  <m:t>𝑟</m:t>
-                                </m:r>
-                              </m:oMath>
-                            </m:oMathPara>
-                          </a14:m>
-                          <a:endParaRPr lang="en-US" sz="2200" dirty="0"/>
-                        </a:p>
-                      </a:txBody>
-                      <a:tcPr/>
-                    </a:tc>
-                    <a:tc>
-                      <a:txBody>
-                        <a:bodyPr/>
-                        <a:lstStyle/>
-                        <a:p>
-                          <a:r>
-                            <a:rPr lang="en-US" sz="2200" dirty="0"/>
-                            <a:t>Sex ratio (probability of being female)</a:t>
-                          </a:r>
-                        </a:p>
-                      </a:txBody>
-                      <a:tcPr/>
-                    </a:tc>
-                    <a:tc>
-                      <a:txBody>
-                        <a:bodyPr/>
-                        <a:lstStyle/>
-                        <a:p>
-                          <a:r>
-                            <a:rPr lang="en-US" sz="2200" dirty="0"/>
-                            <a:t>0.5</a:t>
-                          </a:r>
-                        </a:p>
-                      </a:txBody>
-                      <a:tcPr/>
-                    </a:tc>
-                    <a:extLst>
-                      <a:ext uri="{0D108BD9-81ED-4DB2-BD59-A6C34878D82A}">
-                        <a16:rowId xmlns:a16="http://schemas.microsoft.com/office/drawing/2014/main" val="3746232387"/>
-                      </a:ext>
-                    </a:extLst>
-                  </a:tr>
-                  <a:tr h="370840">
-                    <a:tc>
-                      <a:txBody>
-                        <a:bodyPr/>
-                        <a:lstStyle/>
-                        <a:p>
-                          <a:pPr/>
-                          <a14:m>
-                            <m:oMathPara xmlns:m="http://schemas.openxmlformats.org/officeDocument/2006/math">
-                              <m:oMathParaPr>
-                                <m:jc m:val="centerGroup"/>
-                              </m:oMathParaPr>
-                              <m:oMath xmlns:m="http://schemas.openxmlformats.org/officeDocument/2006/math">
                                 <m:sSub>
                                   <m:sSubPr>
                                     <m:ctrlPr>
@@ -9079,7 +10420,7 @@
                     </a:tc>
                     <a:extLst>
                       <a:ext uri="{0D108BD9-81ED-4DB2-BD59-A6C34878D82A}">
-                        <a16:rowId xmlns:a16="http://schemas.microsoft.com/office/drawing/2014/main" val="3413384058"/>
+                        <a16:rowId xmlns:a16="http://schemas.microsoft.com/office/drawing/2014/main" val="3746232387"/>
                       </a:ext>
                     </a:extLst>
                   </a:tr>
@@ -9168,7 +10509,7 @@
                     </a:tc>
                     <a:extLst>
                       <a:ext uri="{0D108BD9-81ED-4DB2-BD59-A6C34878D82A}">
-                        <a16:rowId xmlns:a16="http://schemas.microsoft.com/office/drawing/2014/main" val="3756956698"/>
+                        <a16:rowId xmlns:a16="http://schemas.microsoft.com/office/drawing/2014/main" val="3413384058"/>
                       </a:ext>
                     </a:extLst>
                   </a:tr>
@@ -9246,6 +10587,66 @@
                             <a:t>pallids</a:t>
                           </a:r>
                           <a:endParaRPr lang="en-US" sz="2200" dirty="0"/>
+                        </a:p>
+                      </a:txBody>
+                      <a:tcPr/>
+                    </a:tc>
+                    <a:extLst>
+                      <a:ext uri="{0D108BD9-81ED-4DB2-BD59-A6C34878D82A}">
+                        <a16:rowId xmlns:a16="http://schemas.microsoft.com/office/drawing/2014/main" val="3756956698"/>
+                      </a:ext>
+                    </a:extLst>
+                  </a:tr>
+                  <a:tr h="370840">
+                    <a:tc>
+                      <a:txBody>
+                        <a:bodyPr/>
+                        <a:lstStyle/>
+                        <a:p>
+                          <a:pPr/>
+                          <a14:m>
+                            <m:oMathPara xmlns:m="http://schemas.openxmlformats.org/officeDocument/2006/math">
+                              <m:oMathParaPr>
+                                <m:jc m:val="centerGroup"/>
+                              </m:oMathParaPr>
+                              <m:oMath xmlns:m="http://schemas.openxmlformats.org/officeDocument/2006/math">
+                                <m:r>
+                                  <a:rPr lang="en-US" sz="2200" i="1" smtClean="0">
+                                    <a:latin typeface="Cambria Math" panose="02040503050406030204" pitchFamily="18" charset="0"/>
+                                    <a:ea typeface="Cambria Math" panose="02040503050406030204" pitchFamily="18" charset="0"/>
+                                  </a:rPr>
+                                  <m:t>𝛾</m:t>
+                                </m:r>
+                              </m:oMath>
+                            </m:oMathPara>
+                          </a14:m>
+                          <a:endParaRPr lang="en-US" sz="2200" dirty="0"/>
+                        </a:p>
+                      </a:txBody>
+                      <a:tcPr/>
+                    </a:tc>
+                    <a:tc>
+                      <a:txBody>
+                        <a:bodyPr/>
+                        <a:lstStyle/>
+                        <a:p>
+                          <a:r>
+                            <a:rPr lang="en-US" sz="2200" dirty="0"/>
+                            <a:t>Expected proportion of reproductively-ready females that spawn  </a:t>
+                          </a:r>
+                        </a:p>
+                      </a:txBody>
+                      <a:tcPr/>
+                    </a:tc>
+                    <a:tc>
+                      <a:txBody>
+                        <a:bodyPr/>
+                        <a:lstStyle/>
+                        <a:p>
+                          <a:r>
+                            <a:rPr lang="en-US" sz="2200" dirty="0"/>
+                            <a:t>1; currently assuming no atresia but can look at different levels</a:t>
+                          </a:r>
                         </a:p>
                       </a:txBody>
                       <a:tcPr/>
@@ -9377,6 +10778,65 @@
                                 <m:jc m:val="centerGroup"/>
                               </m:oMathParaPr>
                               <m:oMath xmlns:m="http://schemas.openxmlformats.org/officeDocument/2006/math">
+                                <m:r>
+                                  <a:rPr lang="en-US" sz="2200" i="1" dirty="0" smtClean="0">
+                                    <a:latin typeface="Cambria Math" panose="02040503050406030204" pitchFamily="18" charset="0"/>
+                                  </a:rPr>
+                                  <m:t>𝑟</m:t>
+                                </m:r>
+                              </m:oMath>
+                            </m:oMathPara>
+                          </a14:m>
+                          <a:endParaRPr lang="en-US" sz="2200" dirty="0"/>
+                        </a:p>
+                      </a:txBody>
+                      <a:tcPr/>
+                    </a:tc>
+                    <a:tc>
+                      <a:txBody>
+                        <a:bodyPr/>
+                        <a:lstStyle/>
+                        <a:p>
+                          <a:r>
+                            <a:rPr lang="en-US" sz="2200" dirty="0"/>
+                            <a:t>Sex ratio (probability of being female)</a:t>
+                          </a:r>
+                        </a:p>
+                      </a:txBody>
+                      <a:tcPr/>
+                    </a:tc>
+                    <a:tc>
+                      <a:txBody>
+                        <a:bodyPr/>
+                        <a:lstStyle/>
+                        <a:p>
+                          <a:r>
+                            <a:rPr lang="en-US" sz="2200" dirty="0"/>
+                            <a:t>0.5</a:t>
+                          </a:r>
+                        </a:p>
+                      </a:txBody>
+                      <a:tcPr/>
+                    </a:tc>
+                    <a:extLst>
+                      <a:ext uri="{0D108BD9-81ED-4DB2-BD59-A6C34878D82A}">
+                        <a16:rowId xmlns:a16="http://schemas.microsoft.com/office/drawing/2014/main" val="2284603471"/>
+                      </a:ext>
+                    </a:extLst>
+                  </a:tr>
+                  <a:tr h="370840">
+                    <a:tc>
+                      <a:txBody>
+                        <a:bodyPr/>
+                        <a:lstStyle/>
+                        <a:p>
+                          <a:pPr/>
+                          <a14:m>
+                            <m:oMathPara xmlns:m="http://schemas.openxmlformats.org/officeDocument/2006/math">
+                              <m:oMathParaPr>
+                                <m:jc m:val="centerGroup"/>
+                              </m:oMathParaPr>
+                              <m:oMath xmlns:m="http://schemas.openxmlformats.org/officeDocument/2006/math">
                                 <m:sSub>
                                   <m:sSubPr>
                                     <m:ctrlPr>
@@ -9448,7 +10908,7 @@
             </a:graphic>
           </p:graphicFrame>
         </mc:Choice>
-        <mc:Fallback xmlns="">
+        <mc:Fallback>
           <p:graphicFrame>
             <p:nvGraphicFramePr>
               <p:cNvPr id="4" name="Table 6">
@@ -9464,14 +10924,14 @@
               <p:nvPr>
                 <p:extLst>
                   <p:ext uri="{D42A27DB-BD31-4B8C-83A1-F6EECF244321}">
-                    <p14:modId xmlns:p14="http://schemas.microsoft.com/office/powerpoint/2010/main" val="1499837460"/>
+                    <p14:modId xmlns:p14="http://schemas.microsoft.com/office/powerpoint/2010/main" val="539400844"/>
                   </p:ext>
                 </p:extLst>
               </p:nvPr>
             </p:nvGraphicFramePr>
             <p:xfrm>
-              <a:off x="424069" y="2036046"/>
-              <a:ext cx="11343861" cy="4419600"/>
+              <a:off x="424069" y="1543666"/>
+              <a:ext cx="11343861" cy="5181600"/>
             </p:xfrm>
             <a:graphic>
               <a:graphicData uri="http://schemas.openxmlformats.org/drawingml/2006/table">
@@ -9564,7 +11024,7 @@
                         <a:blipFill>
                           <a:blip r:embed="rId3"/>
                           <a:stretch>
-                            <a:fillRect l="-334" t="-108571" r="-524080" b="-865714"/>
+                            <a:fillRect l="-334" t="-110000" r="-524080" b="-1044286"/>
                           </a:stretch>
                         </a:blipFill>
                       </a:tcPr>
@@ -9581,7 +11041,7 @@
                         <a:blipFill>
                           <a:blip r:embed="rId3"/>
                           <a:stretch>
-                            <a:fillRect l="-33822" t="-108571" r="-76663" b="-865714"/>
+                            <a:fillRect l="-33822" t="-110000" r="-76663" b="-1044286"/>
                           </a:stretch>
                         </a:blipFill>
                       </a:tcPr>
@@ -9602,56 +11062,6 @@
                       </a:ext>
                     </a:extLst>
                   </a:tr>
-                  <a:tr h="426720">
-                    <a:tc>
-                      <a:txBody>
-                        <a:bodyPr/>
-                        <a:lstStyle/>
-                        <a:p>
-                          <a:endParaRPr lang="en-US"/>
-                        </a:p>
-                      </a:txBody>
-                      <a:tcPr>
-                        <a:blipFill>
-                          <a:blip r:embed="rId3"/>
-                          <a:stretch>
-                            <a:fillRect l="-334" t="-208571" r="-524080" b="-765714"/>
-                          </a:stretch>
-                        </a:blipFill>
-                      </a:tcPr>
-                    </a:tc>
-                    <a:tc>
-                      <a:txBody>
-                        <a:bodyPr/>
-                        <a:lstStyle/>
-                        <a:p>
-                          <a:r>
-                            <a:rPr lang="en-US" sz="2200" dirty="0"/>
-                            <a:t>Sex ratio (probability of being female)</a:t>
-                          </a:r>
-                        </a:p>
-                      </a:txBody>
-                      <a:tcPr/>
-                    </a:tc>
-                    <a:tc>
-                      <a:txBody>
-                        <a:bodyPr/>
-                        <a:lstStyle/>
-                        <a:p>
-                          <a:r>
-                            <a:rPr lang="en-US" sz="2200" dirty="0"/>
-                            <a:t>0.5</a:t>
-                          </a:r>
-                        </a:p>
-                      </a:txBody>
-                      <a:tcPr/>
-                    </a:tc>
-                    <a:extLst>
-                      <a:ext uri="{0D108BD9-81ED-4DB2-BD59-A6C34878D82A}">
-                        <a16:rowId xmlns:a16="http://schemas.microsoft.com/office/drawing/2014/main" val="3746232387"/>
-                      </a:ext>
-                    </a:extLst>
-                  </a:tr>
                   <a:tr h="762000">
                     <a:tc>
                       <a:txBody>
@@ -9665,7 +11075,7 @@
                         <a:blipFill>
                           <a:blip r:embed="rId3"/>
                           <a:stretch>
-                            <a:fillRect l="-334" t="-172800" r="-524080" b="-328800"/>
+                            <a:fillRect l="-334" t="-117600" r="-524080" b="-484800"/>
                           </a:stretch>
                         </a:blipFill>
                       </a:tcPr>
@@ -9682,7 +11092,7 @@
                         <a:blipFill>
                           <a:blip r:embed="rId3"/>
                           <a:stretch>
-                            <a:fillRect l="-33822" t="-172800" r="-76663" b="-328800"/>
+                            <a:fillRect l="-33822" t="-117600" r="-76663" b="-484800"/>
                           </a:stretch>
                         </a:blipFill>
                       </a:tcPr>
@@ -9695,6 +11105,60 @@
                           <a:r>
                             <a:rPr lang="en-US" sz="2200" dirty="0"/>
                             <a:t>Function of maturation and spawning period </a:t>
+                          </a:r>
+                        </a:p>
+                      </a:txBody>
+                      <a:tcPr/>
+                    </a:tc>
+                    <a:extLst>
+                      <a:ext uri="{0D108BD9-81ED-4DB2-BD59-A6C34878D82A}">
+                        <a16:rowId xmlns:a16="http://schemas.microsoft.com/office/drawing/2014/main" val="3746232387"/>
+                      </a:ext>
+                    </a:extLst>
+                  </a:tr>
+                  <a:tr h="426720">
+                    <a:tc>
+                      <a:txBody>
+                        <a:bodyPr/>
+                        <a:lstStyle/>
+                        <a:p>
+                          <a:endParaRPr lang="en-US"/>
+                        </a:p>
+                      </a:txBody>
+                      <a:tcPr>
+                        <a:blipFill>
+                          <a:blip r:embed="rId3"/>
+                          <a:stretch>
+                            <a:fillRect l="-334" t="-388571" r="-524080" b="-765714"/>
+                          </a:stretch>
+                        </a:blipFill>
+                      </a:tcPr>
+                    </a:tc>
+                    <a:tc>
+                      <a:txBody>
+                        <a:bodyPr/>
+                        <a:lstStyle/>
+                        <a:p>
+                          <a:endParaRPr lang="en-US"/>
+                        </a:p>
+                      </a:txBody>
+                      <a:tcPr>
+                        <a:blipFill>
+                          <a:blip r:embed="rId3"/>
+                          <a:stretch>
+                            <a:fillRect l="-33822" t="-388571" r="-76663" b="-765714"/>
+                          </a:stretch>
+                        </a:blipFill>
+                      </a:tcPr>
+                    </a:tc>
+                    <a:tc>
+                      <a:txBody>
+                        <a:bodyPr/>
+                        <a:lstStyle/>
+                        <a:p>
+                          <a:r>
+                            <a:rPr lang="en-US" sz="2200" dirty="0"/>
+                            <a:t>3 approaches used</a:t>
                           </a:r>
                         </a:p>
                       </a:txBody>
@@ -9719,61 +11183,7 @@
                         <a:blipFill>
                           <a:blip r:embed="rId3"/>
                           <a:stretch>
-                            <a:fillRect l="-334" t="-480282" r="-524080" b="-478873"/>
-                          </a:stretch>
-                        </a:blipFill>
-                      </a:tcPr>
-                    </a:tc>
-                    <a:tc>
-                      <a:txBody>
-                        <a:bodyPr/>
-                        <a:lstStyle/>
-                        <a:p>
-                          <a:endParaRPr lang="en-US"/>
-                        </a:p>
-                      </a:txBody>
-                      <a:tcPr>
-                        <a:blipFill>
-                          <a:blip r:embed="rId3"/>
-                          <a:stretch>
-                            <a:fillRect l="-33822" t="-480282" r="-76663" b="-478873"/>
-                          </a:stretch>
-                        </a:blipFill>
-                      </a:tcPr>
-                    </a:tc>
-                    <a:tc>
-                      <a:txBody>
-                        <a:bodyPr/>
-                        <a:lstStyle/>
-                        <a:p>
-                          <a:r>
-                            <a:rPr lang="en-US" sz="2200" dirty="0"/>
-                            <a:t>3 approaches used</a:t>
-                          </a:r>
-                        </a:p>
-                      </a:txBody>
-                      <a:tcPr/>
-                    </a:tc>
-                    <a:extLst>
-                      <a:ext uri="{0D108BD9-81ED-4DB2-BD59-A6C34878D82A}">
-                        <a16:rowId xmlns:a16="http://schemas.microsoft.com/office/drawing/2014/main" val="3756956698"/>
-                      </a:ext>
-                    </a:extLst>
-                  </a:tr>
-                  <a:tr h="426720">
-                    <a:tc>
-                      <a:txBody>
-                        <a:bodyPr/>
-                        <a:lstStyle/>
-                        <a:p>
-                          <a:endParaRPr lang="en-US"/>
-                        </a:p>
-                      </a:txBody>
-                      <a:tcPr>
-                        <a:blipFill>
-                          <a:blip r:embed="rId3"/>
-                          <a:stretch>
-                            <a:fillRect l="-334" t="-588571" r="-524080" b="-385714"/>
+                            <a:fillRect l="-334" t="-488571" r="-524080" b="-665714"/>
                           </a:stretch>
                         </a:blipFill>
                       </a:tcPr>
@@ -9811,6 +11221,56 @@
                     </a:tc>
                     <a:extLst>
                       <a:ext uri="{0D108BD9-81ED-4DB2-BD59-A6C34878D82A}">
+                        <a16:rowId xmlns:a16="http://schemas.microsoft.com/office/drawing/2014/main" val="3756956698"/>
+                      </a:ext>
+                    </a:extLst>
+                  </a:tr>
+                  <a:tr h="762000">
+                    <a:tc>
+                      <a:txBody>
+                        <a:bodyPr/>
+                        <a:lstStyle/>
+                        <a:p>
+                          <a:endParaRPr lang="en-US"/>
+                        </a:p>
+                      </a:txBody>
+                      <a:tcPr>
+                        <a:blipFill>
+                          <a:blip r:embed="rId3"/>
+                          <a:stretch>
+                            <a:fillRect l="-334" t="-326984" r="-524080" b="-269841"/>
+                          </a:stretch>
+                        </a:blipFill>
+                      </a:tcPr>
+                    </a:tc>
+                    <a:tc>
+                      <a:txBody>
+                        <a:bodyPr/>
+                        <a:lstStyle/>
+                        <a:p>
+                          <a:r>
+                            <a:rPr lang="en-US" sz="2200" dirty="0"/>
+                            <a:t>Expected proportion of reproductively-ready females that spawn  </a:t>
+                          </a:r>
+                        </a:p>
+                      </a:txBody>
+                      <a:tcPr/>
+                    </a:tc>
+                    <a:tc>
+                      <a:txBody>
+                        <a:bodyPr/>
+                        <a:lstStyle/>
+                        <a:p>
+                          <a:r>
+                            <a:rPr lang="en-US" sz="2200" dirty="0"/>
+                            <a:t>1; currently assuming no atresia but can look at different levels</a:t>
+                          </a:r>
+                        </a:p>
+                      </a:txBody>
+                      <a:tcPr/>
+                    </a:tc>
+                    <a:extLst>
+                      <a:ext uri="{0D108BD9-81ED-4DB2-BD59-A6C34878D82A}">
                         <a16:rowId xmlns:a16="http://schemas.microsoft.com/office/drawing/2014/main" val="2395444567"/>
                       </a:ext>
                     </a:extLst>
@@ -9828,7 +11288,7 @@
                         <a:blipFill>
                           <a:blip r:embed="rId3"/>
                           <a:stretch>
-                            <a:fillRect l="-334" t="-267778" r="-524080" b="-50000"/>
+                            <a:fillRect l="-334" t="-298889" r="-524080" b="-88889"/>
                           </a:stretch>
                         </a:blipFill>
                       </a:tcPr>
@@ -9845,7 +11305,7 @@
                         <a:blipFill>
                           <a:blip r:embed="rId3"/>
                           <a:stretch>
-                            <a:fillRect l="-33822" t="-267778" r="-76663" b="-50000"/>
+                            <a:fillRect l="-33822" t="-298889" r="-76663" b="-88889"/>
                           </a:stretch>
                         </a:blipFill>
                       </a:tcPr>
@@ -9882,7 +11342,57 @@
                         <a:blipFill>
                           <a:blip r:embed="rId3"/>
                           <a:stretch>
-                            <a:fillRect l="-334" t="-945714" r="-524080" b="-28571"/>
+                            <a:fillRect l="-334" t="-1025714" r="-524080" b="-128571"/>
+                          </a:stretch>
+                        </a:blipFill>
+                      </a:tcPr>
+                    </a:tc>
+                    <a:tc>
+                      <a:txBody>
+                        <a:bodyPr/>
+                        <a:lstStyle/>
+                        <a:p>
+                          <a:r>
+                            <a:rPr lang="en-US" sz="2200" dirty="0"/>
+                            <a:t>Sex ratio (probability of being female)</a:t>
+                          </a:r>
+                        </a:p>
+                      </a:txBody>
+                      <a:tcPr/>
+                    </a:tc>
+                    <a:tc>
+                      <a:txBody>
+                        <a:bodyPr/>
+                        <a:lstStyle/>
+                        <a:p>
+                          <a:r>
+                            <a:rPr lang="en-US" sz="2200" dirty="0"/>
+                            <a:t>0.5</a:t>
+                          </a:r>
+                        </a:p>
+                      </a:txBody>
+                      <a:tcPr/>
+                    </a:tc>
+                    <a:extLst>
+                      <a:ext uri="{0D108BD9-81ED-4DB2-BD59-A6C34878D82A}">
+                        <a16:rowId xmlns:a16="http://schemas.microsoft.com/office/drawing/2014/main" val="2284603471"/>
+                      </a:ext>
+                    </a:extLst>
+                  </a:tr>
+                  <a:tr h="426720">
+                    <a:tc>
+                      <a:txBody>
+                        <a:bodyPr/>
+                        <a:lstStyle/>
+                        <a:p>
+                          <a:endParaRPr lang="en-US"/>
+                        </a:p>
+                      </a:txBody>
+                      <a:tcPr>
+                        <a:blipFill>
+                          <a:blip r:embed="rId3"/>
+                          <a:stretch>
+                            <a:fillRect l="-334" t="-1125714" r="-524080" b="-28571"/>
                           </a:stretch>
                         </a:blipFill>
                       </a:tcPr>
@@ -9973,7 +11483,7 @@
         </p:nvSpPr>
         <p:spPr>
           <a:xfrm>
-            <a:off x="162339" y="168347"/>
+            <a:off x="162339" y="111197"/>
             <a:ext cx="10515600" cy="1325563"/>
           </a:xfrm>
         </p:spPr>
@@ -10038,7 +11548,7 @@
         </p:nvSpPr>
         <p:spPr>
           <a:xfrm>
-            <a:off x="188965" y="1011333"/>
+            <a:off x="188965" y="954183"/>
             <a:ext cx="7765589" cy="461665"/>
           </a:xfrm>
           <a:prstGeom prst="rect">
@@ -10322,7 +11832,7 @@
         </p:nvSpPr>
         <p:spPr>
           <a:xfrm>
-            <a:off x="162339" y="168347"/>
+            <a:off x="162339" y="111197"/>
             <a:ext cx="10515600" cy="1325563"/>
           </a:xfrm>
         </p:spPr>
@@ -10387,7 +11897,7 @@
         </p:nvSpPr>
         <p:spPr>
           <a:xfrm>
-            <a:off x="188965" y="1011333"/>
+            <a:off x="188965" y="954183"/>
             <a:ext cx="7765589" cy="461665"/>
           </a:xfrm>
           <a:prstGeom prst="rect">

</xml_diff>